<commit_message>
Maj suite à la réunion du 14/04/15
</commit_message>
<xml_diff>
--- a/Presentation/PrésentationNarvis_2.pptx
+++ b/Presentation/PrésentationNarvis_2.pptx
@@ -19,8 +19,9 @@
     <p:sldId id="274" r:id="rId13"/>
     <p:sldId id="275" r:id="rId14"/>
     <p:sldId id="268" r:id="rId15"/>
-    <p:sldId id="269" r:id="rId16"/>
-    <p:sldId id="273" r:id="rId17"/>
+    <p:sldId id="276" r:id="rId16"/>
+    <p:sldId id="269" r:id="rId17"/>
+    <p:sldId id="273" r:id="rId18"/>
   </p:sldIdLst>
   <p:sldSz cx="12192000" cy="6858000"/>
   <p:notesSz cx="6858000" cy="9144000"/>
@@ -121,7 +122,7 @@
   </p:defaultTextStyle>
   <p:extLst>
     <p:ext uri="{EFAFB233-063F-42B5-8137-9DF3F51BA10A}">
-      <p15:sldGuideLst xmlns:p15="http://schemas.microsoft.com/office/powerpoint/2012/main">
+      <p15:sldGuideLst xmlns="" xmlns:p15="http://schemas.microsoft.com/office/powerpoint/2012/main">
         <p15:guide id="1" orient="horz" pos="2160">
           <p15:clr>
             <a:srgbClr val="A4A3A4"/>
@@ -4375,20 +4376,23 @@
                   <a:schemeClr val="tx1"/>
                 </a:solidFill>
               </a:rPr>
-              <a:t>Utilisation des </a:t>
-            </a:r>
-            <a:r>
-              <a:rPr lang="fr-FR" dirty="0" smtClean="0"/>
-              <a:t>outils </a:t>
-            </a:r>
-            <a:r>
-              <a:rPr lang="fr-FR" dirty="0" err="1" smtClean="0">
+              <a:t>Utilisation </a:t>
+            </a:r>
+            <a:r>
+              <a:rPr lang="fr-FR" dirty="0" smtClean="0">
                 <a:solidFill>
                   <a:schemeClr val="tx1"/>
                 </a:solidFill>
               </a:rPr>
-              <a:t>Scrum</a:t>
-            </a:r>
+              <a:t>du framework d’organisation Scrum</a:t>
+            </a:r>
+            <a:endParaRPr lang="fr-FR" dirty="0" smtClean="0">
+              <a:solidFill>
+                <a:schemeClr val="tx1"/>
+              </a:solidFill>
+            </a:endParaRPr>
+          </a:p>
+          <a:p>
             <a:endParaRPr lang="fr-FR" dirty="0" smtClean="0">
               <a:solidFill>
                 <a:schemeClr val="tx1"/>
@@ -4408,20 +4412,47 @@
           <a:p>
             <a:pPr lvl="1"/>
             <a:r>
+              <a:rPr lang="fr-FR" u="sng" dirty="0" smtClean="0">
+                <a:solidFill>
+                  <a:schemeClr val="tx1"/>
+                </a:solidFill>
+              </a:rPr>
+              <a:t>Product </a:t>
+            </a:r>
+            <a:r>
+              <a:rPr lang="fr-FR" u="sng" dirty="0" err="1" smtClean="0">
+                <a:solidFill>
+                  <a:schemeClr val="tx1"/>
+                </a:solidFill>
+              </a:rPr>
+              <a:t>Owner</a:t>
+            </a:r>
+            <a:r>
+              <a:rPr lang="fr-FR" u="sng" dirty="0" smtClean="0">
+                <a:solidFill>
+                  <a:schemeClr val="tx1"/>
+                </a:solidFill>
+              </a:rPr>
+              <a:t> </a:t>
+            </a:r>
+            <a:r>
               <a:rPr lang="fr-FR" dirty="0" smtClean="0">
                 <a:solidFill>
                   <a:schemeClr val="tx1"/>
                 </a:solidFill>
               </a:rPr>
-              <a:t>Product </a:t>
-            </a:r>
-            <a:r>
-              <a:rPr lang="fr-FR" dirty="0" err="1" smtClean="0">
+              <a:t>: Alban BONNET</a:t>
+            </a:r>
+          </a:p>
+          <a:p>
+            <a:pPr lvl="1"/>
+            <a:r>
+              <a:rPr lang="fr-FR" u="sng" dirty="0" smtClean="0">
                 <a:solidFill>
                   <a:schemeClr val="tx1"/>
                 </a:solidFill>
               </a:rPr>
-              <a:t>Owner</a:t>
+              <a:t>Scrum Master </a:t>
             </a:r>
             <a:r>
               <a:rPr lang="fr-FR" dirty="0" smtClean="0">
@@ -4429,18 +4460,18 @@
                   <a:schemeClr val="tx1"/>
                 </a:solidFill>
               </a:rPr>
-              <a:t> : Alban BONNET</a:t>
+              <a:t>: Yoann LE MOUËL </a:t>
             </a:r>
           </a:p>
           <a:p>
             <a:pPr lvl="1"/>
             <a:r>
-              <a:rPr lang="fr-FR" dirty="0" err="1" smtClean="0">
+              <a:rPr lang="fr-FR" u="sng" dirty="0" smtClean="0">
                 <a:solidFill>
                   <a:schemeClr val="tx1"/>
                 </a:solidFill>
               </a:rPr>
-              <a:t>Scrum</a:t>
+              <a:t>Développeurs</a:t>
             </a:r>
             <a:r>
               <a:rPr lang="fr-FR" dirty="0" smtClean="0">
@@ -4448,19 +4479,18 @@
                   <a:schemeClr val="tx1"/>
                 </a:solidFill>
               </a:rPr>
-              <a:t> Master : Yoann LE MOUËL </a:t>
-            </a:r>
-          </a:p>
-          <a:p>
-            <a:pPr lvl="1"/>
-            <a:r>
-              <a:rPr lang="fr-FR" dirty="0" smtClean="0">
-                <a:solidFill>
-                  <a:schemeClr val="tx1"/>
-                </a:solidFill>
-              </a:rPr>
-              <a:t>Développeurs : Raphaël BLIN, Charles COQUE</a:t>
-            </a:r>
+              <a:t> : Raphaël BLIN, Charles COQUE</a:t>
+            </a:r>
+          </a:p>
+          <a:p>
+            <a:pPr marL="0" lvl="1" indent="0">
+              <a:buNone/>
+            </a:pPr>
+            <a:endParaRPr lang="fr-FR" dirty="0" smtClean="0">
+              <a:solidFill>
+                <a:schemeClr val="tx1"/>
+              </a:solidFill>
+            </a:endParaRPr>
           </a:p>
           <a:p>
             <a:r>
@@ -4475,91 +4505,28 @@
           <a:p>
             <a:pPr lvl="1"/>
             <a:r>
-              <a:rPr lang="fr-FR" dirty="0" err="1" smtClean="0">
+              <a:rPr lang="fr-FR" smtClean="0">
                 <a:solidFill>
                   <a:schemeClr val="tx1"/>
                 </a:solidFill>
               </a:rPr>
-              <a:t>Backlogs</a:t>
-            </a:r>
-            <a:endParaRPr lang="fr-FR" dirty="0"/>
-          </a:p>
-          <a:p>
-            <a:pPr lvl="2"/>
+              <a:t>Backlog</a:t>
+            </a:r>
+            <a:endParaRPr lang="fr-FR" dirty="0">
+              <a:solidFill>
+                <a:schemeClr val="tx1"/>
+              </a:solidFill>
+            </a:endParaRPr>
+          </a:p>
+          <a:p>
+            <a:pPr lvl="1"/>
             <a:r>
               <a:rPr lang="fr-FR" dirty="0" smtClean="0">
                 <a:solidFill>
                   <a:schemeClr val="tx1"/>
                 </a:solidFill>
               </a:rPr>
-              <a:t>TODO : Détailler TOTO </a:t>
-            </a:r>
-            <a:r>
-              <a:rPr lang="fr-FR" dirty="0" err="1" smtClean="0">
-                <a:solidFill>
-                  <a:schemeClr val="tx1"/>
-                </a:solidFill>
-              </a:rPr>
-              <a:t>GitHubgit</a:t>
-            </a:r>
-            <a:r>
-              <a:rPr lang="fr-FR" dirty="0" smtClean="0">
-                <a:solidFill>
-                  <a:schemeClr val="tx1"/>
-                </a:solidFill>
-              </a:rPr>
-              <a:t> </a:t>
-            </a:r>
-            <a:r>
-              <a:rPr lang="fr-FR" dirty="0" err="1" smtClean="0">
-                <a:solidFill>
-                  <a:schemeClr val="tx1"/>
-                </a:solidFill>
-              </a:rPr>
-              <a:t>add</a:t>
-            </a:r>
-            <a:r>
-              <a:rPr lang="fr-FR" smtClean="0">
-                <a:solidFill>
-                  <a:schemeClr val="tx1"/>
-                </a:solidFill>
-              </a:rPr>
-              <a:t> ,</a:t>
-            </a:r>
-          </a:p>
-          <a:p>
-            <a:pPr lvl="2"/>
-            <a:endParaRPr lang="fr-FR" dirty="0">
-              <a:solidFill>
-                <a:schemeClr val="tx1"/>
-              </a:solidFill>
-            </a:endParaRPr>
-          </a:p>
-          <a:p>
-            <a:pPr lvl="1"/>
-            <a:r>
-              <a:rPr lang="fr-FR" dirty="0" err="1" smtClean="0">
-                <a:solidFill>
-                  <a:schemeClr val="tx1"/>
-                </a:solidFill>
-              </a:rPr>
-              <a:t>Scrum</a:t>
-            </a:r>
-            <a:r>
-              <a:rPr lang="fr-FR" dirty="0" smtClean="0">
-                <a:solidFill>
-                  <a:schemeClr val="tx1"/>
-                </a:solidFill>
-              </a:rPr>
-              <a:t> </a:t>
-            </a:r>
-            <a:r>
-              <a:rPr lang="fr-FR" dirty="0" err="1" smtClean="0">
-                <a:solidFill>
-                  <a:schemeClr val="tx1"/>
-                </a:solidFill>
-              </a:rPr>
-              <a:t>boards</a:t>
+              <a:t>Scrumboard</a:t>
             </a:r>
             <a:endParaRPr lang="fr-FR" dirty="0" smtClean="0">
               <a:solidFill>
@@ -5013,9 +4980,10 @@
           <a:lstStyle/>
           <a:p>
             <a:r>
-              <a:rPr lang="fr-FR" dirty="0"/>
-              <a:t>User stories</a:t>
-            </a:r>
+              <a:rPr lang="fr-FR" dirty="0" smtClean="0"/>
+              <a:t>Quelques user stories</a:t>
+            </a:r>
+            <a:endParaRPr lang="fr-FR" dirty="0"/>
           </a:p>
         </p:txBody>
       </p:sp>
@@ -5510,54 +5478,30 @@
                   <a:schemeClr val="tx1"/>
                 </a:solidFill>
               </a:rPr>
-              <a:t>Langage Java </a:t>
-            </a:r>
+              <a:t>Langage Java 1.8</a:t>
+            </a:r>
+          </a:p>
+          <a:p>
+            <a:pPr lvl="2"/>
+            <a:r>
+              <a:rPr lang="fr-FR" dirty="0" smtClean="0"/>
+              <a:t>TODO : Pourquoi ?</a:t>
+            </a:r>
+            <a:endParaRPr lang="fr-FR" dirty="0" smtClean="0">
+              <a:solidFill>
+                <a:schemeClr val="tx1"/>
+              </a:solidFill>
+            </a:endParaRPr>
+          </a:p>
+          <a:p>
+            <a:pPr lvl="1"/>
             <a:r>
               <a:rPr lang="fr-FR" dirty="0" smtClean="0">
                 <a:solidFill>
                   <a:schemeClr val="tx1"/>
                 </a:solidFill>
               </a:rPr>
-              <a:t>1.8</a:t>
-            </a:r>
-          </a:p>
-          <a:p>
-            <a:pPr lvl="2"/>
-            <a:r>
-              <a:rPr lang="fr-FR" dirty="0" smtClean="0"/>
-              <a:t>TODO : Pourquoi ?</a:t>
-            </a:r>
-            <a:endParaRPr lang="fr-FR" dirty="0" smtClean="0">
-              <a:solidFill>
-                <a:schemeClr val="tx1"/>
-              </a:solidFill>
-            </a:endParaRPr>
-          </a:p>
-          <a:p>
-            <a:pPr lvl="1"/>
-            <a:r>
-              <a:rPr lang="fr-FR" dirty="0" smtClean="0">
-                <a:solidFill>
-                  <a:schemeClr val="tx1"/>
-                </a:solidFill>
-              </a:rPr>
-              <a:t>IDE </a:t>
-            </a:r>
-            <a:r>
-              <a:rPr lang="fr-FR" dirty="0" err="1" smtClean="0">
-                <a:solidFill>
-                  <a:schemeClr val="tx1"/>
-                </a:solidFill>
-              </a:rPr>
-              <a:t>Netbeans</a:t>
-            </a:r>
-            <a:r>
-              <a:rPr lang="fr-FR" dirty="0" smtClean="0">
-                <a:solidFill>
-                  <a:schemeClr val="tx1"/>
-                </a:solidFill>
-              </a:rPr>
-              <a:t> 8.1</a:t>
+              <a:t>IDE Netbeans 8.1</a:t>
             </a:r>
           </a:p>
           <a:p>
@@ -5601,55 +5545,13 @@
           <a:p>
             <a:pPr lvl="1"/>
             <a:r>
-              <a:rPr lang="fr-FR" dirty="0" err="1" smtClean="0">
-                <a:solidFill>
-                  <a:schemeClr val="tx1"/>
-                </a:solidFill>
-              </a:rPr>
-              <a:t>NoSQL</a:t>
-            </a:r>
-            <a:r>
               <a:rPr lang="fr-FR" dirty="0" smtClean="0">
                 <a:solidFill>
                   <a:schemeClr val="tx1"/>
                 </a:solidFill>
               </a:rPr>
-              <a:t> : Architecture fichiers JSON/XML</a:t>
-            </a:r>
-          </a:p>
-          <a:p>
-            <a:r>
-              <a:rPr lang="fr-FR" dirty="0" smtClean="0">
-                <a:solidFill>
-                  <a:schemeClr val="tx1"/>
-                </a:solidFill>
-              </a:rPr>
-              <a:t>Gestionnaire de version</a:t>
-            </a:r>
-          </a:p>
-          <a:p>
-            <a:pPr lvl="1"/>
-            <a:r>
-              <a:rPr lang="fr-FR" dirty="0" smtClean="0">
-                <a:solidFill>
-                  <a:schemeClr val="tx1"/>
-                </a:solidFill>
-              </a:rPr>
-              <a:t>Git en dépôt public sur </a:t>
-            </a:r>
-            <a:r>
-              <a:rPr lang="fr-FR" dirty="0" err="1" smtClean="0">
-                <a:solidFill>
-                  <a:schemeClr val="tx1"/>
-                </a:solidFill>
-              </a:rPr>
-              <a:t>GitHub</a:t>
-            </a:r>
-            <a:endParaRPr lang="fr-FR" dirty="0" smtClean="0">
-              <a:solidFill>
-                <a:schemeClr val="tx1"/>
-              </a:solidFill>
-            </a:endParaRPr>
+              <a:t>NoSQL : Architecture fichiers JSON/XML</a:t>
+            </a:r>
           </a:p>
           <a:p>
             <a:pPr lvl="1"/>
@@ -5670,15 +5572,9 @@
             <a:pPr lvl="2"/>
             <a:r>
               <a:rPr lang="fr-FR" b="1" dirty="0" smtClean="0"/>
-              <a:t>Licence</a:t>
-            </a:r>
-          </a:p>
-          <a:p>
-            <a:pPr lvl="2"/>
-            <a:r>
-              <a:rPr lang="fr-FR" b="1" dirty="0" smtClean="0"/>
               <a:t>YED</a:t>
             </a:r>
+            <a:endParaRPr lang="fr-FR" b="1" dirty="0" smtClean="0"/>
           </a:p>
           <a:p>
             <a:pPr lvl="2"/>
@@ -5771,6 +5667,34 @@
               <a:t>préparatoires</a:t>
             </a:r>
             <a:endParaRPr lang="fr-FR" cap="small" dirty="0"/>
+          </a:p>
+        </p:txBody>
+      </p:sp>
+      <p:sp>
+        <p:nvSpPr>
+          <p:cNvPr id="5" name="Espace réservé du texte 3"/>
+          <p:cNvSpPr>
+            <a:spLocks noGrp="1"/>
+          </p:cNvSpPr>
+          <p:nvPr>
+            <p:ph type="body" sz="quarter" idx="13"/>
+          </p:nvPr>
+        </p:nvSpPr>
+        <p:spPr>
+          <a:xfrm>
+            <a:off x="1100517" y="930584"/>
+            <a:ext cx="10034124" cy="380326"/>
+          </a:xfrm>
+        </p:spPr>
+        <p:txBody>
+          <a:bodyPr/>
+          <a:lstStyle/>
+          <a:p>
+            <a:r>
+              <a:rPr lang="fr-FR" dirty="0" smtClean="0"/>
+              <a:t>Développement</a:t>
+            </a:r>
+            <a:endParaRPr lang="fr-FR" dirty="0"/>
           </a:p>
         </p:txBody>
       </p:sp>
@@ -5823,6 +5747,267 @@
         </p:nvSpPr>
         <p:spPr/>
         <p:txBody>
+          <a:bodyPr/>
+          <a:lstStyle/>
+          <a:p>
+            <a:r>
+              <a:rPr lang="fr-FR" dirty="0"/>
+              <a:t>Choix technologiques</a:t>
+            </a:r>
+            <a:endParaRPr lang="en-US" dirty="0"/>
+          </a:p>
+        </p:txBody>
+      </p:sp>
+      <p:sp>
+        <p:nvSpPr>
+          <p:cNvPr id="3" name="Espace réservé du contenu 2"/>
+          <p:cNvSpPr>
+            <a:spLocks noGrp="1"/>
+          </p:cNvSpPr>
+          <p:nvPr>
+            <p:ph idx="1"/>
+          </p:nvPr>
+        </p:nvSpPr>
+        <p:spPr/>
+        <p:txBody>
+          <a:bodyPr/>
+          <a:lstStyle/>
+          <a:p>
+            <a:r>
+              <a:rPr lang="fr-FR" dirty="0"/>
+              <a:t>Gestionnaire de version</a:t>
+            </a:r>
+          </a:p>
+          <a:p>
+            <a:pPr lvl="1"/>
+            <a:r>
+              <a:rPr lang="fr-FR" dirty="0"/>
+              <a:t>Git en dépôt public sur </a:t>
+            </a:r>
+            <a:r>
+              <a:rPr lang="fr-FR" dirty="0" smtClean="0"/>
+              <a:t>GitHub</a:t>
+            </a:r>
+          </a:p>
+          <a:p>
+            <a:pPr lvl="1"/>
+            <a:r>
+              <a:rPr lang="fr-FR" dirty="0" smtClean="0"/>
+              <a:t>TODO : Licence</a:t>
+            </a:r>
+          </a:p>
+          <a:p>
+            <a:pPr marL="0" lvl="1" indent="0">
+              <a:buNone/>
+            </a:pPr>
+            <a:endParaRPr lang="fr-FR" dirty="0" smtClean="0"/>
+          </a:p>
+          <a:p>
+            <a:pPr marL="0" lvl="1" indent="0">
+              <a:buNone/>
+            </a:pPr>
+            <a:r>
+              <a:rPr lang="fr-FR" b="1" dirty="0" smtClean="0"/>
+              <a:t>Backlog + Scrumboard</a:t>
+            </a:r>
+            <a:endParaRPr lang="fr-FR" b="1" dirty="0"/>
+          </a:p>
+          <a:p>
+            <a:pPr lvl="1"/>
+            <a:r>
+              <a:rPr lang="fr-FR" dirty="0" smtClean="0"/>
+              <a:t>Installation de </a:t>
+            </a:r>
+            <a:r>
+              <a:rPr lang="fr-FR" dirty="0" err="1" smtClean="0"/>
+              <a:t>IceScrum</a:t>
+            </a:r>
+            <a:endParaRPr lang="fr-FR" dirty="0" smtClean="0"/>
+          </a:p>
+          <a:p>
+            <a:pPr lvl="2"/>
+            <a:r>
+              <a:rPr lang="fr-FR" dirty="0"/>
+              <a:t>Installé sur un serveur </a:t>
+            </a:r>
+            <a:r>
+              <a:rPr lang="fr-FR" dirty="0" smtClean="0"/>
+              <a:t>Web</a:t>
+            </a:r>
+          </a:p>
+          <a:p>
+            <a:pPr lvl="2"/>
+            <a:r>
+              <a:rPr lang="fr-FR" dirty="0" smtClean="0"/>
+              <a:t>Libre (GPLv3)</a:t>
+            </a:r>
+          </a:p>
+          <a:p>
+            <a:pPr marL="0" lvl="1" indent="0">
+              <a:buNone/>
+            </a:pPr>
+            <a:endParaRPr lang="fr-FR" dirty="0"/>
+          </a:p>
+          <a:p>
+            <a:pPr marL="0" lvl="1" indent="0">
+              <a:buNone/>
+            </a:pPr>
+            <a:endParaRPr lang="fr-FR" dirty="0"/>
+          </a:p>
+          <a:p>
+            <a:endParaRPr lang="en-US" dirty="0"/>
+          </a:p>
+        </p:txBody>
+      </p:sp>
+      <p:sp>
+        <p:nvSpPr>
+          <p:cNvPr id="4" name="Espace réservé du texte 3"/>
+          <p:cNvSpPr>
+            <a:spLocks noGrp="1"/>
+          </p:cNvSpPr>
+          <p:nvPr>
+            <p:ph type="body" sz="quarter" idx="13"/>
+          </p:nvPr>
+        </p:nvSpPr>
+        <p:spPr/>
+        <p:txBody>
+          <a:bodyPr/>
+          <a:lstStyle/>
+          <a:p>
+            <a:r>
+              <a:rPr lang="fr-FR" dirty="0" smtClean="0"/>
+              <a:t>Outils de gestion de projet</a:t>
+            </a:r>
+            <a:endParaRPr lang="fr-FR" dirty="0"/>
+          </a:p>
+        </p:txBody>
+      </p:sp>
+      <p:sp>
+        <p:nvSpPr>
+          <p:cNvPr id="5" name="Footer Placeholder 4"/>
+          <p:cNvSpPr>
+            <a:spLocks noGrp="1"/>
+          </p:cNvSpPr>
+          <p:nvPr>
+            <p:ph type="ftr" sz="quarter" idx="11"/>
+          </p:nvPr>
+        </p:nvSpPr>
+        <p:spPr>
+          <a:xfrm>
+            <a:off x="1347106" y="6366765"/>
+            <a:ext cx="10082893" cy="274320"/>
+          </a:xfrm>
+        </p:spPr>
+        <p:txBody>
+          <a:bodyPr/>
+          <a:lstStyle/>
+          <a:p>
+            <a:r>
+              <a:rPr lang="fr-FR" cap="small" dirty="0" smtClean="0"/>
+              <a:t>Introduction </a:t>
+            </a:r>
+            <a:r>
+              <a:rPr lang="fr-FR" cap="small" dirty="0"/>
+              <a:t>au </a:t>
+            </a:r>
+            <a:r>
+              <a:rPr lang="fr-FR" cap="small" dirty="0" smtClean="0"/>
+              <a:t>projet - </a:t>
+            </a:r>
+            <a:r>
+              <a:rPr lang="fr-FR" cap="small" dirty="0"/>
+              <a:t>Objectifs principaux </a:t>
+            </a:r>
+            <a:r>
+              <a:rPr lang="fr-FR" cap="small" dirty="0" smtClean="0"/>
+              <a:t>- </a:t>
+            </a:r>
+            <a:r>
+              <a:rPr lang="fr-FR" cap="small" dirty="0"/>
+              <a:t>Architecture </a:t>
+            </a:r>
+            <a:r>
+              <a:rPr lang="fr-FR" cap="small" dirty="0" smtClean="0"/>
+              <a:t>- </a:t>
+            </a:r>
+            <a:r>
+              <a:rPr lang="fr-FR" cap="small" dirty="0"/>
+              <a:t>Gestion du projet </a:t>
+            </a:r>
+            <a:r>
+              <a:rPr lang="fr-FR" cap="small" dirty="0" smtClean="0"/>
+              <a:t>- </a:t>
+            </a:r>
+            <a:r>
+              <a:rPr lang="fr-FR" u="sng" cap="small" dirty="0"/>
+              <a:t>Choix </a:t>
+            </a:r>
+            <a:r>
+              <a:rPr lang="fr-FR" u="sng" cap="small" dirty="0" smtClean="0"/>
+              <a:t>technologiques</a:t>
+            </a:r>
+            <a:r>
+              <a:rPr lang="en-US" cap="small" dirty="0"/>
+              <a:t> </a:t>
+            </a:r>
+            <a:r>
+              <a:rPr lang="en-US" cap="small" dirty="0" smtClean="0"/>
+              <a:t>- </a:t>
+            </a:r>
+            <a:r>
+              <a:rPr lang="fr-FR" cap="small" dirty="0"/>
+              <a:t>Travaux </a:t>
+            </a:r>
+            <a:r>
+              <a:rPr lang="fr-FR" cap="small" dirty="0" smtClean="0"/>
+              <a:t>préparatoires</a:t>
+            </a:r>
+            <a:endParaRPr lang="fr-FR" cap="small" dirty="0"/>
+          </a:p>
+        </p:txBody>
+      </p:sp>
+    </p:spTree>
+    <p:extLst>
+      <p:ext uri="{BB962C8B-B14F-4D97-AF65-F5344CB8AC3E}">
+        <p14:creationId xmlns:p14="http://schemas.microsoft.com/office/powerpoint/2010/main" val="1524246749"/>
+      </p:ext>
+    </p:extLst>
+  </p:cSld>
+  <p:clrMapOvr>
+    <a:masterClrMapping/>
+  </p:clrMapOvr>
+</p:sld>
+</file>
+
+<file path=ppt/slides/slide16.xml><?xml version="1.0" encoding="utf-8"?>
+<p:sld xmlns:a="http://schemas.openxmlformats.org/drawingml/2006/main" xmlns:r="http://schemas.openxmlformats.org/officeDocument/2006/relationships" xmlns:p="http://schemas.openxmlformats.org/presentationml/2006/main">
+  <p:cSld>
+    <p:spTree>
+      <p:nvGrpSpPr>
+        <p:cNvPr id="1" name=""/>
+        <p:cNvGrpSpPr/>
+        <p:nvPr/>
+      </p:nvGrpSpPr>
+      <p:grpSpPr>
+        <a:xfrm>
+          <a:off x="0" y="0"/>
+          <a:ext cx="0" cy="0"/>
+          <a:chOff x="0" y="0"/>
+          <a:chExt cx="0" cy="0"/>
+        </a:xfrm>
+      </p:grpSpPr>
+      <p:sp>
+        <p:nvSpPr>
+          <p:cNvPr id="2" name="Titre 1"/>
+          <p:cNvSpPr>
+            <a:spLocks noGrp="1"/>
+          </p:cNvSpPr>
+          <p:nvPr>
+            <p:ph type="title"/>
+          </p:nvPr>
+        </p:nvSpPr>
+        <p:spPr/>
+        <p:txBody>
           <a:bodyPr>
             <a:normAutofit fontScale="90000"/>
           </a:bodyPr>
@@ -5961,7 +6146,19 @@
                   <a:schemeClr val="tx1"/>
                 </a:solidFill>
               </a:rPr>
-              <a:t>Module d’interfaçage avec l’API Météo (</a:t>
+              <a:t>Module d’interfaçage avec </a:t>
+            </a:r>
+            <a:r>
+              <a:rPr lang="fr-FR" dirty="0" smtClean="0"/>
+              <a:t>une </a:t>
+            </a:r>
+            <a:r>
+              <a:rPr lang="fr-FR" dirty="0" smtClean="0">
+                <a:solidFill>
+                  <a:schemeClr val="tx1"/>
+                </a:solidFill>
+              </a:rPr>
+              <a:t>API Météo (</a:t>
             </a:r>
             <a:r>
               <a:rPr lang="fr-FR" dirty="0" err="1" smtClean="0">
@@ -6099,7 +6296,7 @@
 </p:sld>
 </file>
 
-<file path=ppt/slides/slide16.xml><?xml version="1.0" encoding="utf-8"?>
+<file path=ppt/slides/slide17.xml><?xml version="1.0" encoding="utf-8"?>
 <p:sld xmlns:a="http://schemas.openxmlformats.org/drawingml/2006/main" xmlns:r="http://schemas.openxmlformats.org/officeDocument/2006/relationships" xmlns:p="http://schemas.openxmlformats.org/presentationml/2006/main">
   <p:cSld>
     <p:spTree>
@@ -6295,16 +6492,13 @@
             </a:pPr>
             <a:r>
               <a:rPr lang="fr-FR" dirty="0" smtClean="0"/>
-              <a:t>Objectifs principaux  //</a:t>
-            </a:r>
-            <a:r>
-              <a:rPr lang="fr-FR" dirty="0" smtClean="0">
-                <a:solidFill>
-                  <a:schemeClr val="accent6"/>
-                </a:solidFill>
-              </a:rPr>
-              <a:t>User stories</a:t>
-            </a:r>
+              <a:t>Objectifs principaux </a:t>
+            </a:r>
+            <a:endParaRPr lang="fr-FR" dirty="0" smtClean="0">
+              <a:solidFill>
+                <a:schemeClr val="accent6"/>
+              </a:solidFill>
+            </a:endParaRPr>
           </a:p>
           <a:p>
             <a:pPr>
@@ -6368,20 +6562,12 @@
               <a:t>Gestion du projet //</a:t>
             </a:r>
             <a:r>
-              <a:rPr lang="fr-FR" dirty="0" err="1" smtClean="0">
-                <a:solidFill>
-                  <a:schemeClr val="accent6"/>
-                </a:solidFill>
-              </a:rPr>
-              <a:t>Scrum</a:t>
-            </a:r>
-            <a:r>
               <a:rPr lang="fr-FR" dirty="0" smtClean="0">
                 <a:solidFill>
                   <a:schemeClr val="accent6"/>
                 </a:solidFill>
               </a:rPr>
-              <a:t>  – Compétences techniques de chacun – Equipe</a:t>
+              <a:t>Scrum  – Compétences techniques de chacun – Equipe</a:t>
             </a:r>
           </a:p>
           <a:p>
@@ -6652,9 +6838,12 @@
               <a:t>Intelligence artificielle visant à simuler le comportement d’un utilisateur </a:t>
             </a:r>
             <a:r>
-              <a:rPr lang="fr-FR" dirty="0" err="1"/>
+              <a:rPr lang="fr-FR" dirty="0" err="1" smtClean="0"/>
               <a:t>Twitter</a:t>
             </a:r>
+            <a:endParaRPr lang="fr-FR" dirty="0" smtClean="0"/>
+          </a:p>
+          <a:p>
             <a:endParaRPr lang="fr-FR" dirty="0"/>
           </a:p>
           <a:p>
@@ -7194,8 +7383,18 @@
             <a:pPr lvl="1"/>
             <a:r>
               <a:rPr lang="fr-FR" dirty="0"/>
-              <a:t>Comprendre l’analyse sémantique</a:t>
-            </a:r>
+              <a:t>Comprendre l’analyse </a:t>
+            </a:r>
+            <a:r>
+              <a:rPr lang="fr-FR" dirty="0" smtClean="0"/>
+              <a:t>sémantique</a:t>
+            </a:r>
+          </a:p>
+          <a:p>
+            <a:pPr marL="0" lvl="1" indent="0">
+              <a:buNone/>
+            </a:pPr>
+            <a:endParaRPr lang="fr-FR" dirty="0"/>
           </a:p>
           <a:p>
             <a:r>
@@ -7221,8 +7420,18 @@
             <a:pPr lvl="1"/>
             <a:r>
               <a:rPr lang="fr-FR" dirty="0"/>
-              <a:t>Langage Java</a:t>
-            </a:r>
+              <a:t>Langage </a:t>
+            </a:r>
+            <a:r>
+              <a:rPr lang="fr-FR" dirty="0" smtClean="0"/>
+              <a:t>Java</a:t>
+            </a:r>
+          </a:p>
+          <a:p>
+            <a:pPr marL="0" lvl="1" indent="0">
+              <a:buNone/>
+            </a:pPr>
+            <a:endParaRPr lang="fr-FR" dirty="0"/>
           </a:p>
           <a:p>
             <a:r>
@@ -7517,13 +7726,8 @@
             <a:pPr lvl="1"/>
             <a:r>
               <a:rPr lang="fr-FR" dirty="0" smtClean="0"/>
-              <a:t>Travail avec la méthode </a:t>
-            </a:r>
-            <a:r>
-              <a:rPr lang="fr-FR" dirty="0" err="1" smtClean="0"/>
-              <a:t>Scrum</a:t>
-            </a:r>
-            <a:endParaRPr lang="fr-FR" dirty="0" smtClean="0"/>
+              <a:t>Travail avec la méthode Scrum</a:t>
+            </a:r>
           </a:p>
           <a:p>
             <a:pPr lvl="1"/>
@@ -7721,7 +7925,15 @@
             <a:pPr lvl="2"/>
             <a:r>
               <a:rPr lang="fr-FR" dirty="0" smtClean="0"/>
-              <a:t>Interface utilisateur</a:t>
+              <a:t>Interface utilisateur (</a:t>
+            </a:r>
+            <a:r>
+              <a:rPr lang="fr-FR" dirty="0" err="1" smtClean="0"/>
+              <a:t>Twitter</a:t>
+            </a:r>
+            <a:r>
+              <a:rPr lang="fr-FR" dirty="0" smtClean="0"/>
+              <a:t>)</a:t>
             </a:r>
           </a:p>
           <a:p>
@@ -7746,13 +7958,46 @@
             </a:r>
           </a:p>
           <a:p>
+            <a:pPr lvl="2"/>
+            <a:r>
+              <a:rPr lang="fr-FR" dirty="0"/>
+              <a:t>Interface utilisateur (</a:t>
+            </a:r>
+            <a:r>
+              <a:rPr lang="fr-FR" dirty="0" err="1" smtClean="0"/>
+              <a:t>Twitter</a:t>
+            </a:r>
+            <a:r>
+              <a:rPr lang="fr-FR" dirty="0"/>
+              <a:t>)</a:t>
+            </a:r>
+            <a:endParaRPr lang="fr-FR" dirty="0" smtClean="0"/>
+          </a:p>
+          <a:p>
+            <a:pPr marL="0" lvl="1" indent="0">
+              <a:buNone/>
+            </a:pPr>
+            <a:endParaRPr lang="fr-FR" dirty="0" smtClean="0"/>
+          </a:p>
+          <a:p>
             <a:r>
               <a:rPr lang="fr-FR" dirty="0" smtClean="0"/>
               <a:t>Les entrées est les sorties sont modulaires</a:t>
             </a:r>
           </a:p>
           <a:p>
-            <a:endParaRPr lang="fr-FR" dirty="0"/>
+            <a:pPr lvl="1"/>
+            <a:r>
+              <a:rPr lang="fr-FR" dirty="0" smtClean="0"/>
+              <a:t>Différentes sources d’information</a:t>
+            </a:r>
+          </a:p>
+          <a:p>
+            <a:pPr lvl="2"/>
+            <a:r>
+              <a:rPr lang="fr-FR" dirty="0" smtClean="0"/>
+              <a:t>Dépendent du contexte et des besoins de NARVIS</a:t>
+            </a:r>
           </a:p>
         </p:txBody>
       </p:sp>
@@ -8274,7 +8519,7 @@
         </p:blipFill>
         <p:spPr>
           <a:xfrm>
-            <a:off x="21579" y="2336816"/>
+            <a:off x="0" y="1546241"/>
             <a:ext cx="12192000" cy="3633439"/>
           </a:xfrm>
           <a:prstGeom prst="rect">

</xml_diff>

<commit_message>
Mise à jour de la présentation
</commit_message>
<xml_diff>
--- a/Presentation/PrésentationNarvis_2.pptx
+++ b/Presentation/PrésentationNarvis_2.pptx
@@ -122,7 +122,7 @@
   </p:defaultTextStyle>
   <p:extLst>
     <p:ext uri="{EFAFB233-063F-42B5-8137-9DF3F51BA10A}">
-      <p15:sldGuideLst xmlns="" xmlns:p15="http://schemas.microsoft.com/office/powerpoint/2012/main">
+      <p15:sldGuideLst xmlns:p15="http://schemas.microsoft.com/office/powerpoint/2012/main">
         <p15:guide id="1" orient="horz" pos="2160">
           <p15:clr>
             <a:srgbClr val="A4A3A4"/>
@@ -648,7 +648,7 @@
             <a:fld id="{B61BEF0D-F0BB-DE4B-95CE-6DB70DBA9567}" type="datetimeFigureOut">
               <a:rPr lang="en-US" smtClean="0"/>
               <a:pPr/>
-              <a:t>4/14/2015</a:t>
+              <a:t>4/15/2015</a:t>
             </a:fld>
             <a:endParaRPr lang="en-US" dirty="0"/>
           </a:p>
@@ -838,7 +838,7 @@
         </p:spPr>
         <p:txBody>
           <a:bodyPr vert="horz" lIns="9144" tIns="9144" rIns="9144" bIns="9144" rtlCol="0" anchor="ctr">
-            <a:normAutofit fontScale="85000" lnSpcReduction="10000"/>
+            <a:normAutofit fontScale="77500" lnSpcReduction="20000"/>
           </a:bodyPr>
           <a:lstStyle>
             <a:defPPr>
@@ -1466,7 +1466,7 @@
             <a:fld id="{B61BEF0D-F0BB-DE4B-95CE-6DB70DBA9567}" type="datetimeFigureOut">
               <a:rPr lang="en-US" smtClean="0"/>
               <a:pPr/>
-              <a:t>4/14/2015</a:t>
+              <a:t>4/15/2015</a:t>
             </a:fld>
             <a:endParaRPr lang="en-US" dirty="0"/>
           </a:p>
@@ -1743,7 +1743,7 @@
             <a:fld id="{B61BEF0D-F0BB-DE4B-95CE-6DB70DBA9567}" type="datetimeFigureOut">
               <a:rPr lang="en-US" smtClean="0"/>
               <a:pPr/>
-              <a:t>4/14/2015</a:t>
+              <a:t>4/15/2015</a:t>
             </a:fld>
             <a:endParaRPr lang="en-US" dirty="0"/>
           </a:p>
@@ -2241,7 +2241,7 @@
             <a:fld id="{B61BEF0D-F0BB-DE4B-95CE-6DB70DBA9567}" type="datetimeFigureOut">
               <a:rPr lang="en-US" smtClean="0"/>
               <a:pPr/>
-              <a:t>4/14/2015</a:t>
+              <a:t>4/15/2015</a:t>
             </a:fld>
             <a:endParaRPr lang="en-US" dirty="0"/>
           </a:p>
@@ -2364,7 +2364,7 @@
             <a:fld id="{B61BEF0D-F0BB-DE4B-95CE-6DB70DBA9567}" type="datetimeFigureOut">
               <a:rPr lang="en-US" smtClean="0"/>
               <a:pPr/>
-              <a:t>4/14/2015</a:t>
+              <a:t>4/15/2015</a:t>
             </a:fld>
             <a:endParaRPr lang="en-US" dirty="0"/>
           </a:p>
@@ -2464,7 +2464,7 @@
             <a:fld id="{B61BEF0D-F0BB-DE4B-95CE-6DB70DBA9567}" type="datetimeFigureOut">
               <a:rPr lang="en-US" smtClean="0"/>
               <a:pPr/>
-              <a:t>4/14/2015</a:t>
+              <a:t>4/15/2015</a:t>
             </a:fld>
             <a:endParaRPr lang="en-US" dirty="0"/>
           </a:p>
@@ -2904,7 +2904,7 @@
             <a:fld id="{B61BEF0D-F0BB-DE4B-95CE-6DB70DBA9567}" type="datetimeFigureOut">
               <a:rPr lang="en-US" smtClean="0"/>
               <a:pPr/>
-              <a:t>4/14/2015</a:t>
+              <a:t>4/15/2015</a:t>
             </a:fld>
             <a:endParaRPr lang="en-US" dirty="0"/>
           </a:p>
@@ -4287,7 +4287,7 @@
             <a:fld id="{B61BEF0D-F0BB-DE4B-95CE-6DB70DBA9567}" type="datetimeFigureOut">
               <a:rPr lang="en-US" smtClean="0"/>
               <a:pPr/>
-              <a:t>4/14/2015</a:t>
+              <a:t>4/15/2015</a:t>
             </a:fld>
             <a:endParaRPr lang="en-US" dirty="0"/>
           </a:p>
@@ -4376,21 +4376,8 @@
                   <a:schemeClr val="tx1"/>
                 </a:solidFill>
               </a:rPr>
-              <a:t>Utilisation </a:t>
-            </a:r>
-            <a:r>
-              <a:rPr lang="fr-FR" dirty="0" smtClean="0">
-                <a:solidFill>
-                  <a:schemeClr val="tx1"/>
-                </a:solidFill>
-              </a:rPr>
-              <a:t>du framework d’organisation Scrum</a:t>
-            </a:r>
-            <a:endParaRPr lang="fr-FR" dirty="0" smtClean="0">
-              <a:solidFill>
-                <a:schemeClr val="tx1"/>
-              </a:solidFill>
-            </a:endParaRPr>
+              <a:t>Utilisation du framework d’organisation Scrum</a:t>
+            </a:r>
           </a:p>
           <a:p>
             <a:endParaRPr lang="fr-FR" dirty="0" smtClean="0">
@@ -4505,7 +4492,7 @@
           <a:p>
             <a:pPr lvl="1"/>
             <a:r>
-              <a:rPr lang="fr-FR" smtClean="0">
+              <a:rPr lang="fr-FR" dirty="0" err="1" smtClean="0">
                 <a:solidFill>
                   <a:schemeClr val="tx1"/>
                 </a:solidFill>
@@ -4528,11 +4515,6 @@
               </a:rPr>
               <a:t>Scrumboard</a:t>
             </a:r>
-            <a:endParaRPr lang="fr-FR" dirty="0" smtClean="0">
-              <a:solidFill>
-                <a:schemeClr val="tx1"/>
-              </a:solidFill>
-            </a:endParaRPr>
           </a:p>
           <a:p>
             <a:pPr lvl="1"/>
@@ -5152,7 +5134,11 @@
           <a:p>
             <a:r>
               <a:rPr lang="fr-FR" dirty="0" smtClean="0"/>
-              <a:t>TOTO /: Détailler les </a:t>
+              <a:t>TODO : </a:t>
+            </a:r>
+            <a:r>
+              <a:rPr lang="fr-FR" dirty="0" smtClean="0"/>
+              <a:t>Détailler les </a:t>
             </a:r>
             <a:r>
               <a:rPr lang="fr-FR" dirty="0" err="1" smtClean="0"/>
@@ -5347,25 +5333,106 @@
           <a:bodyPr/>
           <a:lstStyle/>
           <a:p>
-            <a:endParaRPr lang="fr-FR" dirty="0" smtClean="0"/>
-          </a:p>
-          <a:p>
-            <a:r>
-              <a:rPr lang="fr-FR" dirty="0" err="1" smtClean="0"/>
-              <a:t>Too</a:t>
-            </a:r>
             <a:r>
               <a:rPr lang="fr-FR" dirty="0" smtClean="0"/>
-              <a:t> : </a:t>
-            </a:r>
-          </a:p>
-          <a:p>
+              <a:t>Charles COQUE :</a:t>
+            </a:r>
+          </a:p>
+          <a:p>
+            <a:pPr lvl="1"/>
             <a:r>
               <a:rPr lang="fr-FR" dirty="0" smtClean="0"/>
-              <a:t>Trouver ce qui reste à discuter pour la gestion projet</a:t>
+              <a:t>Programmation Java</a:t>
             </a:r>
             <a:endParaRPr lang="fr-FR" dirty="0"/>
           </a:p>
+          <a:p>
+            <a:pPr lvl="1"/>
+            <a:r>
+              <a:rPr lang="fr-FR" dirty="0" smtClean="0"/>
+              <a:t>TODO : Liste des compétences utiles pour le projet</a:t>
+            </a:r>
+            <a:endParaRPr lang="fr-FR" dirty="0"/>
+          </a:p>
+          <a:p>
+            <a:r>
+              <a:rPr lang="fr-FR" dirty="0" smtClean="0"/>
+              <a:t>Alban BONNET :</a:t>
+            </a:r>
+          </a:p>
+          <a:p>
+            <a:pPr lvl="1"/>
+            <a:r>
+              <a:rPr lang="fr-FR" dirty="0"/>
+              <a:t>Programmation Java</a:t>
+            </a:r>
+          </a:p>
+          <a:p>
+            <a:pPr lvl="1"/>
+            <a:r>
+              <a:rPr lang="fr-FR" dirty="0"/>
+              <a:t>TODO : Liste des compétences utiles pour le </a:t>
+            </a:r>
+            <a:r>
+              <a:rPr lang="fr-FR" dirty="0" smtClean="0"/>
+              <a:t>projet</a:t>
+            </a:r>
+            <a:endParaRPr lang="fr-FR" dirty="0"/>
+          </a:p>
+          <a:p>
+            <a:r>
+              <a:rPr lang="fr-FR" dirty="0" smtClean="0"/>
+              <a:t>Raphaël BLIN</a:t>
+            </a:r>
+            <a:r>
+              <a:rPr lang="fr-FR" dirty="0"/>
+              <a:t> </a:t>
+            </a:r>
+            <a:r>
+              <a:rPr lang="fr-FR" dirty="0" smtClean="0"/>
+              <a:t>:</a:t>
+            </a:r>
+          </a:p>
+          <a:p>
+            <a:pPr lvl="1"/>
+            <a:r>
+              <a:rPr lang="fr-FR" dirty="0"/>
+              <a:t>Programmation Java</a:t>
+            </a:r>
+          </a:p>
+          <a:p>
+            <a:pPr lvl="1"/>
+            <a:r>
+              <a:rPr lang="fr-FR" dirty="0" smtClean="0"/>
+              <a:t>Modélisation de données</a:t>
+            </a:r>
+            <a:endParaRPr lang="fr-FR" dirty="0"/>
+          </a:p>
+          <a:p>
+            <a:r>
+              <a:rPr lang="fr-FR" dirty="0" smtClean="0"/>
+              <a:t>Yoann LE MOUËL :</a:t>
+            </a:r>
+          </a:p>
+          <a:p>
+            <a:pPr lvl="1"/>
+            <a:r>
+              <a:rPr lang="fr-FR" dirty="0"/>
+              <a:t>Programmation Java</a:t>
+            </a:r>
+          </a:p>
+          <a:p>
+            <a:pPr lvl="1"/>
+            <a:r>
+              <a:rPr lang="fr-FR" dirty="0"/>
+              <a:t>TODO : Liste des compétences utiles pour le </a:t>
+            </a:r>
+            <a:r>
+              <a:rPr lang="fr-FR" dirty="0" smtClean="0"/>
+              <a:t>projet</a:t>
+            </a:r>
+            <a:endParaRPr lang="fr-FR" dirty="0"/>
+          </a:p>
         </p:txBody>
       </p:sp>
       <p:sp>
@@ -5383,7 +5450,11 @@
           <a:bodyPr/>
           <a:lstStyle/>
           <a:p>
-            <a:endParaRPr lang="fr-FR"/>
+            <a:r>
+              <a:rPr lang="fr-FR" dirty="0" smtClean="0"/>
+              <a:t>Compétences techniques de l’équipe</a:t>
+            </a:r>
+            <a:endParaRPr lang="fr-FR" dirty="0"/>
           </a:p>
         </p:txBody>
       </p:sp>
@@ -5574,7 +5645,6 @@
               <a:rPr lang="fr-FR" b="1" dirty="0" smtClean="0"/>
               <a:t>YED</a:t>
             </a:r>
-            <a:endParaRPr lang="fr-FR" b="1" dirty="0" smtClean="0"/>
           </a:p>
           <a:p>
             <a:pPr lvl="2"/>
@@ -5819,8 +5889,8 @@
               <a:t>Installation de </a:t>
             </a:r>
             <a:r>
-              <a:rPr lang="fr-FR" dirty="0" err="1" smtClean="0"/>
-              <a:t>IceScrum</a:t>
+              <a:rPr lang="fr-FR" dirty="0" smtClean="0"/>
+              <a:t>« iceScrum »</a:t>
             </a:r>
             <a:endParaRPr lang="fr-FR" dirty="0" smtClean="0"/>
           </a:p>
@@ -6122,21 +6192,8 @@
                   <a:schemeClr val="tx1"/>
                 </a:solidFill>
               </a:rPr>
-              <a:t>Module d’interfaçage avec l’API </a:t>
-            </a:r>
-            <a:r>
-              <a:rPr lang="fr-FR" dirty="0" err="1" smtClean="0">
-                <a:solidFill>
-                  <a:schemeClr val="tx1"/>
-                </a:solidFill>
-              </a:rPr>
-              <a:t>Twitter</a:t>
-            </a:r>
-            <a:endParaRPr lang="fr-FR" dirty="0" smtClean="0">
-              <a:solidFill>
-                <a:schemeClr val="tx1"/>
-              </a:solidFill>
-            </a:endParaRPr>
+              <a:t>Module d’interfaçage avec l’API Twitter</a:t>
+            </a:r>
           </a:p>
           <a:p>
             <a:pPr lvl="1"/>
@@ -6449,23 +6506,11 @@
             </a:pPr>
             <a:r>
               <a:rPr lang="fr-FR" dirty="0" smtClean="0"/>
-              <a:t>Introduction au projet</a:t>
-            </a:r>
-            <a:r>
-              <a:rPr lang="fr-FR" dirty="0"/>
-              <a:t> </a:t>
+              <a:t>Introduction au </a:t>
             </a:r>
             <a:r>
               <a:rPr lang="fr-FR" dirty="0" smtClean="0"/>
-              <a:t>//</a:t>
-            </a:r>
-            <a:r>
-              <a:rPr lang="fr-FR" dirty="0" smtClean="0">
-                <a:solidFill>
-                  <a:schemeClr val="accent6"/>
-                </a:solidFill>
-              </a:rPr>
-              <a:t>Parler de nos motivations – Explications bot twitter : FAIT</a:t>
+              <a:t>projet</a:t>
             </a:r>
           </a:p>
           <a:p>
@@ -6524,15 +6569,7 @@
             </a:pPr>
             <a:r>
               <a:rPr lang="fr-FR" dirty="0" smtClean="0"/>
-              <a:t>Architecture //</a:t>
-            </a:r>
-            <a:r>
-              <a:rPr lang="fr-FR" dirty="0" smtClean="0">
-                <a:solidFill>
-                  <a:schemeClr val="accent6"/>
-                </a:solidFill>
-              </a:rPr>
-              <a:t>Définition des modules, </a:t>
+              <a:t>Architecture</a:t>
             </a:r>
           </a:p>
           <a:p>
@@ -6617,29 +6654,12 @@
             </a:pPr>
             <a:r>
               <a:rPr lang="fr-FR" dirty="0" smtClean="0"/>
-              <a:t>Travaux préparatoires</a:t>
-            </a:r>
-            <a:endParaRPr lang="fr-FR" dirty="0"/>
-          </a:p>
-          <a:p>
-            <a:pPr marL="0" indent="0">
-              <a:buNone/>
-            </a:pPr>
-            <a:r>
-              <a:rPr lang="fr-FR" dirty="0" smtClean="0">
-                <a:solidFill>
-                  <a:schemeClr val="accent6"/>
-                </a:solidFill>
-              </a:rPr>
-              <a:t>//METTRE LE PLAN EN BAS DE PAGE</a:t>
-            </a:r>
-            <a:endParaRPr lang="fr-FR" dirty="0">
-              <a:solidFill>
-                <a:schemeClr val="accent6"/>
-              </a:solidFill>
-            </a:endParaRPr>
-          </a:p>
-          <a:p>
+              <a:t>Travaux </a:t>
+            </a:r>
+            <a:r>
+              <a:rPr lang="fr-FR" dirty="0" smtClean="0"/>
+              <a:t>préparatoires</a:t>
+            </a:r>
             <a:endParaRPr lang="fr-FR" dirty="0"/>
           </a:p>
         </p:txBody>
@@ -6856,12 +6876,12 @@
           <a:p>
             <a:pPr lvl="2"/>
             <a:r>
-              <a:rPr lang="fr-FR" dirty="0" err="1"/>
-              <a:t>Le_Marsu</a:t>
+              <a:rPr lang="fr-FR" dirty="0" smtClean="0"/>
+              <a:t>Le_Marsu </a:t>
             </a:r>
             <a:r>
               <a:rPr lang="fr-FR" dirty="0"/>
-              <a:t> (</a:t>
+              <a:t>(</a:t>
             </a:r>
             <a:r>
               <a:rPr lang="fr-FR" dirty="0">
@@ -6877,12 +6897,8 @@
           <a:p>
             <a:pPr lvl="2"/>
             <a:r>
-              <a:rPr lang="fr-FR" dirty="0" err="1"/>
-              <a:t>EnjoyTheFilm</a:t>
-            </a:r>
-            <a:r>
               <a:rPr lang="fr-FR" dirty="0"/>
-              <a:t> (</a:t>
+              <a:t>EnjoyTheFilm (</a:t>
             </a:r>
             <a:r>
               <a:rPr lang="fr-FR" dirty="0">
@@ -6898,12 +6914,8 @@
           <a:p>
             <a:pPr lvl="2"/>
             <a:r>
-              <a:rPr lang="fr-FR" dirty="0" err="1"/>
-              <a:t>UrbanDictionnary</a:t>
-            </a:r>
-            <a:r>
               <a:rPr lang="fr-FR" dirty="0"/>
-              <a:t> (</a:t>
+              <a:t>UrbanDictionnary (</a:t>
             </a:r>
             <a:r>
               <a:rPr lang="fr-FR" dirty="0">
@@ -7715,6 +7727,10 @@
               <a:rPr lang="fr-FR" dirty="0" smtClean="0"/>
               <a:t>réponse</a:t>
             </a:r>
+          </a:p>
+          <a:p>
+            <a:pPr lvl="1"/>
+            <a:endParaRPr lang="fr-FR" dirty="0" smtClean="0"/>
           </a:p>
           <a:p>
             <a:r>

</xml_diff>

<commit_message>
Mise à jour de la Présentation. Modification des User Stories +  Intégration du schéma InputOutput + Ajout d'images + Modification de la partie Gestion de Projet.
</commit_message>
<xml_diff>
--- a/Presentation/PrésentationNarvis_2.pptx
+++ b/Presentation/PrésentationNarvis_2.pptx
@@ -8,20 +8,19 @@
     <p:sldId id="256" r:id="rId2"/>
     <p:sldId id="257" r:id="rId3"/>
     <p:sldId id="271" r:id="rId4"/>
-    <p:sldId id="259" r:id="rId5"/>
-    <p:sldId id="272" r:id="rId6"/>
-    <p:sldId id="261" r:id="rId7"/>
-    <p:sldId id="263" r:id="rId8"/>
-    <p:sldId id="266" r:id="rId9"/>
-    <p:sldId id="265" r:id="rId10"/>
-    <p:sldId id="267" r:id="rId11"/>
+    <p:sldId id="272" r:id="rId5"/>
+    <p:sldId id="261" r:id="rId6"/>
+    <p:sldId id="263" r:id="rId7"/>
+    <p:sldId id="266" r:id="rId8"/>
+    <p:sldId id="265" r:id="rId9"/>
+    <p:sldId id="267" r:id="rId10"/>
+    <p:sldId id="277" r:id="rId11"/>
     <p:sldId id="262" r:id="rId12"/>
-    <p:sldId id="274" r:id="rId13"/>
-    <p:sldId id="275" r:id="rId14"/>
-    <p:sldId id="268" r:id="rId15"/>
-    <p:sldId id="276" r:id="rId16"/>
-    <p:sldId id="269" r:id="rId17"/>
-    <p:sldId id="273" r:id="rId18"/>
+    <p:sldId id="278" r:id="rId13"/>
+    <p:sldId id="268" r:id="rId14"/>
+    <p:sldId id="276" r:id="rId15"/>
+    <p:sldId id="269" r:id="rId16"/>
+    <p:sldId id="273" r:id="rId17"/>
   </p:sldIdLst>
   <p:sldSz cx="12192000" cy="6858000"/>
   <p:notesSz cx="6858000" cy="9144000"/>
@@ -122,7 +121,7 @@
   </p:defaultTextStyle>
   <p:extLst>
     <p:ext uri="{EFAFB233-063F-42B5-8137-9DF3F51BA10A}">
-      <p15:sldGuideLst xmlns:p15="http://schemas.microsoft.com/office/powerpoint/2012/main">
+      <p15:sldGuideLst xmlns:p15="http://schemas.microsoft.com/office/powerpoint/2012/main" xmlns="">
         <p15:guide id="1" orient="horz" pos="2160">
           <p15:clr>
             <a:srgbClr val="A4A3A4"/>
@@ -838,7 +837,7 @@
         </p:spPr>
         <p:txBody>
           <a:bodyPr vert="horz" lIns="9144" tIns="9144" rIns="9144" bIns="9144" rtlCol="0" anchor="ctr">
-            <a:normAutofit fontScale="77500" lnSpcReduction="20000"/>
+            <a:normAutofit fontScale="85000" lnSpcReduction="10000"/>
           </a:bodyPr>
           <a:lstStyle>
             <a:defPPr>
@@ -4342,187 +4341,127 @@
         </p:nvSpPr>
         <p:spPr/>
         <p:txBody>
-          <a:bodyPr>
-            <a:normAutofit/>
-          </a:bodyPr>
-          <a:lstStyle/>
-          <a:p>
-            <a:r>
-              <a:rPr lang="fr-FR" dirty="0" smtClean="0"/>
-              <a:t>Gestion de projet</a:t>
-            </a:r>
-            <a:endParaRPr lang="fr-FR" sz="2500" dirty="0"/>
-          </a:p>
-        </p:txBody>
-      </p:sp>
-      <p:sp>
-        <p:nvSpPr>
-          <p:cNvPr id="3" name="Espace réservé du contenu 2"/>
-          <p:cNvSpPr>
-            <a:spLocks noGrp="1"/>
-          </p:cNvSpPr>
-          <p:nvPr>
-            <p:ph idx="1"/>
-          </p:nvPr>
-        </p:nvSpPr>
-        <p:spPr/>
-        <p:txBody>
           <a:bodyPr/>
           <a:lstStyle/>
           <a:p>
             <a:r>
-              <a:rPr lang="fr-FR" dirty="0" smtClean="0">
-                <a:solidFill>
-                  <a:schemeClr val="tx1"/>
-                </a:solidFill>
-              </a:rPr>
-              <a:t>Utilisation du framework d’organisation Scrum</a:t>
-            </a:r>
-          </a:p>
-          <a:p>
-            <a:endParaRPr lang="fr-FR" dirty="0" smtClean="0">
-              <a:solidFill>
-                <a:schemeClr val="tx1"/>
-              </a:solidFill>
-            </a:endParaRPr>
-          </a:p>
-          <a:p>
-            <a:r>
-              <a:rPr lang="fr-FR" dirty="0" smtClean="0">
-                <a:solidFill>
-                  <a:schemeClr val="tx1"/>
-                </a:solidFill>
-              </a:rPr>
-              <a:t>Constitution de l’équipe</a:t>
-            </a:r>
+              <a:rPr lang="fr-FR" dirty="0"/>
+              <a:t>Gestion de projet</a:t>
+            </a:r>
+          </a:p>
+        </p:txBody>
+      </p:sp>
+      <p:sp>
+        <p:nvSpPr>
+          <p:cNvPr id="3" name="Espace réservé du contenu 2"/>
+          <p:cNvSpPr>
+            <a:spLocks noGrp="1"/>
+          </p:cNvSpPr>
+          <p:nvPr>
+            <p:ph idx="1"/>
+          </p:nvPr>
+        </p:nvSpPr>
+        <p:spPr>
+          <a:xfrm>
+            <a:off x="1097280" y="1479493"/>
+            <a:ext cx="10512334" cy="4306311"/>
+          </a:xfrm>
+        </p:spPr>
+        <p:txBody>
+          <a:bodyPr/>
+          <a:lstStyle/>
+          <a:p>
+            <a:r>
+              <a:rPr lang="fr-FR" dirty="0"/>
+              <a:t>Outils à mettre en </a:t>
+            </a:r>
+            <a:r>
+              <a:rPr lang="fr-FR" dirty="0" smtClean="0"/>
+              <a:t>place</a:t>
+            </a:r>
+            <a:endParaRPr lang="fr-FR" dirty="0"/>
           </a:p>
           <a:p>
             <a:pPr lvl="1"/>
             <a:r>
-              <a:rPr lang="fr-FR" u="sng" dirty="0" smtClean="0">
-                <a:solidFill>
-                  <a:schemeClr val="tx1"/>
-                </a:solidFill>
-              </a:rPr>
-              <a:t>Product </a:t>
-            </a:r>
-            <a:r>
-              <a:rPr lang="fr-FR" u="sng" dirty="0" err="1" smtClean="0">
-                <a:solidFill>
-                  <a:schemeClr val="tx1"/>
-                </a:solidFill>
-              </a:rPr>
-              <a:t>Owner</a:t>
-            </a:r>
-            <a:r>
-              <a:rPr lang="fr-FR" u="sng" dirty="0" smtClean="0">
-                <a:solidFill>
-                  <a:schemeClr val="tx1"/>
-                </a:solidFill>
-              </a:rPr>
-              <a:t> </a:t>
-            </a:r>
-            <a:r>
-              <a:rPr lang="fr-FR" dirty="0" smtClean="0">
-                <a:solidFill>
-                  <a:schemeClr val="tx1"/>
-                </a:solidFill>
-              </a:rPr>
-              <a:t>: Alban BONNET</a:t>
+              <a:rPr lang="fr-FR" dirty="0" smtClean="0"/>
+              <a:t>Backlog Produit</a:t>
+            </a:r>
+          </a:p>
+          <a:p>
+            <a:pPr lvl="2"/>
+            <a:r>
+              <a:rPr lang="fr-FR" dirty="0" smtClean="0"/>
+              <a:t>Contient les User Stories</a:t>
+            </a:r>
+          </a:p>
+          <a:p>
+            <a:pPr lvl="2"/>
+            <a:r>
+              <a:rPr lang="fr-FR" dirty="0" smtClean="0"/>
+              <a:t>Ordonnées par ordre de priorité</a:t>
             </a:r>
           </a:p>
           <a:p>
             <a:pPr lvl="1"/>
-            <a:r>
-              <a:rPr lang="fr-FR" u="sng" dirty="0" smtClean="0">
-                <a:solidFill>
-                  <a:schemeClr val="tx1"/>
-                </a:solidFill>
-              </a:rPr>
-              <a:t>Scrum Master </a:t>
-            </a:r>
-            <a:r>
-              <a:rPr lang="fr-FR" dirty="0" smtClean="0">
-                <a:solidFill>
-                  <a:schemeClr val="tx1"/>
-                </a:solidFill>
-              </a:rPr>
-              <a:t>: Yoann LE MOUËL </a:t>
-            </a:r>
+            <a:endParaRPr lang="fr-FR" dirty="0"/>
           </a:p>
           <a:p>
             <a:pPr lvl="1"/>
             <a:r>
-              <a:rPr lang="fr-FR" u="sng" dirty="0" smtClean="0">
-                <a:solidFill>
-                  <a:schemeClr val="tx1"/>
-                </a:solidFill>
-              </a:rPr>
-              <a:t>Développeurs</a:t>
-            </a:r>
-            <a:r>
-              <a:rPr lang="fr-FR" dirty="0" smtClean="0">
-                <a:solidFill>
-                  <a:schemeClr val="tx1"/>
-                </a:solidFill>
-              </a:rPr>
-              <a:t> : Raphaël BLIN, Charles COQUE</a:t>
-            </a:r>
-          </a:p>
-          <a:p>
-            <a:pPr marL="0" lvl="1" indent="0">
+              <a:rPr lang="fr-FR" dirty="0" smtClean="0"/>
+              <a:t>Backlog de sprint</a:t>
+            </a:r>
+          </a:p>
+          <a:p>
+            <a:pPr lvl="2"/>
+            <a:r>
+              <a:rPr lang="fr-FR" dirty="0" smtClean="0"/>
+              <a:t>Contient les tâches</a:t>
+            </a:r>
+          </a:p>
+          <a:p>
+            <a:pPr lvl="2"/>
+            <a:r>
+              <a:rPr lang="fr-FR" dirty="0"/>
+              <a:t>O</a:t>
+            </a:r>
+            <a:r>
+              <a:rPr lang="fr-FR" dirty="0" smtClean="0"/>
+              <a:t>rdonnées </a:t>
+            </a:r>
+            <a:r>
+              <a:rPr lang="fr-FR" dirty="0"/>
+              <a:t>par ordre de </a:t>
+            </a:r>
+            <a:r>
+              <a:rPr lang="fr-FR" dirty="0" smtClean="0"/>
+              <a:t>priorité</a:t>
+            </a:r>
+          </a:p>
+          <a:p>
+            <a:pPr marL="237744" lvl="2" indent="0">
               <a:buNone/>
             </a:pPr>
-            <a:endParaRPr lang="fr-FR" dirty="0" smtClean="0">
-              <a:solidFill>
-                <a:schemeClr val="tx1"/>
-              </a:solidFill>
-            </a:endParaRPr>
-          </a:p>
-          <a:p>
-            <a:r>
-              <a:rPr lang="fr-FR" dirty="0" smtClean="0">
-                <a:solidFill>
-                  <a:schemeClr val="tx1"/>
-                </a:solidFill>
-              </a:rPr>
-              <a:t>Outils à mettre en place</a:t>
-            </a:r>
+            <a:endParaRPr lang="fr-FR" dirty="0"/>
           </a:p>
           <a:p>
             <a:pPr lvl="1"/>
             <a:r>
-              <a:rPr lang="fr-FR" dirty="0" err="1" smtClean="0">
-                <a:solidFill>
-                  <a:schemeClr val="tx1"/>
-                </a:solidFill>
-              </a:rPr>
-              <a:t>Backlog</a:t>
-            </a:r>
-            <a:endParaRPr lang="fr-FR" dirty="0">
-              <a:solidFill>
-                <a:schemeClr val="tx1"/>
-              </a:solidFill>
-            </a:endParaRPr>
-          </a:p>
-          <a:p>
-            <a:pPr lvl="1"/>
-            <a:r>
-              <a:rPr lang="fr-FR" dirty="0" smtClean="0">
-                <a:solidFill>
-                  <a:schemeClr val="tx1"/>
-                </a:solidFill>
-              </a:rPr>
+              <a:rPr lang="fr-FR" dirty="0" smtClean="0"/>
               <a:t>Scrumboard</a:t>
             </a:r>
           </a:p>
           <a:p>
-            <a:pPr lvl="1"/>
-            <a:endParaRPr lang="fr-FR" dirty="0">
-              <a:solidFill>
-                <a:schemeClr val="tx1"/>
-              </a:solidFill>
-            </a:endParaRPr>
+            <a:pPr lvl="2"/>
+            <a:r>
+              <a:rPr lang="fr-FR" dirty="0" smtClean="0"/>
+              <a:t>Permet de suivre l’avancement des tâches</a:t>
+            </a:r>
+          </a:p>
+          <a:p>
+            <a:pPr lvl="2"/>
+            <a:endParaRPr lang="fr-FR" dirty="0"/>
           </a:p>
         </p:txBody>
       </p:sp>
@@ -4536,20 +4475,16 @@
             <p:ph type="body" sz="quarter" idx="13"/>
           </p:nvPr>
         </p:nvSpPr>
-        <p:spPr>
-          <a:xfrm>
-            <a:off x="1100517" y="930584"/>
-            <a:ext cx="10034124" cy="380326"/>
-          </a:xfrm>
-        </p:spPr>
+        <p:spPr/>
         <p:txBody>
           <a:bodyPr/>
           <a:lstStyle/>
           <a:p>
             <a:r>
-              <a:rPr lang="fr-FR" dirty="0"/>
-              <a:t>Méthode agile</a:t>
-            </a:r>
+              <a:rPr lang="fr-FR" dirty="0" smtClean="0"/>
+              <a:t>Mise en place de Scrum</a:t>
+            </a:r>
+            <a:endParaRPr lang="fr-FR" dirty="0"/>
           </a:p>
         </p:txBody>
       </p:sp>
@@ -4644,20 +4579,13 @@
     </p:spTree>
     <p:extLst>
       <p:ext uri="{BB962C8B-B14F-4D97-AF65-F5344CB8AC3E}">
-        <p14:creationId xmlns:p14="http://schemas.microsoft.com/office/powerpoint/2010/main" val="2824142541"/>
+        <p14:creationId xmlns:p14="http://schemas.microsoft.com/office/powerpoint/2010/main" val="2789098642"/>
       </p:ext>
     </p:extLst>
   </p:cSld>
   <p:clrMapOvr>
     <a:masterClrMapping/>
   </p:clrMapOvr>
-  <p:timing>
-    <p:tnLst>
-      <p:par>
-        <p:cTn id="1" dur="indefinite" restart="never" nodeType="tmRoot"/>
-      </p:par>
-    </p:tnLst>
-  </p:timing>
 </p:sld>
 </file>
 
@@ -4720,224 +4648,216 @@
           </a:bodyPr>
           <a:lstStyle/>
           <a:p>
-            <a:r>
-              <a:rPr lang="fr-FR" dirty="0"/>
-              <a:t>Un utilisateur tweet :  @</a:t>
-            </a:r>
-            <a:r>
-              <a:rPr lang="fr-FR" dirty="0" err="1"/>
+            <a:pPr lvl="1"/>
+            <a:r>
+              <a:rPr lang="fr-FR" b="1" dirty="0" smtClean="0"/>
+              <a:t>En tant qu’utilisateur Twitter, je peux demander la météo pour une ville à une date. Ainsi NARVIS me répondra en indiquant la température et le taux d’ensoleillement .</a:t>
+            </a:r>
+          </a:p>
+          <a:p>
+            <a:pPr marL="685800" lvl="4" indent="0">
+              <a:buNone/>
+            </a:pPr>
+            <a:r>
+              <a:rPr lang="fr-FR" sz="1400" b="0" i="1" dirty="0" smtClean="0"/>
+              <a:t>Un </a:t>
+            </a:r>
+            <a:r>
+              <a:rPr lang="fr-FR" sz="1400" b="0" i="1" dirty="0"/>
+              <a:t>utilisateur tweet :  @</a:t>
+            </a:r>
+            <a:r>
+              <a:rPr lang="fr-FR" sz="1400" b="0" i="1" dirty="0" err="1"/>
               <a:t>Narvis</a:t>
             </a:r>
             <a:r>
-              <a:rPr lang="fr-FR" dirty="0"/>
+              <a:rPr lang="fr-FR" sz="1400" b="0" i="1" dirty="0"/>
               <a:t> </a:t>
             </a:r>
             <a:r>
-              <a:rPr lang="fr-FR" dirty="0" err="1"/>
+              <a:rPr lang="fr-FR" sz="1400" b="0" i="1" dirty="0" err="1"/>
               <a:t>What</a:t>
             </a:r>
             <a:r>
-              <a:rPr lang="fr-FR" dirty="0"/>
+              <a:rPr lang="fr-FR" sz="1400" b="0" i="1" dirty="0"/>
               <a:t> </a:t>
             </a:r>
             <a:r>
-              <a:rPr lang="fr-FR" dirty="0" err="1"/>
+              <a:rPr lang="fr-FR" sz="1400" b="0" i="1" dirty="0" err="1"/>
               <a:t>is</a:t>
             </a:r>
             <a:r>
-              <a:rPr lang="fr-FR" dirty="0"/>
+              <a:rPr lang="fr-FR" sz="1400" b="0" i="1" dirty="0"/>
               <a:t> the </a:t>
             </a:r>
             <a:r>
-              <a:rPr lang="fr-FR" dirty="0" err="1"/>
+              <a:rPr lang="fr-FR" sz="1400" b="0" i="1" dirty="0" err="1"/>
               <a:t>weather</a:t>
             </a:r>
             <a:r>
-              <a:rPr lang="fr-FR" dirty="0"/>
+              <a:rPr lang="fr-FR" sz="1400" b="0" i="1" dirty="0"/>
               <a:t> in </a:t>
             </a:r>
             <a:r>
-              <a:rPr lang="fr-FR" dirty="0" err="1"/>
+              <a:rPr lang="fr-FR" sz="1400" b="0" i="1" dirty="0" err="1"/>
               <a:t>Nimes</a:t>
             </a:r>
             <a:r>
-              <a:rPr lang="fr-FR" dirty="0"/>
+              <a:rPr lang="fr-FR" sz="1400" b="0" i="1" dirty="0"/>
               <a:t> ?</a:t>
             </a:r>
           </a:p>
           <a:p>
-            <a:r>
-              <a:rPr lang="fr-FR" dirty="0" err="1"/>
+            <a:pPr marL="685800" lvl="4" indent="0">
+              <a:buNone/>
+            </a:pPr>
+            <a:r>
+              <a:rPr lang="fr-FR" sz="1400" b="0" i="1" dirty="0" err="1"/>
               <a:t>Narvis</a:t>
             </a:r>
             <a:r>
-              <a:rPr lang="fr-FR" dirty="0"/>
+              <a:rPr lang="fr-FR" sz="1400" b="0" i="1" dirty="0"/>
               <a:t> répondra : @Utilisateur The </a:t>
             </a:r>
             <a:r>
-              <a:rPr lang="fr-FR" dirty="0" err="1"/>
+              <a:rPr lang="fr-FR" sz="1400" b="0" i="1" dirty="0" err="1"/>
               <a:t>weather</a:t>
             </a:r>
             <a:r>
-              <a:rPr lang="fr-FR" dirty="0"/>
+              <a:rPr lang="fr-FR" sz="1400" b="0" i="1" dirty="0"/>
               <a:t> in </a:t>
             </a:r>
             <a:r>
-              <a:rPr lang="fr-FR" dirty="0" err="1"/>
+              <a:rPr lang="fr-FR" sz="1400" b="0" i="1" dirty="0" err="1"/>
               <a:t>Nimes</a:t>
             </a:r>
             <a:r>
-              <a:rPr lang="fr-FR" dirty="0"/>
+              <a:rPr lang="fr-FR" sz="1400" b="0" i="1" dirty="0"/>
               <a:t> </a:t>
             </a:r>
             <a:r>
-              <a:rPr lang="fr-FR" dirty="0" err="1"/>
+              <a:rPr lang="fr-FR" sz="1400" b="0" i="1" dirty="0" err="1"/>
               <a:t>is</a:t>
             </a:r>
             <a:r>
-              <a:rPr lang="fr-FR" dirty="0"/>
+              <a:rPr lang="fr-FR" sz="1400" b="0" i="1" dirty="0"/>
               <a:t> </a:t>
             </a:r>
             <a:r>
-              <a:rPr lang="fr-FR" dirty="0" err="1"/>
+              <a:rPr lang="fr-FR" sz="1400" b="0" i="1" dirty="0" err="1"/>
               <a:t>sunny</a:t>
             </a:r>
             <a:r>
-              <a:rPr lang="fr-FR" dirty="0"/>
+              <a:rPr lang="fr-FR" sz="1400" b="0" i="1" dirty="0"/>
               <a:t>. </a:t>
             </a:r>
-          </a:p>
-          <a:p>
-            <a:endParaRPr lang="fr-FR" dirty="0"/>
-          </a:p>
-          <a:p>
-            <a:r>
-              <a:rPr lang="fr-FR" dirty="0"/>
-              <a:t>Un utilisateur tweet : @</a:t>
-            </a:r>
-            <a:r>
-              <a:rPr lang="fr-FR" dirty="0" err="1"/>
+            <a:endParaRPr lang="fr-FR" sz="1400" b="0" i="1" dirty="0" smtClean="0"/>
+          </a:p>
+          <a:p>
+            <a:pPr marL="685800" lvl="4" indent="0">
+              <a:buNone/>
+            </a:pPr>
+            <a:endParaRPr lang="fr-FR" sz="1400" i="1" dirty="0"/>
+          </a:p>
+          <a:p>
+            <a:pPr marL="685800" lvl="4" indent="0">
+              <a:buNone/>
+            </a:pPr>
+            <a:endParaRPr lang="fr-FR" sz="1400" b="0" i="1" dirty="0" smtClean="0"/>
+          </a:p>
+          <a:p>
+            <a:pPr marL="685800" lvl="4" indent="0">
+              <a:buNone/>
+            </a:pPr>
+            <a:endParaRPr lang="fr-FR" sz="1400" b="0" i="1" dirty="0"/>
+          </a:p>
+          <a:p>
+            <a:pPr lvl="1"/>
+            <a:r>
+              <a:rPr lang="fr-FR" b="1" dirty="0" smtClean="0"/>
+              <a:t>En tant qu’utilisateur Twitter, je peux demander à NARVIS comment il va. Ainsi il me répondra selon l’état de son système.</a:t>
+            </a:r>
+          </a:p>
+          <a:p>
+            <a:pPr marL="685800" lvl="4" indent="0">
+              <a:buNone/>
+            </a:pPr>
+            <a:r>
+              <a:rPr lang="fr-FR" sz="1400" b="0" i="1" dirty="0"/>
+              <a:t>Un utilisateur </a:t>
+            </a:r>
+            <a:r>
+              <a:rPr lang="fr-FR" sz="1400" b="0" i="1" dirty="0" err="1"/>
+              <a:t>tweet</a:t>
+            </a:r>
+            <a:r>
+              <a:rPr lang="fr-FR" sz="1400" b="0" i="1" dirty="0"/>
+              <a:t> : @</a:t>
+            </a:r>
+            <a:r>
+              <a:rPr lang="fr-FR" sz="1400" b="0" i="1" dirty="0" err="1"/>
               <a:t>Narvis</a:t>
             </a:r>
             <a:r>
-              <a:rPr lang="fr-FR" dirty="0"/>
+              <a:rPr lang="fr-FR" sz="1400" b="0" i="1" dirty="0"/>
+              <a:t> How are </a:t>
+            </a:r>
+            <a:r>
+              <a:rPr lang="fr-FR" sz="1400" b="0" i="1" dirty="0" err="1"/>
+              <a:t>you</a:t>
+            </a:r>
+            <a:r>
+              <a:rPr lang="fr-FR" sz="1400" b="0" i="1" dirty="0"/>
+              <a:t> ?</a:t>
+            </a:r>
+          </a:p>
+          <a:p>
+            <a:pPr marL="685800" lvl="4" indent="0">
+              <a:buNone/>
+            </a:pPr>
+            <a:r>
+              <a:rPr lang="fr-FR" sz="1400" b="0" i="1" dirty="0" err="1"/>
+              <a:t>Narvis</a:t>
+            </a:r>
+            <a:r>
+              <a:rPr lang="fr-FR" sz="1400" b="0" i="1" dirty="0"/>
+              <a:t> répondra : @Utilisateur I </a:t>
+            </a:r>
+            <a:r>
+              <a:rPr lang="fr-FR" sz="1400" b="0" i="1" dirty="0" err="1"/>
+              <a:t>am</a:t>
+            </a:r>
+            <a:r>
+              <a:rPr lang="fr-FR" sz="1400" b="0" i="1" dirty="0"/>
               <a:t> </a:t>
             </a:r>
             <a:r>
-              <a:rPr lang="fr-FR" dirty="0" err="1"/>
-              <a:t>Could</a:t>
-            </a:r>
-            <a:r>
-              <a:rPr lang="fr-FR" dirty="0"/>
-              <a:t> </a:t>
-            </a:r>
-            <a:r>
-              <a:rPr lang="fr-FR" dirty="0" err="1"/>
-              <a:t>you</a:t>
-            </a:r>
-            <a:r>
-              <a:rPr lang="fr-FR" dirty="0"/>
-              <a:t> tell me the </a:t>
-            </a:r>
-            <a:r>
-              <a:rPr lang="fr-FR" dirty="0" err="1"/>
-              <a:t>weather</a:t>
-            </a:r>
-            <a:r>
-              <a:rPr lang="fr-FR" dirty="0"/>
-              <a:t> </a:t>
-            </a:r>
-            <a:r>
-              <a:rPr lang="fr-FR" dirty="0" err="1"/>
-              <a:t>please</a:t>
-            </a:r>
-            <a:r>
-              <a:rPr lang="fr-FR" dirty="0"/>
-              <a:t> ?</a:t>
-            </a:r>
-          </a:p>
-          <a:p>
-            <a:r>
-              <a:rPr lang="fr-FR" dirty="0" err="1"/>
-              <a:t>Narvis</a:t>
-            </a:r>
-            <a:r>
-              <a:rPr lang="fr-FR" dirty="0"/>
-              <a:t> répondra : @Utilisateur </a:t>
-            </a:r>
-            <a:r>
-              <a:rPr lang="fr-FR" dirty="0" err="1"/>
-              <a:t>Yes</a:t>
-            </a:r>
-            <a:r>
-              <a:rPr lang="fr-FR" dirty="0"/>
+              <a:rPr lang="fr-FR" sz="1400" b="0" i="1" dirty="0" err="1"/>
+              <a:t>busy</a:t>
+            </a:r>
+            <a:r>
+              <a:rPr lang="fr-FR" sz="1400" b="0" i="1" dirty="0" smtClean="0"/>
               <a:t>.</a:t>
             </a:r>
-          </a:p>
-          <a:p>
-            <a:endParaRPr lang="fr-FR" dirty="0"/>
-          </a:p>
-          <a:p>
-            <a:r>
-              <a:rPr lang="fr-FR" dirty="0"/>
-              <a:t>Un utilisateur tweet : @</a:t>
-            </a:r>
-            <a:r>
-              <a:rPr lang="fr-FR" dirty="0" err="1"/>
-              <a:t>Narvis</a:t>
-            </a:r>
-            <a:r>
-              <a:rPr lang="fr-FR" dirty="0"/>
-              <a:t> How are </a:t>
-            </a:r>
-            <a:r>
-              <a:rPr lang="fr-FR" dirty="0" err="1"/>
-              <a:t>you</a:t>
-            </a:r>
-            <a:r>
-              <a:rPr lang="fr-FR" dirty="0"/>
-              <a:t> ?</a:t>
-            </a:r>
-          </a:p>
-          <a:p>
-            <a:r>
-              <a:rPr lang="fr-FR" dirty="0" err="1"/>
-              <a:t>Narvis</a:t>
-            </a:r>
-            <a:r>
-              <a:rPr lang="fr-FR" dirty="0"/>
-              <a:t> répondra : @Utilisateur I </a:t>
-            </a:r>
-            <a:r>
-              <a:rPr lang="fr-FR" dirty="0" err="1"/>
-              <a:t>am</a:t>
-            </a:r>
-            <a:r>
-              <a:rPr lang="fr-FR" dirty="0"/>
-              <a:t> </a:t>
-            </a:r>
-            <a:r>
-              <a:rPr lang="fr-FR" dirty="0" err="1"/>
-              <a:t>busy</a:t>
-            </a:r>
-            <a:r>
-              <a:rPr lang="fr-FR" dirty="0" smtClean="0"/>
-              <a:t>.</a:t>
-            </a:r>
-          </a:p>
-          <a:p>
-            <a:endParaRPr lang="fr-FR" dirty="0"/>
-          </a:p>
-          <a:p>
-            <a:r>
-              <a:rPr lang="fr-FR" dirty="0" smtClean="0"/>
-              <a:t>TODO : Revoir les User Stories pour être plus réaliste et </a:t>
-            </a:r>
-            <a:r>
-              <a:rPr lang="fr-FR" dirty="0" err="1" smtClean="0"/>
-              <a:t>exaustif</a:t>
-            </a:r>
-            <a:endParaRPr lang="fr-FR" dirty="0"/>
+            <a:endParaRPr lang="fr-FR" sz="1400" i="1" dirty="0"/>
+          </a:p>
+          <a:p>
+            <a:pPr marL="685800" lvl="4" indent="0">
+              <a:buNone/>
+            </a:pPr>
+            <a:endParaRPr lang="fr-FR" sz="1400" b="0" i="1" dirty="0"/>
+          </a:p>
+          <a:p>
+            <a:pPr marL="0" lvl="1" indent="0">
+              <a:buNone/>
+            </a:pPr>
+            <a:endParaRPr lang="fr-FR" b="1" dirty="0"/>
+          </a:p>
+          <a:p>
+            <a:pPr marL="0" lvl="1" indent="0">
+              <a:buNone/>
+            </a:pPr>
+            <a:endParaRPr lang="fr-FR" dirty="0" smtClean="0"/>
           </a:p>
         </p:txBody>
       </p:sp>
@@ -4971,7 +4891,7 @@
       </p:sp>
       <p:sp>
         <p:nvSpPr>
-          <p:cNvPr id="6" name="Footer Placeholder 4"/>
+          <p:cNvPr id="7" name="Footer Placeholder 4"/>
           <p:cNvSpPr>
             <a:spLocks noGrp="1"/>
           </p:cNvSpPr>
@@ -5002,28 +4922,28 @@
               <a:t>projet - </a:t>
             </a:r>
             <a:r>
+              <a:rPr lang="fr-FR" cap="small" dirty="0"/>
+              <a:t>Objectifs principaux </a:t>
+            </a:r>
+            <a:r>
+              <a:rPr lang="fr-FR" cap="small" dirty="0" smtClean="0"/>
+              <a:t>- </a:t>
+            </a:r>
+            <a:r>
+              <a:rPr lang="fr-FR" cap="small" dirty="0"/>
+              <a:t>Architecture </a:t>
+            </a:r>
+            <a:r>
+              <a:rPr lang="fr-FR" cap="small" dirty="0" smtClean="0"/>
+              <a:t>- </a:t>
+            </a:r>
+            <a:r>
               <a:rPr lang="fr-FR" u="sng" cap="small" dirty="0"/>
-              <a:t>Objectifs principaux</a:t>
+              <a:t>Gestion du projet</a:t>
             </a:r>
             <a:r>
               <a:rPr lang="fr-FR" cap="small" dirty="0"/>
               <a:t> </a:t>
-            </a:r>
-            <a:r>
-              <a:rPr lang="fr-FR" cap="small" dirty="0" smtClean="0"/>
-              <a:t>- </a:t>
-            </a:r>
-            <a:r>
-              <a:rPr lang="fr-FR" cap="small" dirty="0"/>
-              <a:t>Architecture </a:t>
-            </a:r>
-            <a:r>
-              <a:rPr lang="fr-FR" cap="small" dirty="0" smtClean="0"/>
-              <a:t>- </a:t>
-            </a:r>
-            <a:r>
-              <a:rPr lang="fr-FR" cap="small" dirty="0"/>
-              <a:t>Gestion du projet </a:t>
             </a:r>
             <a:r>
               <a:rPr lang="fr-FR" cap="small" dirty="0" smtClean="0"/>
@@ -5110,10 +5030,9 @@
           <a:lstStyle/>
           <a:p>
             <a:r>
-              <a:rPr lang="fr-FR" dirty="0" smtClean="0"/>
+              <a:rPr lang="fr-FR" dirty="0"/>
               <a:t>Gestion de projet</a:t>
             </a:r>
-            <a:endParaRPr lang="fr-FR" dirty="0"/>
           </a:p>
         </p:txBody>
       </p:sp>
@@ -5132,19 +5051,177 @@
           <a:bodyPr/>
           <a:lstStyle/>
           <a:p>
-            <a:r>
-              <a:rPr lang="fr-FR" dirty="0" smtClean="0"/>
-              <a:t>TODO : </a:t>
-            </a:r>
-            <a:r>
-              <a:rPr lang="fr-FR" dirty="0" smtClean="0"/>
-              <a:t>Détailler les </a:t>
-            </a:r>
-            <a:r>
-              <a:rPr lang="fr-FR" dirty="0" err="1" smtClean="0"/>
-              <a:t>features</a:t>
-            </a:r>
-            <a:endParaRPr lang="fr-FR" dirty="0"/>
+            <a:pPr lvl="1"/>
+            <a:r>
+              <a:rPr lang="fr-FR" b="1" dirty="0"/>
+              <a:t>En tant qu’utilisateur Twitter, je souhaite savoir si NARVIS peut réaliser une tâche particulière. Ainsi  il me répondra si il est capable ou non de la réaliser.</a:t>
+            </a:r>
+          </a:p>
+          <a:p>
+            <a:pPr marL="685800" lvl="4" indent="0">
+              <a:buNone/>
+            </a:pPr>
+            <a:r>
+              <a:rPr lang="fr-FR" sz="1400" i="1" dirty="0"/>
+              <a:t>Un utilisateur </a:t>
+            </a:r>
+            <a:r>
+              <a:rPr lang="fr-FR" sz="1400" i="1" dirty="0" err="1"/>
+              <a:t>tweet</a:t>
+            </a:r>
+            <a:r>
+              <a:rPr lang="fr-FR" sz="1400" i="1" dirty="0"/>
+              <a:t> : @</a:t>
+            </a:r>
+            <a:r>
+              <a:rPr lang="fr-FR" sz="1400" i="1" dirty="0" err="1"/>
+              <a:t>Narvis</a:t>
+            </a:r>
+            <a:r>
+              <a:rPr lang="fr-FR" sz="1400" i="1" dirty="0"/>
+              <a:t> </a:t>
+            </a:r>
+            <a:r>
+              <a:rPr lang="fr-FR" sz="1400" i="1" dirty="0" err="1"/>
+              <a:t>Could</a:t>
+            </a:r>
+            <a:r>
+              <a:rPr lang="fr-FR" sz="1400" i="1" dirty="0"/>
+              <a:t> </a:t>
+            </a:r>
+            <a:r>
+              <a:rPr lang="fr-FR" sz="1400" i="1" dirty="0" err="1"/>
+              <a:t>you</a:t>
+            </a:r>
+            <a:r>
+              <a:rPr lang="fr-FR" sz="1400" i="1" dirty="0"/>
+              <a:t> tell me the </a:t>
+            </a:r>
+            <a:r>
+              <a:rPr lang="fr-FR" sz="1400" i="1" dirty="0" err="1"/>
+              <a:t>weather</a:t>
+            </a:r>
+            <a:r>
+              <a:rPr lang="fr-FR" sz="1400" i="1" dirty="0"/>
+              <a:t> </a:t>
+            </a:r>
+            <a:r>
+              <a:rPr lang="fr-FR" sz="1400" i="1" dirty="0" err="1"/>
+              <a:t>please</a:t>
+            </a:r>
+            <a:r>
+              <a:rPr lang="fr-FR" sz="1400" i="1" dirty="0"/>
+              <a:t> ?</a:t>
+            </a:r>
+          </a:p>
+          <a:p>
+            <a:pPr marL="685800" lvl="4" indent="0">
+              <a:buNone/>
+            </a:pPr>
+            <a:r>
+              <a:rPr lang="fr-FR" sz="1400" i="1" dirty="0" err="1"/>
+              <a:t>Narvis</a:t>
+            </a:r>
+            <a:r>
+              <a:rPr lang="fr-FR" sz="1400" i="1" dirty="0"/>
+              <a:t> répondra : @Utilisateur </a:t>
+            </a:r>
+            <a:r>
+              <a:rPr lang="fr-FR" sz="1400" i="1" dirty="0" err="1"/>
+              <a:t>Yes</a:t>
+            </a:r>
+            <a:r>
+              <a:rPr lang="fr-FR" sz="1400" i="1" dirty="0" smtClean="0"/>
+              <a:t>.</a:t>
+            </a:r>
+          </a:p>
+          <a:p>
+            <a:pPr marL="685800" lvl="4" indent="0">
+              <a:buNone/>
+            </a:pPr>
+            <a:endParaRPr lang="fr-FR" sz="1400" i="1" dirty="0"/>
+          </a:p>
+          <a:p>
+            <a:pPr marL="685800" lvl="4" indent="0">
+              <a:buNone/>
+            </a:pPr>
+            <a:endParaRPr lang="fr-FR" sz="1400" i="1" dirty="0" smtClean="0"/>
+          </a:p>
+          <a:p>
+            <a:pPr marL="685800" lvl="4" indent="0">
+              <a:buNone/>
+            </a:pPr>
+            <a:endParaRPr lang="fr-FR" sz="1400" i="1" dirty="0"/>
+          </a:p>
+          <a:p>
+            <a:pPr lvl="1"/>
+            <a:r>
+              <a:rPr lang="fr-FR" b="1" dirty="0"/>
+              <a:t>En tant qu’utilisateur Twitter, je souhaite connaitre les dernières nouvelles d’un pays. Ainsi il me donnera les dernières informations.</a:t>
+            </a:r>
+          </a:p>
+          <a:p>
+            <a:pPr marL="685800" lvl="4" indent="0">
+              <a:buNone/>
+            </a:pPr>
+            <a:r>
+              <a:rPr lang="fr-FR" sz="1400" i="1" dirty="0"/>
+              <a:t>Un utilisateur </a:t>
+            </a:r>
+            <a:r>
+              <a:rPr lang="fr-FR" sz="1400" i="1" dirty="0" err="1"/>
+              <a:t>tweet</a:t>
+            </a:r>
+            <a:r>
+              <a:rPr lang="fr-FR" sz="1400" i="1" dirty="0"/>
+              <a:t> : @</a:t>
+            </a:r>
+            <a:r>
+              <a:rPr lang="fr-FR" sz="1400" i="1" dirty="0" err="1"/>
+              <a:t>Narvis</a:t>
+            </a:r>
+            <a:r>
+              <a:rPr lang="fr-FR" sz="1400" i="1" dirty="0"/>
+              <a:t> </a:t>
+            </a:r>
+            <a:r>
+              <a:rPr lang="fr-FR" sz="1400" i="1" dirty="0" err="1"/>
+              <a:t>What’s</a:t>
+            </a:r>
+            <a:r>
+              <a:rPr lang="fr-FR" sz="1400" i="1" dirty="0"/>
+              <a:t> new in USA?</a:t>
+            </a:r>
+          </a:p>
+          <a:p>
+            <a:pPr marL="685800" lvl="4" indent="0">
+              <a:buNone/>
+            </a:pPr>
+            <a:r>
+              <a:rPr lang="fr-FR" sz="1400" i="1" dirty="0" err="1"/>
+              <a:t>Narvis</a:t>
+            </a:r>
+            <a:r>
+              <a:rPr lang="fr-FR" sz="1400" i="1" dirty="0"/>
+              <a:t> répondra : @Utilisateur Ex-NFL star Hernandez </a:t>
+            </a:r>
+            <a:r>
+              <a:rPr lang="fr-FR" sz="1400" i="1" dirty="0" err="1"/>
+              <a:t>gets</a:t>
+            </a:r>
+            <a:r>
+              <a:rPr lang="fr-FR" sz="1400" i="1" dirty="0"/>
+              <a:t> life in prison for 2013 </a:t>
+            </a:r>
+            <a:r>
+              <a:rPr lang="fr-FR" sz="1400" i="1" dirty="0" err="1"/>
+              <a:t>killing</a:t>
+            </a:r>
+            <a:r>
+              <a:rPr lang="fr-FR" sz="1400" i="1" dirty="0" smtClean="0"/>
+              <a:t>.</a:t>
+            </a:r>
+            <a:endParaRPr lang="fr-FR" sz="1400" i="1" dirty="0"/>
           </a:p>
         </p:txBody>
       </p:sp>
@@ -5164,8 +5241,12 @@
           <a:lstStyle/>
           <a:p>
             <a:r>
-              <a:rPr lang="fr-FR" dirty="0" err="1" smtClean="0"/>
-              <a:t>Features</a:t>
+              <a:rPr lang="fr-FR" dirty="0"/>
+              <a:t>Quelques user </a:t>
+            </a:r>
+            <a:r>
+              <a:rPr lang="fr-FR" dirty="0" smtClean="0"/>
+              <a:t>stories</a:t>
             </a:r>
             <a:endParaRPr lang="fr-FR" dirty="0"/>
           </a:p>
@@ -5204,28 +5285,28 @@
               <a:t>projet - </a:t>
             </a:r>
             <a:r>
+              <a:rPr lang="fr-FR" cap="small" dirty="0"/>
+              <a:t>Objectifs principaux </a:t>
+            </a:r>
+            <a:r>
+              <a:rPr lang="fr-FR" cap="small" dirty="0" smtClean="0"/>
+              <a:t>- </a:t>
+            </a:r>
+            <a:r>
+              <a:rPr lang="fr-FR" cap="small" dirty="0"/>
+              <a:t>Architecture </a:t>
+            </a:r>
+            <a:r>
+              <a:rPr lang="fr-FR" cap="small" dirty="0" smtClean="0"/>
+              <a:t>- </a:t>
+            </a:r>
+            <a:r>
               <a:rPr lang="fr-FR" u="sng" cap="small" dirty="0"/>
-              <a:t>Objectifs principaux</a:t>
+              <a:t>Gestion du projet</a:t>
             </a:r>
             <a:r>
               <a:rPr lang="fr-FR" cap="small" dirty="0"/>
               <a:t> </a:t>
-            </a:r>
-            <a:r>
-              <a:rPr lang="fr-FR" cap="small" dirty="0" smtClean="0"/>
-              <a:t>- </a:t>
-            </a:r>
-            <a:r>
-              <a:rPr lang="fr-FR" cap="small" dirty="0"/>
-              <a:t>Architecture </a:t>
-            </a:r>
-            <a:r>
-              <a:rPr lang="fr-FR" cap="small" dirty="0" smtClean="0"/>
-              <a:t>- </a:t>
-            </a:r>
-            <a:r>
-              <a:rPr lang="fr-FR" cap="small" dirty="0"/>
-              <a:t>Gestion du projet </a:t>
             </a:r>
             <a:r>
               <a:rPr lang="fr-FR" cap="small" dirty="0" smtClean="0"/>
@@ -5262,20 +5343,13 @@
     </p:spTree>
     <p:extLst>
       <p:ext uri="{BB962C8B-B14F-4D97-AF65-F5344CB8AC3E}">
-        <p14:creationId xmlns:p14="http://schemas.microsoft.com/office/powerpoint/2010/main" val="2085388732"/>
+        <p14:creationId xmlns:p14="http://schemas.microsoft.com/office/powerpoint/2010/main" val="2909499470"/>
       </p:ext>
     </p:extLst>
   </p:cSld>
   <p:clrMapOvr>
     <a:masterClrMapping/>
   </p:clrMapOvr>
-  <p:timing>
-    <p:tnLst>
-      <p:par>
-        <p:cTn id="1" dur="indefinite" restart="never" nodeType="tmRoot"/>
-      </p:par>
-    </p:tnLst>
-  </p:timing>
 </p:sld>
 </file>
 
@@ -5313,7 +5387,7 @@
           <a:p>
             <a:r>
               <a:rPr lang="fr-FR" dirty="0"/>
-              <a:t>Gestion de projet</a:t>
+              <a:t>Choix technologiques</a:t>
             </a:r>
           </a:p>
         </p:txBody>
@@ -5334,134 +5408,395 @@
           <a:lstStyle/>
           <a:p>
             <a:r>
+              <a:rPr lang="fr-FR" dirty="0" smtClean="0">
+                <a:solidFill>
+                  <a:schemeClr val="tx1"/>
+                </a:solidFill>
+              </a:rPr>
+              <a:t>Programmation</a:t>
+            </a:r>
+          </a:p>
+          <a:p>
+            <a:pPr lvl="1"/>
+            <a:r>
+              <a:rPr lang="fr-FR" dirty="0" smtClean="0">
+                <a:solidFill>
+                  <a:schemeClr val="tx1"/>
+                </a:solidFill>
+              </a:rPr>
+              <a:t>Langage Java 1.8</a:t>
+            </a:r>
+          </a:p>
+          <a:p>
+            <a:pPr lvl="2"/>
+            <a:r>
+              <a:rPr lang="fr-FR" dirty="0" smtClean="0">
+                <a:solidFill>
+                  <a:schemeClr val="tx1"/>
+                </a:solidFill>
+              </a:rPr>
+              <a:t>Nombreuses API disponibles</a:t>
+            </a:r>
+          </a:p>
+          <a:p>
+            <a:pPr lvl="2"/>
+            <a:r>
+              <a:rPr lang="fr-FR" dirty="0"/>
+              <a:t>TODO : </a:t>
+            </a:r>
+            <a:r>
+              <a:rPr lang="fr-FR"/>
+              <a:t>Pourquoi </a:t>
+            </a:r>
+            <a:r>
+              <a:rPr lang="fr-FR" smtClean="0"/>
+              <a:t>?</a:t>
+            </a:r>
+            <a:endParaRPr lang="fr-FR" dirty="0" smtClean="0">
+              <a:solidFill>
+                <a:schemeClr val="tx1"/>
+              </a:solidFill>
+            </a:endParaRPr>
+          </a:p>
+          <a:p>
+            <a:pPr lvl="1"/>
+            <a:r>
+              <a:rPr lang="fr-FR" dirty="0" smtClean="0">
+                <a:solidFill>
+                  <a:schemeClr val="tx1"/>
+                </a:solidFill>
+              </a:rPr>
+              <a:t>IDE Netbeans 8.1</a:t>
+            </a:r>
+          </a:p>
+          <a:p>
+            <a:pPr lvl="2"/>
+            <a:r>
               <a:rPr lang="fr-FR" dirty="0" smtClean="0"/>
-              <a:t>Charles COQUE :</a:t>
-            </a:r>
+              <a:t>TODO : Pourquoi ?</a:t>
+            </a:r>
+            <a:endParaRPr lang="fr-FR" dirty="0" smtClean="0">
+              <a:solidFill>
+                <a:schemeClr val="tx1"/>
+              </a:solidFill>
+            </a:endParaRPr>
           </a:p>
           <a:p>
             <a:pPr lvl="1"/>
+            <a:endParaRPr lang="fr-FR" dirty="0" smtClean="0">
+              <a:solidFill>
+                <a:schemeClr val="tx1"/>
+              </a:solidFill>
+            </a:endParaRPr>
+          </a:p>
+          <a:p>
+            <a:r>
+              <a:rPr lang="fr-FR" dirty="0">
+                <a:solidFill>
+                  <a:schemeClr val="tx1"/>
+                </a:solidFill>
+              </a:rPr>
+              <a:t>Base de </a:t>
+            </a:r>
+            <a:r>
+              <a:rPr lang="fr-FR" dirty="0" smtClean="0">
+                <a:solidFill>
+                  <a:schemeClr val="tx1"/>
+                </a:solidFill>
+              </a:rPr>
+              <a:t>données</a:t>
+            </a:r>
+            <a:endParaRPr lang="fr-FR" dirty="0" smtClean="0">
+              <a:solidFill>
+                <a:schemeClr val="tx1"/>
+              </a:solidFill>
+            </a:endParaRPr>
+          </a:p>
+          <a:p>
+            <a:pPr lvl="1"/>
+            <a:r>
+              <a:rPr lang="fr-FR" dirty="0" smtClean="0">
+                <a:solidFill>
+                  <a:schemeClr val="tx1"/>
+                </a:solidFill>
+              </a:rPr>
+              <a:t>NoSQL : Architecture fichiers JSON/XML</a:t>
+            </a:r>
+          </a:p>
+          <a:p>
+            <a:pPr lvl="1"/>
+            <a:endParaRPr lang="fr-FR" dirty="0" smtClean="0"/>
+          </a:p>
+          <a:p>
+            <a:pPr marL="0" lvl="1" indent="0">
+              <a:buNone/>
+            </a:pPr>
+            <a:r>
+              <a:rPr lang="fr-FR" b="1" dirty="0" smtClean="0"/>
+              <a:t>Modélisation</a:t>
+            </a:r>
+            <a:endParaRPr lang="fr-FR" b="1" dirty="0" smtClean="0"/>
+          </a:p>
+          <a:p>
+            <a:pPr lvl="2"/>
+            <a:r>
+              <a:rPr lang="fr-FR" dirty="0" err="1" smtClean="0"/>
+              <a:t>yED</a:t>
+            </a:r>
             <a:r>
               <a:rPr lang="fr-FR" dirty="0" smtClean="0"/>
-              <a:t>Programmation Java</a:t>
-            </a:r>
-            <a:endParaRPr lang="fr-FR" dirty="0"/>
-          </a:p>
-          <a:p>
-            <a:pPr lvl="1"/>
-            <a:r>
-              <a:rPr lang="fr-FR" dirty="0" smtClean="0"/>
-              <a:t>TODO : Liste des compétences utiles pour le projet</a:t>
-            </a:r>
-            <a:endParaRPr lang="fr-FR" dirty="0"/>
-          </a:p>
-          <a:p>
-            <a:r>
-              <a:rPr lang="fr-FR" dirty="0" smtClean="0"/>
-              <a:t>Alban BONNET :</a:t>
-            </a:r>
-          </a:p>
-          <a:p>
-            <a:pPr lvl="1"/>
-            <a:r>
-              <a:rPr lang="fr-FR" dirty="0"/>
-              <a:t>Programmation Java</a:t>
-            </a:r>
-          </a:p>
-          <a:p>
-            <a:pPr lvl="1"/>
-            <a:r>
-              <a:rPr lang="fr-FR" dirty="0"/>
-              <a:t>TODO : Liste des compétences utiles pour le </a:t>
-            </a:r>
-            <a:r>
-              <a:rPr lang="fr-FR" dirty="0" smtClean="0"/>
-              <a:t>projet</a:t>
-            </a:r>
-            <a:endParaRPr lang="fr-FR" dirty="0"/>
-          </a:p>
-          <a:p>
-            <a:r>
-              <a:rPr lang="fr-FR" dirty="0" smtClean="0"/>
-              <a:t>Raphaël BLIN</a:t>
-            </a:r>
-            <a:r>
-              <a:rPr lang="fr-FR" dirty="0"/>
-              <a:t> </a:t>
-            </a:r>
-            <a:r>
-              <a:rPr lang="fr-FR" dirty="0" smtClean="0"/>
-              <a:t>:</a:t>
-            </a:r>
-          </a:p>
-          <a:p>
-            <a:pPr lvl="1"/>
-            <a:r>
-              <a:rPr lang="fr-FR" dirty="0"/>
-              <a:t>Programmation Java</a:t>
-            </a:r>
-          </a:p>
-          <a:p>
-            <a:pPr lvl="1"/>
-            <a:r>
-              <a:rPr lang="fr-FR" dirty="0" smtClean="0"/>
-              <a:t>Modélisation de données</a:t>
-            </a:r>
-            <a:endParaRPr lang="fr-FR" dirty="0"/>
-          </a:p>
-          <a:p>
-            <a:r>
-              <a:rPr lang="fr-FR" dirty="0" smtClean="0"/>
-              <a:t>Yoann LE MOUËL :</a:t>
-            </a:r>
-          </a:p>
-          <a:p>
-            <a:pPr lvl="1"/>
-            <a:r>
-              <a:rPr lang="fr-FR" dirty="0"/>
-              <a:t>Programmation Java</a:t>
-            </a:r>
-          </a:p>
-          <a:p>
-            <a:pPr lvl="1"/>
-            <a:r>
-              <a:rPr lang="fr-FR" dirty="0"/>
-              <a:t>TODO : Liste des compétences utiles pour le </a:t>
-            </a:r>
-            <a:r>
-              <a:rPr lang="fr-FR" dirty="0" smtClean="0"/>
-              <a:t>projet</a:t>
-            </a:r>
-            <a:endParaRPr lang="fr-FR" dirty="0"/>
-          </a:p>
-        </p:txBody>
-      </p:sp>
-      <p:sp>
-        <p:nvSpPr>
-          <p:cNvPr id="4" name="Espace réservé du texte 3"/>
-          <p:cNvSpPr>
-            <a:spLocks noGrp="1"/>
-          </p:cNvSpPr>
-          <p:nvPr>
-            <p:ph type="body" sz="quarter" idx="13"/>
-          </p:nvPr>
-        </p:nvSpPr>
-        <p:spPr/>
+              <a:t> : Editeur de graph</a:t>
+            </a:r>
+          </a:p>
+          <a:p>
+            <a:pPr lvl="2"/>
+            <a:endParaRPr lang="fr-FR" b="1" dirty="0">
+              <a:solidFill>
+                <a:schemeClr val="tx1"/>
+              </a:solidFill>
+            </a:endParaRPr>
+          </a:p>
+        </p:txBody>
+      </p:sp>
+      <p:sp>
+        <p:nvSpPr>
+          <p:cNvPr id="4" name="Footer Placeholder 4"/>
+          <p:cNvSpPr>
+            <a:spLocks noGrp="1"/>
+          </p:cNvSpPr>
+          <p:nvPr>
+            <p:ph type="ftr" sz="quarter" idx="11"/>
+          </p:nvPr>
+        </p:nvSpPr>
+        <p:spPr>
+          <a:xfrm>
+            <a:off x="1347106" y="6366765"/>
+            <a:ext cx="10082893" cy="274320"/>
+          </a:xfrm>
+        </p:spPr>
         <p:txBody>
           <a:bodyPr/>
           <a:lstStyle/>
           <a:p>
             <a:r>
+              <a:rPr lang="fr-FR" cap="small" dirty="0" smtClean="0"/>
+              <a:t>Introduction </a:t>
+            </a:r>
+            <a:r>
+              <a:rPr lang="fr-FR" cap="small" dirty="0"/>
+              <a:t>au </a:t>
+            </a:r>
+            <a:r>
+              <a:rPr lang="fr-FR" cap="small" dirty="0" smtClean="0"/>
+              <a:t>projet - </a:t>
+            </a:r>
+            <a:r>
+              <a:rPr lang="fr-FR" cap="small" dirty="0"/>
+              <a:t>Objectifs principaux </a:t>
+            </a:r>
+            <a:r>
+              <a:rPr lang="fr-FR" cap="small" dirty="0" smtClean="0"/>
+              <a:t>- </a:t>
+            </a:r>
+            <a:r>
+              <a:rPr lang="fr-FR" cap="small" dirty="0"/>
+              <a:t>Architecture </a:t>
+            </a:r>
+            <a:r>
+              <a:rPr lang="fr-FR" cap="small" dirty="0" smtClean="0"/>
+              <a:t>- </a:t>
+            </a:r>
+            <a:r>
+              <a:rPr lang="fr-FR" cap="small" dirty="0"/>
+              <a:t>Gestion du projet </a:t>
+            </a:r>
+            <a:r>
+              <a:rPr lang="fr-FR" cap="small" dirty="0" smtClean="0"/>
+              <a:t>- </a:t>
+            </a:r>
+            <a:r>
+              <a:rPr lang="fr-FR" u="sng" cap="small" dirty="0"/>
+              <a:t>Choix </a:t>
+            </a:r>
+            <a:r>
+              <a:rPr lang="fr-FR" u="sng" cap="small" dirty="0" smtClean="0"/>
+              <a:t>technologiques</a:t>
+            </a:r>
+            <a:r>
+              <a:rPr lang="en-US" cap="small" dirty="0"/>
+              <a:t> </a:t>
+            </a:r>
+            <a:r>
+              <a:rPr lang="en-US" cap="small" dirty="0" smtClean="0"/>
+              <a:t>- </a:t>
+            </a:r>
+            <a:r>
+              <a:rPr lang="fr-FR" cap="small" dirty="0"/>
+              <a:t>Travaux </a:t>
+            </a:r>
+            <a:r>
+              <a:rPr lang="fr-FR" cap="small" dirty="0" smtClean="0"/>
+              <a:t>préparatoires</a:t>
+            </a:r>
+            <a:endParaRPr lang="fr-FR" cap="small" dirty="0"/>
+          </a:p>
+        </p:txBody>
+      </p:sp>
+      <p:sp>
+        <p:nvSpPr>
+          <p:cNvPr id="5" name="Espace réservé du texte 3"/>
+          <p:cNvSpPr>
+            <a:spLocks noGrp="1"/>
+          </p:cNvSpPr>
+          <p:nvPr>
+            <p:ph type="body" sz="quarter" idx="13"/>
+          </p:nvPr>
+        </p:nvSpPr>
+        <p:spPr>
+          <a:xfrm>
+            <a:off x="1100517" y="930584"/>
+            <a:ext cx="10034124" cy="380326"/>
+          </a:xfrm>
+        </p:spPr>
+        <p:txBody>
+          <a:bodyPr/>
+          <a:lstStyle/>
+          <a:p>
+            <a:r>
               <a:rPr lang="fr-FR" dirty="0" smtClean="0"/>
-              <a:t>Compétences techniques de l’équipe</a:t>
+              <a:t>Développement</a:t>
             </a:r>
             <a:endParaRPr lang="fr-FR" dirty="0"/>
           </a:p>
         </p:txBody>
       </p:sp>
+      <p:pic>
+        <p:nvPicPr>
+          <p:cNvPr id="4098" name="Picture 2" descr="http://adr-35.fr/wp-content/uploads/2014/05/java.jpg"/>
+          <p:cNvPicPr>
+            <a:picLocks noChangeAspect="1" noChangeArrowheads="1"/>
+          </p:cNvPicPr>
+          <p:nvPr/>
+        </p:nvPicPr>
+        <p:blipFill>
+          <a:blip r:embed="rId2">
+            <a:extLst>
+              <a:ext uri="{28A0092B-C50C-407E-A947-70E740481C1C}">
+                <a14:useLocalDpi xmlns:a14="http://schemas.microsoft.com/office/drawing/2010/main" val="0"/>
+              </a:ext>
+            </a:extLst>
+          </a:blip>
+          <a:srcRect/>
+          <a:stretch>
+            <a:fillRect/>
+          </a:stretch>
+        </p:blipFill>
+        <p:spPr bwMode="auto">
+          <a:xfrm>
+            <a:off x="5764439" y="1298122"/>
+            <a:ext cx="1507672" cy="1130754"/>
+          </a:xfrm>
+          <a:prstGeom prst="rect">
+            <a:avLst/>
+          </a:prstGeom>
+          <a:noFill/>
+          <a:extLst>
+            <a:ext uri="{909E8E84-426E-40DD-AFC4-6F175D3DCCD1}">
+              <a14:hiddenFill xmlns:a14="http://schemas.microsoft.com/office/drawing/2010/main">
+                <a:solidFill>
+                  <a:srgbClr val="FFFFFF"/>
+                </a:solidFill>
+              </a14:hiddenFill>
+            </a:ext>
+          </a:extLst>
+        </p:spPr>
+      </p:pic>
+      <p:pic>
+        <p:nvPicPr>
+          <p:cNvPr id="4100" name="Picture 4" descr="http://peterfeatherstone.com/wp-content/uploads/netbeans-logo.png"/>
+          <p:cNvPicPr>
+            <a:picLocks noChangeAspect="1" noChangeArrowheads="1"/>
+          </p:cNvPicPr>
+          <p:nvPr/>
+        </p:nvPicPr>
+        <p:blipFill>
+          <a:blip r:embed="rId3">
+            <a:extLst>
+              <a:ext uri="{28A0092B-C50C-407E-A947-70E740481C1C}">
+                <a14:useLocalDpi xmlns:a14="http://schemas.microsoft.com/office/drawing/2010/main" val="0"/>
+              </a:ext>
+            </a:extLst>
+          </a:blip>
+          <a:srcRect/>
+          <a:stretch>
+            <a:fillRect/>
+          </a:stretch>
+        </p:blipFill>
+        <p:spPr bwMode="auto">
+          <a:xfrm>
+            <a:off x="8342993" y="1480307"/>
+            <a:ext cx="2435678" cy="1060874"/>
+          </a:xfrm>
+          <a:prstGeom prst="rect">
+            <a:avLst/>
+          </a:prstGeom>
+          <a:noFill/>
+          <a:extLst>
+            <a:ext uri="{909E8E84-426E-40DD-AFC4-6F175D3DCCD1}">
+              <a14:hiddenFill xmlns:a14="http://schemas.microsoft.com/office/drawing/2010/main">
+                <a:solidFill>
+                  <a:srgbClr val="FFFFFF"/>
+                </a:solidFill>
+              </a14:hiddenFill>
+            </a:ext>
+          </a:extLst>
+        </p:spPr>
+      </p:pic>
+      <p:pic>
+        <p:nvPicPr>
+          <p:cNvPr id="4102" name="Picture 6" descr="http://www.zwodnik.com/media/cache/f8/70/f870fc44e7286b16751c294bd792ac29.png"/>
+          <p:cNvPicPr>
+            <a:picLocks noChangeAspect="1" noChangeArrowheads="1"/>
+          </p:cNvPicPr>
+          <p:nvPr/>
+        </p:nvPicPr>
+        <p:blipFill>
+          <a:blip r:embed="rId4">
+            <a:extLst>
+              <a:ext uri="{28A0092B-C50C-407E-A947-70E740481C1C}">
+                <a14:useLocalDpi xmlns:a14="http://schemas.microsoft.com/office/drawing/2010/main" val="0"/>
+              </a:ext>
+            </a:extLst>
+          </a:blip>
+          <a:srcRect/>
+          <a:stretch>
+            <a:fillRect/>
+          </a:stretch>
+        </p:blipFill>
+        <p:spPr bwMode="auto">
+          <a:xfrm>
+            <a:off x="5952217" y="4261757"/>
+            <a:ext cx="979714" cy="979714"/>
+          </a:xfrm>
+          <a:prstGeom prst="rect">
+            <a:avLst/>
+          </a:prstGeom>
+          <a:noFill/>
+          <a:extLst>
+            <a:ext uri="{909E8E84-426E-40DD-AFC4-6F175D3DCCD1}">
+              <a14:hiddenFill xmlns:a14="http://schemas.microsoft.com/office/drawing/2010/main">
+                <a:solidFill>
+                  <a:srgbClr val="FFFFFF"/>
+                </a:solidFill>
+              </a14:hiddenFill>
+            </a:ext>
+          </a:extLst>
+        </p:spPr>
+      </p:pic>
     </p:spTree>
     <p:extLst>
       <p:ext uri="{BB962C8B-B14F-4D97-AF65-F5344CB8AC3E}">
-        <p14:creationId xmlns:p14="http://schemas.microsoft.com/office/powerpoint/2010/main" val="3811322070"/>
+        <p14:creationId xmlns:p14="http://schemas.microsoft.com/office/powerpoint/2010/main" val="534818002"/>
       </p:ext>
     </p:extLst>
   </p:cSld>
@@ -5514,6 +5849,7 @@
               <a:rPr lang="fr-FR" dirty="0"/>
               <a:t>Choix technologiques</a:t>
             </a:r>
+            <a:endParaRPr lang="en-US" dirty="0"/>
           </a:p>
         </p:txBody>
       </p:sp>
@@ -5533,95 +5869,19 @@
           <a:lstStyle/>
           <a:p>
             <a:r>
-              <a:rPr lang="fr-FR" dirty="0" smtClean="0">
-                <a:solidFill>
-                  <a:schemeClr val="tx1"/>
-                </a:solidFill>
-              </a:rPr>
-              <a:t>Programmation</a:t>
+              <a:rPr lang="fr-FR" dirty="0"/>
+              <a:t>Gestionnaire de version</a:t>
             </a:r>
           </a:p>
           <a:p>
             <a:pPr lvl="1"/>
             <a:r>
-              <a:rPr lang="fr-FR" dirty="0" smtClean="0">
-                <a:solidFill>
-                  <a:schemeClr val="tx1"/>
-                </a:solidFill>
-              </a:rPr>
-              <a:t>Langage Java 1.8</a:t>
-            </a:r>
-          </a:p>
-          <a:p>
-            <a:pPr lvl="2"/>
+              <a:rPr lang="fr-FR" dirty="0"/>
+              <a:t>Git en dépôt public sur </a:t>
+            </a:r>
             <a:r>
               <a:rPr lang="fr-FR" dirty="0" smtClean="0"/>
-              <a:t>TODO : Pourquoi ?</a:t>
-            </a:r>
-            <a:endParaRPr lang="fr-FR" dirty="0" smtClean="0">
-              <a:solidFill>
-                <a:schemeClr val="tx1"/>
-              </a:solidFill>
-            </a:endParaRPr>
-          </a:p>
-          <a:p>
-            <a:pPr lvl="1"/>
-            <a:r>
-              <a:rPr lang="fr-FR" dirty="0" smtClean="0">
-                <a:solidFill>
-                  <a:schemeClr val="tx1"/>
-                </a:solidFill>
-              </a:rPr>
-              <a:t>IDE Netbeans 8.1</a:t>
-            </a:r>
-          </a:p>
-          <a:p>
-            <a:pPr lvl="2"/>
-            <a:r>
-              <a:rPr lang="fr-FR" dirty="0" smtClean="0"/>
-              <a:t>TODO : Pourquoi ?</a:t>
-            </a:r>
-            <a:endParaRPr lang="fr-FR" dirty="0" smtClean="0">
-              <a:solidFill>
-                <a:schemeClr val="tx1"/>
-              </a:solidFill>
-            </a:endParaRPr>
-          </a:p>
-          <a:p>
-            <a:pPr lvl="1"/>
-            <a:endParaRPr lang="fr-FR" dirty="0" smtClean="0">
-              <a:solidFill>
-                <a:schemeClr val="tx1"/>
-              </a:solidFill>
-            </a:endParaRPr>
-          </a:p>
-          <a:p>
-            <a:r>
-              <a:rPr lang="fr-FR" dirty="0">
-                <a:solidFill>
-                  <a:schemeClr val="tx1"/>
-                </a:solidFill>
-              </a:rPr>
-              <a:t>Base de </a:t>
-            </a:r>
-            <a:r>
-              <a:rPr lang="fr-FR" dirty="0" smtClean="0">
-                <a:solidFill>
-                  <a:schemeClr val="tx1"/>
-                </a:solidFill>
-              </a:rPr>
-              <a:t>données</a:t>
-            </a:r>
-          </a:p>
-          <a:p>
-            <a:pPr lvl="1"/>
-            <a:r>
-              <a:rPr lang="fr-FR" dirty="0" smtClean="0">
-                <a:solidFill>
-                  <a:schemeClr val="tx1"/>
-                </a:solidFill>
-              </a:rPr>
-              <a:t>NoSQL : Architecture fichiers JSON/XML</a:t>
+              <a:t>GitHub</a:t>
             </a:r>
           </a:p>
           <a:p>
@@ -5629,36 +5889,97 @@
             <a:endParaRPr lang="fr-FR" dirty="0"/>
           </a:p>
           <a:p>
+            <a:pPr marL="0" lvl="1" indent="0">
+              <a:buNone/>
+            </a:pPr>
+            <a:endParaRPr lang="fr-FR" dirty="0" smtClean="0"/>
+          </a:p>
+          <a:p>
             <a:pPr lvl="1"/>
-            <a:r>
-              <a:rPr lang="fr-FR" b="1" dirty="0" smtClean="0">
-                <a:solidFill>
-                  <a:schemeClr val="tx1"/>
-                </a:solidFill>
-              </a:rPr>
-              <a:t>TODO : Détailler</a:t>
+            <a:endParaRPr lang="fr-FR" dirty="0" smtClean="0"/>
+          </a:p>
+          <a:p>
+            <a:pPr marL="0" lvl="1" indent="0">
+              <a:buNone/>
+            </a:pPr>
+            <a:r>
+              <a:rPr lang="fr-FR" b="1" dirty="0" smtClean="0"/>
+              <a:t>Backlog + Scrumboard</a:t>
+            </a:r>
+            <a:endParaRPr lang="fr-FR" b="1" dirty="0"/>
+          </a:p>
+          <a:p>
+            <a:pPr lvl="1"/>
+            <a:r>
+              <a:rPr lang="fr-FR" dirty="0" smtClean="0"/>
+              <a:t>«</a:t>
+            </a:r>
+            <a:r>
+              <a:rPr lang="fr-FR" dirty="0" smtClean="0"/>
+              <a:t> iceScrum »</a:t>
             </a:r>
           </a:p>
           <a:p>
             <a:pPr lvl="2"/>
             <a:r>
-              <a:rPr lang="fr-FR" b="1" dirty="0" smtClean="0"/>
-              <a:t>YED</a:t>
+              <a:rPr lang="fr-FR" dirty="0"/>
+              <a:t>Installé sur un serveur </a:t>
+            </a:r>
+            <a:r>
+              <a:rPr lang="fr-FR" dirty="0" smtClean="0"/>
+              <a:t>Web</a:t>
             </a:r>
           </a:p>
           <a:p>
             <a:pPr lvl="2"/>
-            <a:endParaRPr lang="fr-FR" b="1" dirty="0">
-              <a:solidFill>
-                <a:schemeClr val="tx1"/>
-              </a:solidFill>
-            </a:endParaRPr>
-          </a:p>
-        </p:txBody>
-      </p:sp>
-      <p:sp>
-        <p:nvSpPr>
-          <p:cNvPr id="4" name="Footer Placeholder 4"/>
+            <a:r>
+              <a:rPr lang="fr-FR" dirty="0" smtClean="0"/>
+              <a:t>Libre (GPLv3)</a:t>
+            </a:r>
+          </a:p>
+          <a:p>
+            <a:pPr marL="0" lvl="1" indent="0">
+              <a:buNone/>
+            </a:pPr>
+            <a:endParaRPr lang="fr-FR" dirty="0"/>
+          </a:p>
+          <a:p>
+            <a:pPr marL="0" lvl="1" indent="0">
+              <a:buNone/>
+            </a:pPr>
+            <a:endParaRPr lang="fr-FR" dirty="0"/>
+          </a:p>
+          <a:p>
+            <a:endParaRPr lang="en-US" dirty="0"/>
+          </a:p>
+        </p:txBody>
+      </p:sp>
+      <p:sp>
+        <p:nvSpPr>
+          <p:cNvPr id="4" name="Espace réservé du texte 3"/>
+          <p:cNvSpPr>
+            <a:spLocks noGrp="1"/>
+          </p:cNvSpPr>
+          <p:nvPr>
+            <p:ph type="body" sz="quarter" idx="13"/>
+          </p:nvPr>
+        </p:nvSpPr>
+        <p:spPr/>
+        <p:txBody>
+          <a:bodyPr/>
+          <a:lstStyle/>
+          <a:p>
+            <a:r>
+              <a:rPr lang="fr-FR" dirty="0" smtClean="0"/>
+              <a:t>Outils de gestion de projet</a:t>
+            </a:r>
+            <a:endParaRPr lang="fr-FR" dirty="0"/>
+          </a:p>
+        </p:txBody>
+      </p:sp>
+      <p:sp>
+        <p:nvSpPr>
+          <p:cNvPr id="5" name="Footer Placeholder 4"/>
           <p:cNvSpPr>
             <a:spLocks noGrp="1"/>
           </p:cNvSpPr>
@@ -5740,51 +6061,139 @@
           </a:p>
         </p:txBody>
       </p:sp>
-      <p:sp>
-        <p:nvSpPr>
-          <p:cNvPr id="5" name="Espace réservé du texte 3"/>
-          <p:cNvSpPr>
-            <a:spLocks noGrp="1"/>
-          </p:cNvSpPr>
-          <p:nvPr>
-            <p:ph type="body" sz="quarter" idx="13"/>
-          </p:nvPr>
-        </p:nvSpPr>
-        <p:spPr>
+      <p:pic>
+        <p:nvPicPr>
+          <p:cNvPr id="3074" name="Picture 2" descr="http://ipengineer.net/wp-content/uploads/2015/04/git-logo.jpg"/>
+          <p:cNvPicPr>
+            <a:picLocks noChangeAspect="1" noChangeArrowheads="1"/>
+          </p:cNvPicPr>
+          <p:nvPr/>
+        </p:nvPicPr>
+        <p:blipFill>
+          <a:blip r:embed="rId2">
+            <a:extLst>
+              <a:ext uri="{28A0092B-C50C-407E-A947-70E740481C1C}">
+                <a14:useLocalDpi xmlns:a14="http://schemas.microsoft.com/office/drawing/2010/main" val="0"/>
+              </a:ext>
+            </a:extLst>
+          </a:blip>
+          <a:srcRect/>
+          <a:stretch>
+            <a:fillRect/>
+          </a:stretch>
+        </p:blipFill>
+        <p:spPr bwMode="auto">
           <a:xfrm>
-            <a:off x="1100517" y="930584"/>
-            <a:ext cx="10034124" cy="380326"/>
+            <a:off x="4531631" y="906235"/>
+            <a:ext cx="1984149" cy="1984149"/>
           </a:xfrm>
+          <a:prstGeom prst="rect">
+            <a:avLst/>
+          </a:prstGeom>
+          <a:noFill/>
+          <a:extLst>
+            <a:ext uri="{909E8E84-426E-40DD-AFC4-6F175D3DCCD1}">
+              <a14:hiddenFill xmlns:a14="http://schemas.microsoft.com/office/drawing/2010/main">
+                <a:solidFill>
+                  <a:srgbClr val="FFFFFF"/>
+                </a:solidFill>
+              </a14:hiddenFill>
+            </a:ext>
+          </a:extLst>
         </p:spPr>
-        <p:txBody>
-          <a:bodyPr/>
-          <a:lstStyle/>
-          <a:p>
-            <a:r>
-              <a:rPr lang="fr-FR" dirty="0" smtClean="0"/>
-              <a:t>Développement</a:t>
-            </a:r>
-            <a:endParaRPr lang="fr-FR" dirty="0"/>
-          </a:p>
-        </p:txBody>
-      </p:sp>
+      </p:pic>
+      <p:pic>
+        <p:nvPicPr>
+          <p:cNvPr id="3076" name="Picture 4" descr="http://www.fastly.com/img/customers/casestudy/github_logo.png"/>
+          <p:cNvPicPr>
+            <a:picLocks noChangeAspect="1" noChangeArrowheads="1"/>
+          </p:cNvPicPr>
+          <p:nvPr/>
+        </p:nvPicPr>
+        <p:blipFill>
+          <a:blip r:embed="rId3">
+            <a:extLst>
+              <a:ext uri="{28A0092B-C50C-407E-A947-70E740481C1C}">
+                <a14:useLocalDpi xmlns:a14="http://schemas.microsoft.com/office/drawing/2010/main" val="0"/>
+              </a:ext>
+            </a:extLst>
+          </a:blip>
+          <a:srcRect/>
+          <a:stretch>
+            <a:fillRect/>
+          </a:stretch>
+        </p:blipFill>
+        <p:spPr bwMode="auto">
+          <a:xfrm>
+            <a:off x="7124019" y="1516363"/>
+            <a:ext cx="3571195" cy="763892"/>
+          </a:xfrm>
+          <a:prstGeom prst="rect">
+            <a:avLst/>
+          </a:prstGeom>
+          <a:noFill/>
+          <a:extLst>
+            <a:ext uri="{909E8E84-426E-40DD-AFC4-6F175D3DCCD1}">
+              <a14:hiddenFill xmlns:a14="http://schemas.microsoft.com/office/drawing/2010/main">
+                <a:solidFill>
+                  <a:srgbClr val="FFFFFF"/>
+                </a:solidFill>
+              </a14:hiddenFill>
+            </a:ext>
+          </a:extLst>
+        </p:spPr>
+      </p:pic>
+      <p:pic>
+        <p:nvPicPr>
+          <p:cNvPr id="3080" name="Picture 8" descr="http://forum.icescrum.org/styles/icescrum/theme/images/logo.png"/>
+          <p:cNvPicPr>
+            <a:picLocks noChangeAspect="1" noChangeArrowheads="1"/>
+          </p:cNvPicPr>
+          <p:nvPr/>
+        </p:nvPicPr>
+        <p:blipFill>
+          <a:blip r:embed="rId4">
+            <a:extLst>
+              <a:ext uri="{28A0092B-C50C-407E-A947-70E740481C1C}">
+                <a14:useLocalDpi xmlns:a14="http://schemas.microsoft.com/office/drawing/2010/main" val="0"/>
+              </a:ext>
+            </a:extLst>
+          </a:blip>
+          <a:srcRect/>
+          <a:stretch>
+            <a:fillRect/>
+          </a:stretch>
+        </p:blipFill>
+        <p:spPr bwMode="auto">
+          <a:xfrm>
+            <a:off x="4531631" y="3080429"/>
+            <a:ext cx="1905000" cy="485775"/>
+          </a:xfrm>
+          <a:prstGeom prst="rect">
+            <a:avLst/>
+          </a:prstGeom>
+          <a:noFill/>
+          <a:extLst>
+            <a:ext uri="{909E8E84-426E-40DD-AFC4-6F175D3DCCD1}">
+              <a14:hiddenFill xmlns:a14="http://schemas.microsoft.com/office/drawing/2010/main">
+                <a:solidFill>
+                  <a:srgbClr val="FFFFFF"/>
+                </a:solidFill>
+              </a14:hiddenFill>
+            </a:ext>
+          </a:extLst>
+        </p:spPr>
+      </p:pic>
     </p:spTree>
     <p:extLst>
       <p:ext uri="{BB962C8B-B14F-4D97-AF65-F5344CB8AC3E}">
-        <p14:creationId xmlns:p14="http://schemas.microsoft.com/office/powerpoint/2010/main" val="534818002"/>
+        <p14:creationId xmlns:p14="http://schemas.microsoft.com/office/powerpoint/2010/main" val="1524246749"/>
       </p:ext>
     </p:extLst>
   </p:cSld>
   <p:clrMapOvr>
     <a:masterClrMapping/>
   </p:clrMapOvr>
-  <p:timing>
-    <p:tnLst>
-      <p:par>
-        <p:cTn id="1" dur="indefinite" restart="never" nodeType="tmRoot"/>
-      </p:par>
-    </p:tnLst>
-  </p:timing>
 </p:sld>
 </file>
 
@@ -5817,267 +6226,6 @@
         </p:nvSpPr>
         <p:spPr/>
         <p:txBody>
-          <a:bodyPr/>
-          <a:lstStyle/>
-          <a:p>
-            <a:r>
-              <a:rPr lang="fr-FR" dirty="0"/>
-              <a:t>Choix technologiques</a:t>
-            </a:r>
-            <a:endParaRPr lang="en-US" dirty="0"/>
-          </a:p>
-        </p:txBody>
-      </p:sp>
-      <p:sp>
-        <p:nvSpPr>
-          <p:cNvPr id="3" name="Espace réservé du contenu 2"/>
-          <p:cNvSpPr>
-            <a:spLocks noGrp="1"/>
-          </p:cNvSpPr>
-          <p:nvPr>
-            <p:ph idx="1"/>
-          </p:nvPr>
-        </p:nvSpPr>
-        <p:spPr/>
-        <p:txBody>
-          <a:bodyPr/>
-          <a:lstStyle/>
-          <a:p>
-            <a:r>
-              <a:rPr lang="fr-FR" dirty="0"/>
-              <a:t>Gestionnaire de version</a:t>
-            </a:r>
-          </a:p>
-          <a:p>
-            <a:pPr lvl="1"/>
-            <a:r>
-              <a:rPr lang="fr-FR" dirty="0"/>
-              <a:t>Git en dépôt public sur </a:t>
-            </a:r>
-            <a:r>
-              <a:rPr lang="fr-FR" dirty="0" smtClean="0"/>
-              <a:t>GitHub</a:t>
-            </a:r>
-          </a:p>
-          <a:p>
-            <a:pPr lvl="1"/>
-            <a:r>
-              <a:rPr lang="fr-FR" dirty="0" smtClean="0"/>
-              <a:t>TODO : Licence</a:t>
-            </a:r>
-          </a:p>
-          <a:p>
-            <a:pPr marL="0" lvl="1" indent="0">
-              <a:buNone/>
-            </a:pPr>
-            <a:endParaRPr lang="fr-FR" dirty="0" smtClean="0"/>
-          </a:p>
-          <a:p>
-            <a:pPr marL="0" lvl="1" indent="0">
-              <a:buNone/>
-            </a:pPr>
-            <a:r>
-              <a:rPr lang="fr-FR" b="1" dirty="0" smtClean="0"/>
-              <a:t>Backlog + Scrumboard</a:t>
-            </a:r>
-            <a:endParaRPr lang="fr-FR" b="1" dirty="0"/>
-          </a:p>
-          <a:p>
-            <a:pPr lvl="1"/>
-            <a:r>
-              <a:rPr lang="fr-FR" dirty="0" smtClean="0"/>
-              <a:t>Installation de </a:t>
-            </a:r>
-            <a:r>
-              <a:rPr lang="fr-FR" dirty="0" smtClean="0"/>
-              <a:t>« iceScrum »</a:t>
-            </a:r>
-            <a:endParaRPr lang="fr-FR" dirty="0" smtClean="0"/>
-          </a:p>
-          <a:p>
-            <a:pPr lvl="2"/>
-            <a:r>
-              <a:rPr lang="fr-FR" dirty="0"/>
-              <a:t>Installé sur un serveur </a:t>
-            </a:r>
-            <a:r>
-              <a:rPr lang="fr-FR" dirty="0" smtClean="0"/>
-              <a:t>Web</a:t>
-            </a:r>
-          </a:p>
-          <a:p>
-            <a:pPr lvl="2"/>
-            <a:r>
-              <a:rPr lang="fr-FR" dirty="0" smtClean="0"/>
-              <a:t>Libre (GPLv3)</a:t>
-            </a:r>
-          </a:p>
-          <a:p>
-            <a:pPr marL="0" lvl="1" indent="0">
-              <a:buNone/>
-            </a:pPr>
-            <a:endParaRPr lang="fr-FR" dirty="0"/>
-          </a:p>
-          <a:p>
-            <a:pPr marL="0" lvl="1" indent="0">
-              <a:buNone/>
-            </a:pPr>
-            <a:endParaRPr lang="fr-FR" dirty="0"/>
-          </a:p>
-          <a:p>
-            <a:endParaRPr lang="en-US" dirty="0"/>
-          </a:p>
-        </p:txBody>
-      </p:sp>
-      <p:sp>
-        <p:nvSpPr>
-          <p:cNvPr id="4" name="Espace réservé du texte 3"/>
-          <p:cNvSpPr>
-            <a:spLocks noGrp="1"/>
-          </p:cNvSpPr>
-          <p:nvPr>
-            <p:ph type="body" sz="quarter" idx="13"/>
-          </p:nvPr>
-        </p:nvSpPr>
-        <p:spPr/>
-        <p:txBody>
-          <a:bodyPr/>
-          <a:lstStyle/>
-          <a:p>
-            <a:r>
-              <a:rPr lang="fr-FR" dirty="0" smtClean="0"/>
-              <a:t>Outils de gestion de projet</a:t>
-            </a:r>
-            <a:endParaRPr lang="fr-FR" dirty="0"/>
-          </a:p>
-        </p:txBody>
-      </p:sp>
-      <p:sp>
-        <p:nvSpPr>
-          <p:cNvPr id="5" name="Footer Placeholder 4"/>
-          <p:cNvSpPr>
-            <a:spLocks noGrp="1"/>
-          </p:cNvSpPr>
-          <p:nvPr>
-            <p:ph type="ftr" sz="quarter" idx="11"/>
-          </p:nvPr>
-        </p:nvSpPr>
-        <p:spPr>
-          <a:xfrm>
-            <a:off x="1347106" y="6366765"/>
-            <a:ext cx="10082893" cy="274320"/>
-          </a:xfrm>
-        </p:spPr>
-        <p:txBody>
-          <a:bodyPr/>
-          <a:lstStyle/>
-          <a:p>
-            <a:r>
-              <a:rPr lang="fr-FR" cap="small" dirty="0" smtClean="0"/>
-              <a:t>Introduction </a:t>
-            </a:r>
-            <a:r>
-              <a:rPr lang="fr-FR" cap="small" dirty="0"/>
-              <a:t>au </a:t>
-            </a:r>
-            <a:r>
-              <a:rPr lang="fr-FR" cap="small" dirty="0" smtClean="0"/>
-              <a:t>projet - </a:t>
-            </a:r>
-            <a:r>
-              <a:rPr lang="fr-FR" cap="small" dirty="0"/>
-              <a:t>Objectifs principaux </a:t>
-            </a:r>
-            <a:r>
-              <a:rPr lang="fr-FR" cap="small" dirty="0" smtClean="0"/>
-              <a:t>- </a:t>
-            </a:r>
-            <a:r>
-              <a:rPr lang="fr-FR" cap="small" dirty="0"/>
-              <a:t>Architecture </a:t>
-            </a:r>
-            <a:r>
-              <a:rPr lang="fr-FR" cap="small" dirty="0" smtClean="0"/>
-              <a:t>- </a:t>
-            </a:r>
-            <a:r>
-              <a:rPr lang="fr-FR" cap="small" dirty="0"/>
-              <a:t>Gestion du projet </a:t>
-            </a:r>
-            <a:r>
-              <a:rPr lang="fr-FR" cap="small" dirty="0" smtClean="0"/>
-              <a:t>- </a:t>
-            </a:r>
-            <a:r>
-              <a:rPr lang="fr-FR" u="sng" cap="small" dirty="0"/>
-              <a:t>Choix </a:t>
-            </a:r>
-            <a:r>
-              <a:rPr lang="fr-FR" u="sng" cap="small" dirty="0" smtClean="0"/>
-              <a:t>technologiques</a:t>
-            </a:r>
-            <a:r>
-              <a:rPr lang="en-US" cap="small" dirty="0"/>
-              <a:t> </a:t>
-            </a:r>
-            <a:r>
-              <a:rPr lang="en-US" cap="small" dirty="0" smtClean="0"/>
-              <a:t>- </a:t>
-            </a:r>
-            <a:r>
-              <a:rPr lang="fr-FR" cap="small" dirty="0"/>
-              <a:t>Travaux </a:t>
-            </a:r>
-            <a:r>
-              <a:rPr lang="fr-FR" cap="small" dirty="0" smtClean="0"/>
-              <a:t>préparatoires</a:t>
-            </a:r>
-            <a:endParaRPr lang="fr-FR" cap="small" dirty="0"/>
-          </a:p>
-        </p:txBody>
-      </p:sp>
-    </p:spTree>
-    <p:extLst>
-      <p:ext uri="{BB962C8B-B14F-4D97-AF65-F5344CB8AC3E}">
-        <p14:creationId xmlns:p14="http://schemas.microsoft.com/office/powerpoint/2010/main" val="1524246749"/>
-      </p:ext>
-    </p:extLst>
-  </p:cSld>
-  <p:clrMapOvr>
-    <a:masterClrMapping/>
-  </p:clrMapOvr>
-</p:sld>
-</file>
-
-<file path=ppt/slides/slide16.xml><?xml version="1.0" encoding="utf-8"?>
-<p:sld xmlns:a="http://schemas.openxmlformats.org/drawingml/2006/main" xmlns:r="http://schemas.openxmlformats.org/officeDocument/2006/relationships" xmlns:p="http://schemas.openxmlformats.org/presentationml/2006/main">
-  <p:cSld>
-    <p:spTree>
-      <p:nvGrpSpPr>
-        <p:cNvPr id="1" name=""/>
-        <p:cNvGrpSpPr/>
-        <p:nvPr/>
-      </p:nvGrpSpPr>
-      <p:grpSpPr>
-        <a:xfrm>
-          <a:off x="0" y="0"/>
-          <a:ext cx="0" cy="0"/>
-          <a:chOff x="0" y="0"/>
-          <a:chExt cx="0" cy="0"/>
-        </a:xfrm>
-      </p:grpSpPr>
-      <p:sp>
-        <p:nvSpPr>
-          <p:cNvPr id="2" name="Titre 1"/>
-          <p:cNvSpPr>
-            <a:spLocks noGrp="1"/>
-          </p:cNvSpPr>
-          <p:nvPr>
-            <p:ph type="title"/>
-          </p:nvPr>
-        </p:nvSpPr>
-        <p:spPr/>
-        <p:txBody>
           <a:bodyPr>
             <a:normAutofit fontScale="90000"/>
           </a:bodyPr>
@@ -6143,28 +6291,85 @@
                   <a:schemeClr val="tx1"/>
                 </a:solidFill>
               </a:rPr>
-              <a:t>Bot twitter</a:t>
-            </a:r>
-          </a:p>
-          <a:p>
-            <a:pPr lvl="1"/>
+              <a:t>Bot </a:t>
+            </a:r>
             <a:r>
               <a:rPr lang="fr-FR" dirty="0" smtClean="0">
                 <a:solidFill>
                   <a:schemeClr val="tx1"/>
                 </a:solidFill>
               </a:rPr>
-              <a:t>Parseur sémantique</a:t>
-            </a:r>
-          </a:p>
-          <a:p>
+              <a:t>Twitter</a:t>
+            </a:r>
+            <a:endParaRPr lang="fr-FR" dirty="0" smtClean="0">
+              <a:solidFill>
+                <a:schemeClr val="tx1"/>
+              </a:solidFill>
+            </a:endParaRPr>
+          </a:p>
+          <a:p>
+            <a:pPr lvl="1"/>
             <a:r>
               <a:rPr lang="fr-FR" dirty="0" smtClean="0">
                 <a:solidFill>
                   <a:schemeClr val="tx1"/>
                 </a:solidFill>
               </a:rPr>
-              <a:t>Recherche d’outils de gestion de projet</a:t>
+              <a:t>Parseur </a:t>
+            </a:r>
+            <a:r>
+              <a:rPr lang="fr-FR" dirty="0" smtClean="0">
+                <a:solidFill>
+                  <a:schemeClr val="tx1"/>
+                </a:solidFill>
+              </a:rPr>
+              <a:t>sémantique</a:t>
+            </a:r>
+          </a:p>
+          <a:p>
+            <a:pPr marL="0" lvl="1" indent="0">
+              <a:buNone/>
+            </a:pPr>
+            <a:endParaRPr lang="fr-FR" dirty="0" smtClean="0">
+              <a:solidFill>
+                <a:schemeClr val="tx1"/>
+              </a:solidFill>
+            </a:endParaRPr>
+          </a:p>
+          <a:p>
+            <a:r>
+              <a:rPr lang="fr-FR" dirty="0" smtClean="0">
+                <a:solidFill>
+                  <a:schemeClr val="tx1"/>
+                </a:solidFill>
+              </a:rPr>
+              <a:t>Mise en place des outils </a:t>
+            </a:r>
+            <a:r>
+              <a:rPr lang="fr-FR" dirty="0" smtClean="0">
+                <a:solidFill>
+                  <a:schemeClr val="tx1"/>
+                </a:solidFill>
+              </a:rPr>
+              <a:t>de gestion de </a:t>
+            </a:r>
+            <a:r>
+              <a:rPr lang="fr-FR" dirty="0" smtClean="0">
+                <a:solidFill>
+                  <a:schemeClr val="tx1"/>
+                </a:solidFill>
+              </a:rPr>
+              <a:t>projet</a:t>
+            </a:r>
+          </a:p>
+          <a:p>
+            <a:r>
+              <a:rPr lang="fr-FR" dirty="0" smtClean="0">
+                <a:solidFill>
+                  <a:schemeClr val="tx1"/>
+                </a:solidFill>
+              </a:rPr>
+              <a:t>Apprentissage de l’utilisation de l’outil iceScrum</a:t>
             </a:r>
           </a:p>
           <a:p>
@@ -6215,15 +6420,7 @@
                   <a:schemeClr val="tx1"/>
                 </a:solidFill>
               </a:rPr>
-              <a:t>API Météo (</a:t>
-            </a:r>
-            <a:r>
-              <a:rPr lang="fr-FR" dirty="0" err="1" smtClean="0">
-                <a:solidFill>
-                  <a:schemeClr val="tx1"/>
-                </a:solidFill>
-              </a:rPr>
-              <a:t>OpenWeatherMap</a:t>
+              <a:t>API Météo (OpenWeatherMap</a:t>
             </a:r>
             <a:r>
               <a:rPr lang="fr-FR" dirty="0" smtClean="0">
@@ -6232,6 +6429,13 @@
                 </a:solidFill>
               </a:rPr>
               <a:t>)</a:t>
+            </a:r>
+          </a:p>
+          <a:p>
+            <a:pPr lvl="1"/>
+            <a:r>
+              <a:rPr lang="fr-FR" dirty="0" smtClean="0"/>
+              <a:t>Module d’interfaçage avec une API RSS (Reuteurs RSS)</a:t>
             </a:r>
             <a:endParaRPr lang="fr-FR" dirty="0">
               <a:solidFill>
@@ -6353,7 +6557,7 @@
 </p:sld>
 </file>
 
-<file path=ppt/slides/slide17.xml><?xml version="1.0" encoding="utf-8"?>
+<file path=ppt/slides/slide16.xml><?xml version="1.0" encoding="utf-8"?>
 <p:sld xmlns:a="http://schemas.openxmlformats.org/drawingml/2006/main" xmlns:r="http://schemas.openxmlformats.org/officeDocument/2006/relationships" xmlns:p="http://schemas.openxmlformats.org/presentationml/2006/main">
   <p:cSld>
     <p:spTree>
@@ -6506,11 +6710,7 @@
             </a:pPr>
             <a:r>
               <a:rPr lang="fr-FR" dirty="0" smtClean="0"/>
-              <a:t>Introduction au </a:t>
-            </a:r>
-            <a:r>
-              <a:rPr lang="fr-FR" dirty="0" smtClean="0"/>
-              <a:t>projet</a:t>
+              <a:t>Introduction au projet</a:t>
             </a:r>
           </a:p>
           <a:p>
@@ -6596,15 +6796,11 @@
             </a:pPr>
             <a:r>
               <a:rPr lang="fr-FR" dirty="0" smtClean="0"/>
-              <a:t>Gestion du projet //</a:t>
-            </a:r>
-            <a:r>
-              <a:rPr lang="fr-FR" dirty="0" smtClean="0">
-                <a:solidFill>
-                  <a:schemeClr val="accent6"/>
-                </a:solidFill>
-              </a:rPr>
-              <a:t>Scrum  – Compétences techniques de chacun – Equipe</a:t>
+              <a:t>Gestion du </a:t>
+            </a:r>
+            <a:r>
+              <a:rPr lang="fr-FR" dirty="0" smtClean="0"/>
+              <a:t>projet</a:t>
             </a:r>
           </a:p>
           <a:p>
@@ -6654,11 +6850,7 @@
             </a:pPr>
             <a:r>
               <a:rPr lang="fr-FR" dirty="0" smtClean="0"/>
-              <a:t>Travaux </a:t>
-            </a:r>
-            <a:r>
-              <a:rPr lang="fr-FR" dirty="0" smtClean="0"/>
-              <a:t>préparatoires</a:t>
+              <a:t>Travaux préparatoires</a:t>
             </a:r>
             <a:endParaRPr lang="fr-FR" dirty="0"/>
           </a:p>
@@ -6858,10 +7050,9 @@
               <a:t>Intelligence artificielle visant à simuler le comportement d’un utilisateur </a:t>
             </a:r>
             <a:r>
-              <a:rPr lang="fr-FR" dirty="0" err="1" smtClean="0"/>
+              <a:rPr lang="fr-FR" dirty="0" smtClean="0"/>
               <a:t>Twitter</a:t>
             </a:r>
-            <a:endParaRPr lang="fr-FR" dirty="0" smtClean="0"/>
           </a:p>
           <a:p>
             <a:endParaRPr lang="fr-FR" dirty="0"/>
@@ -6927,6 +7118,59 @@
               <a:rPr lang="fr-FR" dirty="0" smtClean="0"/>
               <a:t>)</a:t>
             </a:r>
+          </a:p>
+          <a:p>
+            <a:pPr lvl="2"/>
+            <a:endParaRPr lang="fr-FR" dirty="0"/>
+          </a:p>
+          <a:p>
+            <a:r>
+              <a:rPr lang="fr-FR" dirty="0" smtClean="0"/>
+              <a:t>Particularité de NARVIS</a:t>
+            </a:r>
+            <a:endParaRPr lang="fr-FR" dirty="0"/>
+          </a:p>
+          <a:p>
+            <a:pPr lvl="1"/>
+            <a:r>
+              <a:rPr lang="fr-FR" dirty="0" smtClean="0"/>
+              <a:t>Accéder </a:t>
+            </a:r>
+            <a:r>
+              <a:rPr lang="fr-FR" dirty="0"/>
+              <a:t>à des sources de données externes</a:t>
+            </a:r>
+          </a:p>
+          <a:p>
+            <a:pPr lvl="1"/>
+            <a:r>
+              <a:rPr lang="fr-FR" dirty="0" smtClean="0"/>
+              <a:t>Lire </a:t>
+            </a:r>
+            <a:r>
+              <a:rPr lang="fr-FR" dirty="0"/>
+              <a:t>et de comprendre des questions posées par des utilisateurs</a:t>
+            </a:r>
+          </a:p>
+          <a:p>
+            <a:pPr lvl="1"/>
+            <a:r>
+              <a:rPr lang="fr-FR" dirty="0"/>
+              <a:t>A</a:t>
+            </a:r>
+            <a:r>
+              <a:rPr lang="fr-FR" dirty="0" smtClean="0"/>
+              <a:t>pporter </a:t>
+            </a:r>
+            <a:r>
+              <a:rPr lang="fr-FR" dirty="0"/>
+              <a:t>des réponses lisibles à ces questions</a:t>
+            </a:r>
+          </a:p>
+          <a:p>
+            <a:pPr marL="237744" lvl="2" indent="0">
+              <a:buNone/>
+            </a:pPr>
             <a:endParaRPr lang="fr-FR" dirty="0"/>
           </a:p>
         </p:txBody>
@@ -6948,15 +7192,7 @@
           <a:p>
             <a:r>
               <a:rPr lang="fr-FR" dirty="0"/>
-              <a:t>Qu’est-ce qu’un bot </a:t>
-            </a:r>
-            <a:r>
-              <a:rPr lang="fr-FR" dirty="0" err="1"/>
-              <a:t>Twitter</a:t>
-            </a:r>
-            <a:r>
-              <a:rPr lang="fr-FR" dirty="0"/>
-              <a:t> </a:t>
+              <a:t>Qu’est-ce qu’un bot Twitter </a:t>
             </a:r>
             <a:r>
               <a:rPr lang="fr-FR" dirty="0" smtClean="0"/>
@@ -7133,16 +7369,13 @@
         </p:nvSpPr>
         <p:spPr/>
         <p:txBody>
-          <a:bodyPr>
-            <a:normAutofit/>
-          </a:bodyPr>
+          <a:bodyPr/>
           <a:lstStyle/>
           <a:p>
             <a:r>
               <a:rPr lang="fr-FR" dirty="0"/>
               <a:t>Introduction au projet	</a:t>
             </a:r>
-            <a:endParaRPr lang="fr-FR" sz="2500" dirty="0"/>
           </a:p>
         </p:txBody>
       </p:sp>
@@ -7162,30 +7395,99 @@
           <a:lstStyle/>
           <a:p>
             <a:r>
+              <a:rPr lang="fr-FR" dirty="0"/>
+              <a:t>Découvertes</a:t>
+            </a:r>
+          </a:p>
+          <a:p>
+            <a:pPr lvl="1"/>
+            <a:r>
+              <a:rPr lang="fr-FR" dirty="0"/>
+              <a:t>Recherche sur une intelligence artificielle</a:t>
+            </a:r>
+          </a:p>
+          <a:p>
+            <a:pPr lvl="1"/>
+            <a:r>
+              <a:rPr lang="fr-FR" dirty="0"/>
+              <a:t>Comprendre l’analyse </a:t>
+            </a:r>
+            <a:r>
               <a:rPr lang="fr-FR" dirty="0" smtClean="0"/>
-              <a:t>Système capable </a:t>
+              <a:t>sémantique</a:t>
+            </a:r>
+          </a:p>
+          <a:p>
+            <a:pPr marL="0" lvl="1" indent="0">
+              <a:buNone/>
+            </a:pPr>
+            <a:endParaRPr lang="fr-FR" dirty="0"/>
+          </a:p>
+          <a:p>
+            <a:r>
+              <a:rPr lang="fr-FR" dirty="0"/>
+              <a:t>Approfondissement </a:t>
             </a:r>
           </a:p>
           <a:p>
             <a:pPr lvl="1"/>
             <a:r>
+              <a:rPr lang="fr-FR" dirty="0"/>
+              <a:t>Architecture logicielle</a:t>
+            </a:r>
+          </a:p>
+          <a:p>
+            <a:pPr lvl="1"/>
+            <a:r>
+              <a:rPr lang="fr-FR" dirty="0"/>
+              <a:t>Modélisation de données</a:t>
+            </a:r>
+          </a:p>
+          <a:p>
+            <a:pPr lvl="1"/>
+            <a:r>
+              <a:rPr lang="fr-FR" dirty="0"/>
+              <a:t>Langage </a:t>
+            </a:r>
+            <a:r>
               <a:rPr lang="fr-FR" dirty="0" smtClean="0"/>
-              <a:t>D’accéder à des sources de données externes</a:t>
+              <a:t>Java</a:t>
+            </a:r>
+          </a:p>
+          <a:p>
+            <a:pPr marL="0" lvl="1" indent="0">
+              <a:buNone/>
+            </a:pPr>
+            <a:endParaRPr lang="fr-FR" dirty="0"/>
+          </a:p>
+          <a:p>
+            <a:r>
+              <a:rPr lang="fr-FR" dirty="0"/>
+              <a:t>Expérience</a:t>
             </a:r>
           </a:p>
           <a:p>
             <a:pPr lvl="1"/>
             <a:r>
-              <a:rPr lang="fr-FR" dirty="0" smtClean="0"/>
-              <a:t>De lire et de comprendre des questions posées par des utilisateurs</a:t>
+              <a:rPr lang="fr-FR" dirty="0"/>
+              <a:t>Travail en équipe</a:t>
             </a:r>
           </a:p>
           <a:p>
             <a:pPr lvl="1"/>
             <a:r>
-              <a:rPr lang="fr-FR" dirty="0" smtClean="0"/>
-              <a:t>D’apporter des réponses lisibles à ces questions</a:t>
-            </a:r>
+              <a:rPr lang="fr-FR" dirty="0"/>
+              <a:t>Gestion de projet</a:t>
+            </a:r>
+          </a:p>
+          <a:p>
+            <a:pPr lvl="1"/>
+            <a:r>
+              <a:rPr lang="fr-FR" dirty="0"/>
+              <a:t>Méthode agile</a:t>
+            </a:r>
+          </a:p>
+          <a:p>
             <a:endParaRPr lang="fr-FR" dirty="0"/>
           </a:p>
         </p:txBody>
@@ -7200,26 +7502,24 @@
             <p:ph type="body" sz="quarter" idx="13"/>
           </p:nvPr>
         </p:nvSpPr>
-        <p:spPr>
-          <a:xfrm>
-            <a:off x="1100517" y="930584"/>
-            <a:ext cx="10034124" cy="380326"/>
-          </a:xfrm>
-        </p:spPr>
+        <p:spPr/>
         <p:txBody>
           <a:bodyPr/>
           <a:lstStyle/>
           <a:p>
             <a:r>
               <a:rPr lang="fr-FR" dirty="0"/>
-              <a:t>Particularités de N.A.R.V.I.S.</a:t>
-            </a:r>
-          </a:p>
-        </p:txBody>
-      </p:sp>
-      <p:sp>
-        <p:nvSpPr>
-          <p:cNvPr id="7" name="Footer Placeholder 4"/>
+              <a:t>Nos motivations</a:t>
+            </a:r>
+          </a:p>
+          <a:p>
+            <a:endParaRPr lang="fr-FR" dirty="0"/>
+          </a:p>
+        </p:txBody>
+      </p:sp>
+      <p:sp>
+        <p:nvSpPr>
+          <p:cNvPr id="5" name="Footer Placeholder 4"/>
           <p:cNvSpPr>
             <a:spLocks noGrp="1"/>
           </p:cNvSpPr>
@@ -7308,7 +7608,7 @@
     </p:spTree>
     <p:extLst>
       <p:ext uri="{BB962C8B-B14F-4D97-AF65-F5344CB8AC3E}">
-        <p14:creationId xmlns:p14="http://schemas.microsoft.com/office/powerpoint/2010/main" val="1484971186"/>
+        <p14:creationId xmlns:p14="http://schemas.microsoft.com/office/powerpoint/2010/main" val="737426633"/>
       </p:ext>
     </p:extLst>
   </p:cSld>
@@ -7354,157 +7654,130 @@
         </p:nvSpPr>
         <p:spPr/>
         <p:txBody>
-          <a:bodyPr/>
+          <a:bodyPr>
+            <a:normAutofit/>
+          </a:bodyPr>
           <a:lstStyle/>
           <a:p>
             <a:r>
+              <a:rPr lang="fr-FR" dirty="0" smtClean="0"/>
+              <a:t>Objectifs principaux</a:t>
+            </a:r>
+            <a:endParaRPr lang="fr-FR" sz="2500" dirty="0"/>
+          </a:p>
+        </p:txBody>
+      </p:sp>
+      <p:sp>
+        <p:nvSpPr>
+          <p:cNvPr id="3" name="Espace réservé du contenu 2"/>
+          <p:cNvSpPr>
+            <a:spLocks noGrp="1"/>
+          </p:cNvSpPr>
+          <p:nvPr>
+            <p:ph idx="1"/>
+          </p:nvPr>
+        </p:nvSpPr>
+        <p:spPr/>
+        <p:txBody>
+          <a:bodyPr>
+            <a:normAutofit/>
+          </a:bodyPr>
+          <a:lstStyle/>
+          <a:p>
+            <a:r>
+              <a:rPr lang="fr-FR" dirty="0" smtClean="0"/>
+              <a:t>N.A.R.V.I.S</a:t>
+            </a:r>
+          </a:p>
+          <a:p>
+            <a:pPr lvl="1"/>
+            <a:r>
+              <a:rPr lang="fr-FR" dirty="0" smtClean="0"/>
+              <a:t>Interfacer </a:t>
+            </a:r>
+            <a:r>
               <a:rPr lang="fr-FR" dirty="0"/>
-              <a:t>Introduction au projet	</a:t>
-            </a:r>
-          </a:p>
-        </p:txBody>
-      </p:sp>
-      <p:sp>
-        <p:nvSpPr>
-          <p:cNvPr id="3" name="Espace réservé du contenu 2"/>
-          <p:cNvSpPr>
-            <a:spLocks noGrp="1"/>
-          </p:cNvSpPr>
-          <p:nvPr>
-            <p:ph idx="1"/>
-          </p:nvPr>
-        </p:nvSpPr>
-        <p:spPr/>
-        <p:txBody>
-          <a:bodyPr/>
-          <a:lstStyle/>
-          <a:p>
+              <a:t>avec l’API Twitter</a:t>
+            </a:r>
+            <a:r>
+              <a:rPr lang="fr-FR" dirty="0" smtClean="0"/>
+              <a:t>.</a:t>
+            </a:r>
+            <a:endParaRPr lang="fr-FR" dirty="0"/>
+          </a:p>
+          <a:p>
+            <a:pPr lvl="1"/>
             <a:r>
               <a:rPr lang="fr-FR" dirty="0"/>
-              <a:t>Découvertes</a:t>
-            </a:r>
+              <a:t>Analyser la sémantique des </a:t>
+            </a:r>
+            <a:r>
+              <a:rPr lang="fr-FR" dirty="0" smtClean="0"/>
+              <a:t>tweets</a:t>
+            </a:r>
+            <a:endParaRPr lang="fr-FR" dirty="0"/>
           </a:p>
           <a:p>
             <a:pPr lvl="1"/>
             <a:r>
               <a:rPr lang="fr-FR" dirty="0"/>
-              <a:t>Recherche sur une intelligence artificielle</a:t>
-            </a:r>
+              <a:t>Réalisation d’actions correspondantes</a:t>
+            </a:r>
+          </a:p>
+          <a:p>
+            <a:pPr lvl="2"/>
+            <a:r>
+              <a:rPr lang="fr-FR" dirty="0" smtClean="0"/>
+              <a:t>Basées sur différents modules</a:t>
+            </a:r>
+            <a:endParaRPr lang="fr-FR" dirty="0"/>
           </a:p>
           <a:p>
             <a:pPr lvl="1"/>
             <a:r>
               <a:rPr lang="fr-FR" dirty="0"/>
-              <a:t>Comprendre l’analyse </a:t>
+              <a:t>Construire un tweet de </a:t>
             </a:r>
             <a:r>
               <a:rPr lang="fr-FR" dirty="0" smtClean="0"/>
-              <a:t>sémantique</a:t>
-            </a:r>
-          </a:p>
-          <a:p>
-            <a:pPr marL="0" lvl="1" indent="0">
-              <a:buNone/>
-            </a:pPr>
+              <a:t>réponse</a:t>
+            </a:r>
+          </a:p>
+          <a:p>
+            <a:pPr lvl="1"/>
+            <a:endParaRPr lang="fr-FR" dirty="0" smtClean="0"/>
+          </a:p>
+          <a:p>
+            <a:r>
+              <a:rPr lang="fr-FR" dirty="0" smtClean="0"/>
+              <a:t>Projet</a:t>
+            </a:r>
+          </a:p>
+          <a:p>
+            <a:pPr lvl="1"/>
+            <a:r>
+              <a:rPr lang="fr-FR" dirty="0" smtClean="0"/>
+              <a:t>Travail avec la méthode Scrum</a:t>
+            </a:r>
+          </a:p>
+          <a:p>
+            <a:pPr lvl="1"/>
+            <a:r>
+              <a:rPr lang="fr-FR" dirty="0" smtClean="0"/>
+              <a:t>Travail en équipe</a:t>
+            </a:r>
+          </a:p>
+          <a:p>
             <a:endParaRPr lang="fr-FR" dirty="0"/>
           </a:p>
           <a:p>
-            <a:r>
-              <a:rPr lang="fr-FR" dirty="0"/>
-              <a:t>Approfondissement </a:t>
-            </a:r>
-          </a:p>
-          <a:p>
-            <a:pPr lvl="1"/>
-            <a:r>
-              <a:rPr lang="fr-FR" dirty="0"/>
-              <a:t>Architecture logicielle</a:t>
-            </a:r>
-          </a:p>
-          <a:p>
-            <a:pPr lvl="1"/>
-            <a:r>
-              <a:rPr lang="fr-FR" dirty="0"/>
-              <a:t>Modélisation de données</a:t>
-            </a:r>
-          </a:p>
-          <a:p>
-            <a:pPr lvl="1"/>
-            <a:r>
-              <a:rPr lang="fr-FR" dirty="0"/>
-              <a:t>Langage </a:t>
-            </a:r>
-            <a:r>
-              <a:rPr lang="fr-FR" dirty="0" smtClean="0"/>
-              <a:t>Java</a:t>
-            </a:r>
-          </a:p>
-          <a:p>
-            <a:pPr marL="0" lvl="1" indent="0">
-              <a:buNone/>
-            </a:pPr>
             <a:endParaRPr lang="fr-FR" dirty="0"/>
           </a:p>
-          <a:p>
-            <a:r>
-              <a:rPr lang="fr-FR" dirty="0"/>
-              <a:t>Expérience</a:t>
-            </a:r>
-          </a:p>
-          <a:p>
-            <a:pPr lvl="1"/>
-            <a:r>
-              <a:rPr lang="fr-FR" dirty="0"/>
-              <a:t>Travail en équipe</a:t>
-            </a:r>
-          </a:p>
-          <a:p>
-            <a:pPr lvl="1"/>
-            <a:r>
-              <a:rPr lang="fr-FR" dirty="0"/>
-              <a:t>Gestion de projet</a:t>
-            </a:r>
-          </a:p>
-          <a:p>
-            <a:pPr lvl="1"/>
-            <a:r>
-              <a:rPr lang="fr-FR" dirty="0"/>
-              <a:t>Méthode agile</a:t>
-            </a:r>
-          </a:p>
-          <a:p>
-            <a:endParaRPr lang="fr-FR" dirty="0"/>
-          </a:p>
-        </p:txBody>
-      </p:sp>
-      <p:sp>
-        <p:nvSpPr>
-          <p:cNvPr id="4" name="Espace réservé du texte 3"/>
-          <p:cNvSpPr>
-            <a:spLocks noGrp="1"/>
-          </p:cNvSpPr>
-          <p:nvPr>
-            <p:ph type="body" sz="quarter" idx="13"/>
-          </p:nvPr>
-        </p:nvSpPr>
-        <p:spPr/>
-        <p:txBody>
-          <a:bodyPr/>
-          <a:lstStyle/>
-          <a:p>
-            <a:r>
-              <a:rPr lang="fr-FR" dirty="0"/>
-              <a:t>Nos motivations</a:t>
-            </a:r>
-          </a:p>
-          <a:p>
-            <a:endParaRPr lang="fr-FR" dirty="0"/>
-          </a:p>
-        </p:txBody>
-      </p:sp>
-      <p:sp>
-        <p:nvSpPr>
-          <p:cNvPr id="5" name="Footer Placeholder 4"/>
+        </p:txBody>
+      </p:sp>
+      <p:sp>
+        <p:nvSpPr>
+          <p:cNvPr id="6" name="Footer Placeholder 4"/>
           <p:cNvSpPr>
             <a:spLocks noGrp="1"/>
           </p:cNvSpPr>
@@ -7523,24 +7796,24 @@
           <a:lstStyle/>
           <a:p>
             <a:r>
-              <a:rPr lang="fr-FR" u="sng" cap="small" dirty="0" smtClean="0"/>
+              <a:rPr lang="fr-FR" cap="small" dirty="0" smtClean="0"/>
               <a:t>Introduction </a:t>
             </a:r>
             <a:r>
+              <a:rPr lang="fr-FR" cap="small" dirty="0"/>
+              <a:t>au </a:t>
+            </a:r>
+            <a:r>
+              <a:rPr lang="fr-FR" cap="small" dirty="0" smtClean="0"/>
+              <a:t>projet - </a:t>
+            </a:r>
+            <a:r>
               <a:rPr lang="fr-FR" u="sng" cap="small" dirty="0"/>
-              <a:t>au </a:t>
-            </a:r>
-            <a:r>
-              <a:rPr lang="fr-FR" u="sng" cap="small" dirty="0" smtClean="0"/>
-              <a:t>projet</a:t>
-            </a:r>
-            <a:r>
-              <a:rPr lang="fr-FR" cap="small" dirty="0" smtClean="0"/>
-              <a:t> - </a:t>
+              <a:t>Objectifs principaux</a:t>
             </a:r>
             <a:r>
               <a:rPr lang="fr-FR" cap="small" dirty="0"/>
-              <a:t>Objectifs principaux </a:t>
+              <a:t> </a:t>
             </a:r>
             <a:r>
               <a:rPr lang="fr-FR" cap="small" dirty="0" smtClean="0"/>
@@ -7593,7 +7866,7 @@
     </p:spTree>
     <p:extLst>
       <p:ext uri="{BB962C8B-B14F-4D97-AF65-F5344CB8AC3E}">
-        <p14:creationId xmlns:p14="http://schemas.microsoft.com/office/powerpoint/2010/main" val="737426633"/>
+        <p14:creationId xmlns:p14="http://schemas.microsoft.com/office/powerpoint/2010/main" val="328459156"/>
       </p:ext>
     </p:extLst>
   </p:cSld>
@@ -7646,7 +7919,7 @@
           <a:p>
             <a:r>
               <a:rPr lang="fr-FR" dirty="0" smtClean="0"/>
-              <a:t>Objectifs principaux</a:t>
+              <a:t>Architecture</a:t>
             </a:r>
             <a:endParaRPr lang="fr-FR" sz="2500" dirty="0"/>
           </a:p>
@@ -7664,99 +7937,125 @@
         </p:nvSpPr>
         <p:spPr/>
         <p:txBody>
-          <a:bodyPr>
-            <a:normAutofit/>
-          </a:bodyPr>
+          <a:bodyPr/>
           <a:lstStyle/>
           <a:p>
             <a:r>
               <a:rPr lang="fr-FR" dirty="0" smtClean="0"/>
-              <a:t>N.A.R.V.I.S</a:t>
+              <a:t>Séparation du projets en 3 parties</a:t>
             </a:r>
           </a:p>
           <a:p>
             <a:pPr lvl="1"/>
             <a:r>
               <a:rPr lang="fr-FR" dirty="0" smtClean="0"/>
-              <a:t>Interfacer </a:t>
-            </a:r>
+              <a:t>Entrées</a:t>
+            </a:r>
+          </a:p>
+          <a:p>
+            <a:pPr lvl="2"/>
+            <a:r>
+              <a:rPr lang="fr-FR" dirty="0" smtClean="0"/>
+              <a:t>Interface utilisateur (Twitter)</a:t>
+            </a:r>
+          </a:p>
+          <a:p>
+            <a:pPr lvl="2"/>
+            <a:r>
+              <a:rPr lang="fr-FR" dirty="0" smtClean="0"/>
+              <a:t>Accès aux données</a:t>
+            </a:r>
+          </a:p>
+          <a:p>
+            <a:pPr lvl="1"/>
+            <a:r>
+              <a:rPr lang="fr-FR" dirty="0" smtClean="0"/>
+              <a:t>Moteur de traitement</a:t>
+            </a:r>
+          </a:p>
+          <a:p>
+            <a:pPr lvl="1"/>
+            <a:r>
+              <a:rPr lang="fr-FR" dirty="0" smtClean="0"/>
+              <a:t>Sorties</a:t>
+            </a:r>
+          </a:p>
+          <a:p>
+            <a:pPr lvl="2"/>
             <a:r>
               <a:rPr lang="fr-FR" dirty="0"/>
-              <a:t>avec l’API Twitter</a:t>
+              <a:t>Interface utilisateur (</a:t>
             </a:r>
             <a:r>
               <a:rPr lang="fr-FR" dirty="0" smtClean="0"/>
-              <a:t>.</a:t>
-            </a:r>
-            <a:endParaRPr lang="fr-FR" dirty="0"/>
+              <a:t>Twitter</a:t>
+            </a:r>
+            <a:r>
+              <a:rPr lang="fr-FR" dirty="0"/>
+              <a:t>)</a:t>
+            </a:r>
+            <a:endParaRPr lang="fr-FR" dirty="0" smtClean="0"/>
+          </a:p>
+          <a:p>
+            <a:pPr marL="0" lvl="1" indent="0">
+              <a:buNone/>
+            </a:pPr>
+            <a:endParaRPr lang="fr-FR" dirty="0" smtClean="0"/>
+          </a:p>
+          <a:p>
+            <a:r>
+              <a:rPr lang="fr-FR" dirty="0" smtClean="0"/>
+              <a:t>Les entrées </a:t>
+            </a:r>
+            <a:r>
+              <a:rPr lang="fr-FR" dirty="0" smtClean="0"/>
+              <a:t>et </a:t>
+            </a:r>
+            <a:r>
+              <a:rPr lang="fr-FR" dirty="0" smtClean="0"/>
+              <a:t>les sorties sont modulaires</a:t>
+            </a:r>
           </a:p>
           <a:p>
             <a:pPr lvl="1"/>
             <a:r>
+              <a:rPr lang="fr-FR" dirty="0" smtClean="0"/>
+              <a:t>Différentes sources d’information</a:t>
+            </a:r>
+          </a:p>
+          <a:p>
+            <a:pPr lvl="2"/>
+            <a:r>
+              <a:rPr lang="fr-FR" dirty="0" smtClean="0"/>
+              <a:t>Dépendent du contexte et des besoins de NARVIS</a:t>
+            </a:r>
+          </a:p>
+        </p:txBody>
+      </p:sp>
+      <p:sp>
+        <p:nvSpPr>
+          <p:cNvPr id="4" name="Espace réservé du texte 3"/>
+          <p:cNvSpPr>
+            <a:spLocks noGrp="1"/>
+          </p:cNvSpPr>
+          <p:nvPr>
+            <p:ph type="body" sz="quarter" idx="13"/>
+          </p:nvPr>
+        </p:nvSpPr>
+        <p:spPr>
+          <a:xfrm>
+            <a:off x="1100517" y="930584"/>
+            <a:ext cx="10034124" cy="380326"/>
+          </a:xfrm>
+        </p:spPr>
+        <p:txBody>
+          <a:bodyPr/>
+          <a:lstStyle/>
+          <a:p>
+            <a:r>
               <a:rPr lang="fr-FR" dirty="0"/>
-              <a:t>Analyser la sémantique des </a:t>
-            </a:r>
-            <a:r>
-              <a:rPr lang="fr-FR" dirty="0" smtClean="0"/>
-              <a:t>tweets</a:t>
-            </a:r>
-            <a:endParaRPr lang="fr-FR" dirty="0"/>
-          </a:p>
-          <a:p>
-            <a:pPr lvl="1"/>
-            <a:r>
-              <a:rPr lang="fr-FR" dirty="0"/>
-              <a:t>Réalisation d’actions correspondantes</a:t>
-            </a:r>
-          </a:p>
-          <a:p>
-            <a:pPr lvl="2"/>
-            <a:r>
-              <a:rPr lang="fr-FR" dirty="0" smtClean="0"/>
-              <a:t>Basées sur différents modules</a:t>
-            </a:r>
-            <a:endParaRPr lang="fr-FR" dirty="0"/>
-          </a:p>
-          <a:p>
-            <a:pPr lvl="1"/>
-            <a:r>
-              <a:rPr lang="fr-FR" dirty="0"/>
-              <a:t>Construire un tweet de </a:t>
-            </a:r>
-            <a:r>
-              <a:rPr lang="fr-FR" dirty="0" smtClean="0"/>
-              <a:t>réponse</a:t>
-            </a:r>
-          </a:p>
-          <a:p>
-            <a:pPr lvl="1"/>
-            <a:endParaRPr lang="fr-FR" dirty="0" smtClean="0"/>
-          </a:p>
-          <a:p>
-            <a:r>
-              <a:rPr lang="fr-FR" dirty="0" smtClean="0"/>
-              <a:t>Projet</a:t>
-            </a:r>
-          </a:p>
-          <a:p>
-            <a:pPr lvl="1"/>
-            <a:r>
-              <a:rPr lang="fr-FR" dirty="0" smtClean="0"/>
-              <a:t>Travail avec la méthode Scrum</a:t>
-            </a:r>
-          </a:p>
-          <a:p>
-            <a:pPr lvl="1"/>
-            <a:r>
-              <a:rPr lang="fr-FR" dirty="0" smtClean="0"/>
-              <a:t>Travail en équipe</a:t>
-            </a:r>
-          </a:p>
-          <a:p>
-            <a:endParaRPr lang="fr-FR" dirty="0"/>
-          </a:p>
-          <a:p>
-            <a:endParaRPr lang="fr-FR" dirty="0"/>
+              <a:t>Introduction</a:t>
+            </a:r>
           </a:p>
         </p:txBody>
       </p:sp>
@@ -7793,8 +8092,16 @@
               <a:t>projet - </a:t>
             </a:r>
             <a:r>
+              <a:rPr lang="fr-FR" cap="small" dirty="0"/>
+              <a:t>Objectifs principaux </a:t>
+            </a:r>
+            <a:r>
+              <a:rPr lang="fr-FR" cap="small" dirty="0" smtClean="0"/>
+              <a:t>- </a:t>
+            </a:r>
+            <a:r>
               <a:rPr lang="fr-FR" u="sng" cap="small" dirty="0"/>
-              <a:t>Objectifs principaux</a:t>
+              <a:t>Architecture</a:t>
             </a:r>
             <a:r>
               <a:rPr lang="fr-FR" cap="small" dirty="0"/>
@@ -7806,7 +8113,7 @@
             </a:r>
             <a:r>
               <a:rPr lang="fr-FR" cap="small" dirty="0"/>
-              <a:t>Architecture </a:t>
+              <a:t>Gestion du projet </a:t>
             </a:r>
             <a:r>
               <a:rPr lang="fr-FR" cap="small" dirty="0" smtClean="0"/>
@@ -7814,14 +8121,6 @@
             </a:r>
             <a:r>
               <a:rPr lang="fr-FR" cap="small" dirty="0"/>
-              <a:t>Gestion du projet </a:t>
-            </a:r>
-            <a:r>
-              <a:rPr lang="fr-FR" cap="small" dirty="0" smtClean="0"/>
-              <a:t>- </a:t>
-            </a:r>
-            <a:r>
-              <a:rPr lang="fr-FR" cap="small" dirty="0"/>
               <a:t>Choix </a:t>
             </a:r>
             <a:r>
@@ -7848,10 +8147,51 @@
           </a:p>
         </p:txBody>
       </p:sp>
+      <p:pic>
+        <p:nvPicPr>
+          <p:cNvPr id="5122" name="Picture 2" descr="http://johan-brun.fr/img/comp/architect.png"/>
+          <p:cNvPicPr>
+            <a:picLocks noChangeAspect="1" noChangeArrowheads="1"/>
+          </p:cNvPicPr>
+          <p:nvPr/>
+        </p:nvPicPr>
+        <p:blipFill>
+          <a:blip r:embed="rId2">
+            <a:extLst>
+              <a:ext uri="{28A0092B-C50C-407E-A947-70E740481C1C}">
+                <a14:useLocalDpi xmlns:a14="http://schemas.microsoft.com/office/drawing/2010/main" val="0"/>
+              </a:ext>
+            </a:extLst>
+          </a:blip>
+          <a:srcRect/>
+          <a:stretch>
+            <a:fillRect/>
+          </a:stretch>
+        </p:blipFill>
+        <p:spPr bwMode="auto">
+          <a:xfrm>
+            <a:off x="7163253" y="2147207"/>
+            <a:ext cx="3001055" cy="3001056"/>
+          </a:xfrm>
+          <a:prstGeom prst="rect">
+            <a:avLst/>
+          </a:prstGeom>
+          <a:noFill/>
+          <a:extLst>
+            <a:ext uri="{909E8E84-426E-40DD-AFC4-6F175D3DCCD1}">
+              <a14:hiddenFill xmlns:a14="http://schemas.microsoft.com/office/drawing/2010/main">
+                <a:solidFill>
+                  <a:srgbClr val="FFFFFF"/>
+                </a:solidFill>
+              </a14:hiddenFill>
+            </a:ext>
+          </a:extLst>
+        </p:spPr>
+      </p:pic>
     </p:spTree>
     <p:extLst>
       <p:ext uri="{BB962C8B-B14F-4D97-AF65-F5344CB8AC3E}">
-        <p14:creationId xmlns:p14="http://schemas.microsoft.com/office/powerpoint/2010/main" val="328459156"/>
+        <p14:creationId xmlns:p14="http://schemas.microsoft.com/office/powerpoint/2010/main" val="3105522278"/>
       </p:ext>
     </p:extLst>
   </p:cSld>
@@ -7906,114 +8246,7 @@
               <a:rPr lang="fr-FR" dirty="0" smtClean="0"/>
               <a:t>Architecture</a:t>
             </a:r>
-            <a:endParaRPr lang="fr-FR" sz="2500" dirty="0"/>
-          </a:p>
-        </p:txBody>
-      </p:sp>
-      <p:sp>
-        <p:nvSpPr>
-          <p:cNvPr id="3" name="Espace réservé du contenu 2"/>
-          <p:cNvSpPr>
-            <a:spLocks noGrp="1"/>
-          </p:cNvSpPr>
-          <p:nvPr>
-            <p:ph idx="1"/>
-          </p:nvPr>
-        </p:nvSpPr>
-        <p:spPr/>
-        <p:txBody>
-          <a:bodyPr/>
-          <a:lstStyle/>
-          <a:p>
-            <a:r>
-              <a:rPr lang="fr-FR" dirty="0" smtClean="0"/>
-              <a:t>Séparation du projets en 3 parties</a:t>
-            </a:r>
-          </a:p>
-          <a:p>
-            <a:pPr lvl="1"/>
-            <a:r>
-              <a:rPr lang="fr-FR" dirty="0" smtClean="0"/>
-              <a:t>Entrées</a:t>
-            </a:r>
-          </a:p>
-          <a:p>
-            <a:pPr lvl="2"/>
-            <a:r>
-              <a:rPr lang="fr-FR" dirty="0" smtClean="0"/>
-              <a:t>Interface utilisateur (</a:t>
-            </a:r>
-            <a:r>
-              <a:rPr lang="fr-FR" dirty="0" err="1" smtClean="0"/>
-              <a:t>Twitter</a:t>
-            </a:r>
-            <a:r>
-              <a:rPr lang="fr-FR" dirty="0" smtClean="0"/>
-              <a:t>)</a:t>
-            </a:r>
-          </a:p>
-          <a:p>
-            <a:pPr lvl="2"/>
-            <a:r>
-              <a:rPr lang="fr-FR" dirty="0" smtClean="0"/>
-              <a:t>Accès aux données</a:t>
-            </a:r>
-          </a:p>
-          <a:p>
-            <a:pPr lvl="1"/>
-            <a:r>
-              <a:rPr lang="fr-FR" dirty="0" smtClean="0"/>
-              <a:t>Moteur de traitement</a:t>
-            </a:r>
-          </a:p>
-          <a:p>
-            <a:pPr lvl="1"/>
-            <a:r>
-              <a:rPr lang="fr-FR" dirty="0" smtClean="0"/>
-              <a:t>Sorties</a:t>
-            </a:r>
-          </a:p>
-          <a:p>
-            <a:pPr lvl="2"/>
-            <a:r>
-              <a:rPr lang="fr-FR" dirty="0"/>
-              <a:t>Interface utilisateur (</a:t>
-            </a:r>
-            <a:r>
-              <a:rPr lang="fr-FR" dirty="0" err="1" smtClean="0"/>
-              <a:t>Twitter</a:t>
-            </a:r>
-            <a:r>
-              <a:rPr lang="fr-FR" dirty="0"/>
-              <a:t>)</a:t>
-            </a:r>
-            <a:endParaRPr lang="fr-FR" dirty="0" smtClean="0"/>
-          </a:p>
-          <a:p>
-            <a:pPr marL="0" lvl="1" indent="0">
-              <a:buNone/>
-            </a:pPr>
-            <a:endParaRPr lang="fr-FR" dirty="0" smtClean="0"/>
-          </a:p>
-          <a:p>
-            <a:r>
-              <a:rPr lang="fr-FR" dirty="0" smtClean="0"/>
-              <a:t>Les entrées est les sorties sont modulaires</a:t>
-            </a:r>
-          </a:p>
-          <a:p>
-            <a:pPr lvl="1"/>
-            <a:r>
-              <a:rPr lang="fr-FR" dirty="0" smtClean="0"/>
-              <a:t>Différentes sources d’information</a:t>
-            </a:r>
-          </a:p>
-          <a:p>
-            <a:pPr lvl="2"/>
-            <a:r>
-              <a:rPr lang="fr-FR" dirty="0" smtClean="0"/>
-              <a:t>Dépendent du contexte et des besoins de NARVIS</a:t>
-            </a:r>
+            <a:endParaRPr lang="fr-FR" dirty="0"/>
           </a:p>
         </p:txBody>
       </p:sp>
@@ -8039,14 +8272,19 @@
           <a:p>
             <a:r>
               <a:rPr lang="fr-FR" dirty="0"/>
-              <a:t>Introduction</a:t>
-            </a:r>
-          </a:p>
-        </p:txBody>
-      </p:sp>
-      <p:sp>
-        <p:nvSpPr>
-          <p:cNvPr id="6" name="Footer Placeholder 4"/>
+              <a:t>Architecture des </a:t>
+            </a:r>
+            <a:r>
+              <a:rPr lang="fr-FR" dirty="0" smtClean="0"/>
+              <a:t>entrée / sorties</a:t>
+            </a:r>
+            <a:endParaRPr lang="fr-FR" dirty="0"/>
+          </a:p>
+        </p:txBody>
+      </p:sp>
+      <p:sp>
+        <p:nvSpPr>
+          <p:cNvPr id="5" name="Footer Placeholder 4"/>
           <p:cNvSpPr>
             <a:spLocks noGrp="1"/>
           </p:cNvSpPr>
@@ -8132,210 +8370,36 @@
           </a:p>
         </p:txBody>
       </p:sp>
-    </p:spTree>
-    <p:extLst>
-      <p:ext uri="{BB962C8B-B14F-4D97-AF65-F5344CB8AC3E}">
-        <p14:creationId xmlns:p14="http://schemas.microsoft.com/office/powerpoint/2010/main" val="3105522278"/>
-      </p:ext>
-    </p:extLst>
-  </p:cSld>
-  <p:clrMapOvr>
-    <a:masterClrMapping/>
-  </p:clrMapOvr>
-  <p:timing>
-    <p:tnLst>
-      <p:par>
-        <p:cTn id="1" dur="indefinite" restart="never" nodeType="tmRoot"/>
-      </p:par>
-    </p:tnLst>
-  </p:timing>
-</p:sld>
-</file>
-
-<file path=ppt/slides/slide8.xml><?xml version="1.0" encoding="utf-8"?>
-<p:sld xmlns:a="http://schemas.openxmlformats.org/drawingml/2006/main" xmlns:r="http://schemas.openxmlformats.org/officeDocument/2006/relationships" xmlns:p="http://schemas.openxmlformats.org/presentationml/2006/main">
-  <p:cSld>
-    <p:spTree>
-      <p:nvGrpSpPr>
-        <p:cNvPr id="1" name=""/>
-        <p:cNvGrpSpPr/>
-        <p:nvPr/>
-      </p:nvGrpSpPr>
-      <p:grpSpPr>
-        <a:xfrm>
-          <a:off x="0" y="0"/>
-          <a:ext cx="0" cy="0"/>
-          <a:chOff x="0" y="0"/>
-          <a:chExt cx="0" cy="0"/>
-        </a:xfrm>
-      </p:grpSpPr>
-      <p:sp>
-        <p:nvSpPr>
-          <p:cNvPr id="2" name="Titre 1"/>
-          <p:cNvSpPr>
-            <a:spLocks noGrp="1"/>
-          </p:cNvSpPr>
-          <p:nvPr>
-            <p:ph type="title"/>
-          </p:nvPr>
-        </p:nvSpPr>
-        <p:spPr/>
-        <p:txBody>
-          <a:bodyPr>
-            <a:normAutofit/>
-          </a:bodyPr>
-          <a:lstStyle/>
-          <a:p>
-            <a:r>
-              <a:rPr lang="fr-FR" dirty="0" smtClean="0"/>
-              <a:t>Architecture</a:t>
-            </a:r>
-            <a:endParaRPr lang="fr-FR" dirty="0"/>
-          </a:p>
-        </p:txBody>
-      </p:sp>
-      <p:sp>
-        <p:nvSpPr>
-          <p:cNvPr id="3" name="Espace réservé du contenu 2"/>
-          <p:cNvSpPr>
-            <a:spLocks noGrp="1"/>
-          </p:cNvSpPr>
-          <p:nvPr>
-            <p:ph idx="1"/>
-          </p:nvPr>
-        </p:nvSpPr>
-        <p:spPr/>
-        <p:txBody>
-          <a:bodyPr/>
-          <a:lstStyle/>
-          <a:p>
-            <a:r>
-              <a:rPr lang="fr-FR" dirty="0"/>
-              <a:t>TODO : Schéma</a:t>
-            </a:r>
-          </a:p>
-        </p:txBody>
-      </p:sp>
-      <p:sp>
-        <p:nvSpPr>
-          <p:cNvPr id="4" name="Espace réservé du texte 3"/>
-          <p:cNvSpPr>
-            <a:spLocks noGrp="1"/>
-          </p:cNvSpPr>
-          <p:nvPr>
-            <p:ph type="body" sz="quarter" idx="13"/>
-          </p:nvPr>
-        </p:nvSpPr>
+      <p:pic>
+        <p:nvPicPr>
+          <p:cNvPr id="6" name="Image 5"/>
+          <p:cNvPicPr>
+            <a:picLocks noChangeAspect="1"/>
+          </p:cNvPicPr>
+          <p:nvPr/>
+        </p:nvPicPr>
+        <p:blipFill>
+          <a:blip r:embed="rId2">
+            <a:extLst>
+              <a:ext uri="{28A0092B-C50C-407E-A947-70E740481C1C}">
+                <a14:useLocalDpi xmlns:a14="http://schemas.microsoft.com/office/drawing/2010/main" val="0"/>
+              </a:ext>
+            </a:extLst>
+          </a:blip>
+          <a:stretch>
+            <a:fillRect/>
+          </a:stretch>
+        </p:blipFill>
         <p:spPr>
           <a:xfrm>
-            <a:off x="1100517" y="930584"/>
-            <a:ext cx="10034124" cy="380326"/>
+            <a:off x="0" y="1363548"/>
+            <a:ext cx="12122611" cy="4232549"/>
           </a:xfrm>
+          <a:prstGeom prst="rect">
+            <a:avLst/>
+          </a:prstGeom>
         </p:spPr>
-        <p:txBody>
-          <a:bodyPr/>
-          <a:lstStyle/>
-          <a:p>
-            <a:r>
-              <a:rPr lang="fr-FR" dirty="0"/>
-              <a:t>Architecture des </a:t>
-            </a:r>
-            <a:r>
-              <a:rPr lang="fr-FR" dirty="0" smtClean="0"/>
-              <a:t>entrée / sorties</a:t>
-            </a:r>
-            <a:endParaRPr lang="fr-FR" dirty="0"/>
-          </a:p>
-        </p:txBody>
-      </p:sp>
-      <p:sp>
-        <p:nvSpPr>
-          <p:cNvPr id="5" name="Footer Placeholder 4"/>
-          <p:cNvSpPr>
-            <a:spLocks noGrp="1"/>
-          </p:cNvSpPr>
-          <p:nvPr>
-            <p:ph type="ftr" sz="quarter" idx="11"/>
-          </p:nvPr>
-        </p:nvSpPr>
-        <p:spPr>
-          <a:xfrm>
-            <a:off x="1347106" y="6366765"/>
-            <a:ext cx="10082893" cy="274320"/>
-          </a:xfrm>
-        </p:spPr>
-        <p:txBody>
-          <a:bodyPr/>
-          <a:lstStyle/>
-          <a:p>
-            <a:r>
-              <a:rPr lang="fr-FR" cap="small" dirty="0" smtClean="0"/>
-              <a:t>Introduction </a:t>
-            </a:r>
-            <a:r>
-              <a:rPr lang="fr-FR" cap="small" dirty="0"/>
-              <a:t>au </a:t>
-            </a:r>
-            <a:r>
-              <a:rPr lang="fr-FR" cap="small" dirty="0" smtClean="0"/>
-              <a:t>projet - </a:t>
-            </a:r>
-            <a:r>
-              <a:rPr lang="fr-FR" cap="small" dirty="0"/>
-              <a:t>Objectifs principaux </a:t>
-            </a:r>
-            <a:r>
-              <a:rPr lang="fr-FR" cap="small" dirty="0" smtClean="0"/>
-              <a:t>- </a:t>
-            </a:r>
-            <a:r>
-              <a:rPr lang="fr-FR" u="sng" cap="small" dirty="0"/>
-              <a:t>Architecture</a:t>
-            </a:r>
-            <a:r>
-              <a:rPr lang="fr-FR" cap="small" dirty="0"/>
-              <a:t> </a:t>
-            </a:r>
-            <a:r>
-              <a:rPr lang="fr-FR" cap="small" dirty="0" smtClean="0"/>
-              <a:t>- </a:t>
-            </a:r>
-            <a:r>
-              <a:rPr lang="fr-FR" cap="small" dirty="0"/>
-              <a:t>Gestion du projet </a:t>
-            </a:r>
-            <a:r>
-              <a:rPr lang="fr-FR" cap="small" dirty="0" smtClean="0"/>
-              <a:t>- </a:t>
-            </a:r>
-            <a:r>
-              <a:rPr lang="fr-FR" cap="small" dirty="0"/>
-              <a:t>Choix </a:t>
-            </a:r>
-            <a:r>
-              <a:rPr lang="fr-FR" cap="small" dirty="0" smtClean="0"/>
-              <a:t>technologiques</a:t>
-            </a:r>
-            <a:r>
-              <a:rPr lang="en-US" cap="small" dirty="0"/>
-              <a:t> </a:t>
-            </a:r>
-            <a:r>
-              <a:rPr lang="en-US" cap="small" dirty="0" smtClean="0"/>
-              <a:t>- </a:t>
-            </a:r>
-            <a:r>
-              <a:rPr lang="fr-FR" cap="small" dirty="0"/>
-              <a:t>Travaux </a:t>
-            </a:r>
-            <a:r>
-              <a:rPr lang="fr-FR" cap="small" dirty="0" smtClean="0"/>
-              <a:t>préparatoires</a:t>
-            </a:r>
-            <a:endParaRPr lang="fr-FR" cap="small" dirty="0"/>
-          </a:p>
-        </p:txBody>
-      </p:sp>
+      </p:pic>
     </p:spTree>
     <p:extLst>
       <p:ext uri="{BB962C8B-B14F-4D97-AF65-F5344CB8AC3E}">
@@ -8356,7 +8420,7 @@
 </p:sld>
 </file>
 
-<file path=ppt/slides/slide9.xml><?xml version="1.0" encoding="utf-8"?>
+<file path=ppt/slides/slide8.xml><?xml version="1.0" encoding="utf-8"?>
 <p:sld xmlns:a="http://schemas.openxmlformats.org/drawingml/2006/main" xmlns:r="http://schemas.openxmlformats.org/officeDocument/2006/relationships" xmlns:p="http://schemas.openxmlformats.org/presentationml/2006/main">
   <p:cSld>
     <p:spTree>
@@ -8547,6 +8611,428 @@
     <p:extLst>
       <p:ext uri="{BB962C8B-B14F-4D97-AF65-F5344CB8AC3E}">
         <p14:creationId xmlns:p14="http://schemas.microsoft.com/office/powerpoint/2010/main" val="669794957"/>
+      </p:ext>
+    </p:extLst>
+  </p:cSld>
+  <p:clrMapOvr>
+    <a:masterClrMapping/>
+  </p:clrMapOvr>
+  <p:timing>
+    <p:tnLst>
+      <p:par>
+        <p:cTn id="1" dur="indefinite" restart="never" nodeType="tmRoot"/>
+      </p:par>
+    </p:tnLst>
+  </p:timing>
+</p:sld>
+</file>
+
+<file path=ppt/slides/slide9.xml><?xml version="1.0" encoding="utf-8"?>
+<p:sld xmlns:a="http://schemas.openxmlformats.org/drawingml/2006/main" xmlns:r="http://schemas.openxmlformats.org/officeDocument/2006/relationships" xmlns:p="http://schemas.openxmlformats.org/presentationml/2006/main">
+  <p:cSld>
+    <p:spTree>
+      <p:nvGrpSpPr>
+        <p:cNvPr id="1" name=""/>
+        <p:cNvGrpSpPr/>
+        <p:nvPr/>
+      </p:nvGrpSpPr>
+      <p:grpSpPr>
+        <a:xfrm>
+          <a:off x="0" y="0"/>
+          <a:ext cx="0" cy="0"/>
+          <a:chOff x="0" y="0"/>
+          <a:chExt cx="0" cy="0"/>
+        </a:xfrm>
+      </p:grpSpPr>
+      <p:sp>
+        <p:nvSpPr>
+          <p:cNvPr id="2" name="Titre 1"/>
+          <p:cNvSpPr>
+            <a:spLocks noGrp="1"/>
+          </p:cNvSpPr>
+          <p:nvPr>
+            <p:ph type="title"/>
+          </p:nvPr>
+        </p:nvSpPr>
+        <p:spPr/>
+        <p:txBody>
+          <a:bodyPr>
+            <a:normAutofit/>
+          </a:bodyPr>
+          <a:lstStyle/>
+          <a:p>
+            <a:r>
+              <a:rPr lang="fr-FR" dirty="0" smtClean="0"/>
+              <a:t>Gestion de projet</a:t>
+            </a:r>
+            <a:endParaRPr lang="fr-FR" sz="2500" dirty="0"/>
+          </a:p>
+        </p:txBody>
+      </p:sp>
+      <p:sp>
+        <p:nvSpPr>
+          <p:cNvPr id="3" name="Espace réservé du contenu 2"/>
+          <p:cNvSpPr>
+            <a:spLocks noGrp="1"/>
+          </p:cNvSpPr>
+          <p:nvPr>
+            <p:ph idx="1"/>
+          </p:nvPr>
+        </p:nvSpPr>
+        <p:spPr/>
+        <p:txBody>
+          <a:bodyPr/>
+          <a:lstStyle/>
+          <a:p>
+            <a:r>
+              <a:rPr lang="fr-FR" dirty="0" smtClean="0">
+                <a:solidFill>
+                  <a:schemeClr val="tx1"/>
+                </a:solidFill>
+              </a:rPr>
+              <a:t>Utilisation du framework d’organisation </a:t>
+            </a:r>
+            <a:r>
+              <a:rPr lang="fr-FR" u="sng" dirty="0" smtClean="0">
+                <a:solidFill>
+                  <a:schemeClr val="tx1"/>
+                </a:solidFill>
+              </a:rPr>
+              <a:t>Scrum</a:t>
+            </a:r>
+          </a:p>
+          <a:p>
+            <a:endParaRPr lang="fr-FR" dirty="0" smtClean="0">
+              <a:solidFill>
+                <a:schemeClr val="tx1"/>
+              </a:solidFill>
+            </a:endParaRPr>
+          </a:p>
+          <a:p>
+            <a:pPr marL="0" lvl="1" indent="0">
+              <a:buNone/>
+            </a:pPr>
+            <a:r>
+              <a:rPr lang="fr-FR" b="1" dirty="0"/>
+              <a:t>Pourquoi ce choix ?</a:t>
+            </a:r>
+            <a:endParaRPr lang="fr-FR" dirty="0"/>
+          </a:p>
+          <a:p>
+            <a:pPr lvl="1"/>
+            <a:r>
+              <a:rPr lang="fr-FR" dirty="0" smtClean="0"/>
+              <a:t>Souplesse de travail</a:t>
+            </a:r>
+          </a:p>
+          <a:p>
+            <a:pPr lvl="1"/>
+            <a:r>
+              <a:rPr lang="fr-FR" dirty="0" smtClean="0"/>
+              <a:t>Adaptation aux aléas</a:t>
+            </a:r>
+          </a:p>
+          <a:p>
+            <a:pPr lvl="2"/>
+            <a:r>
+              <a:rPr lang="fr-FR" dirty="0" smtClean="0"/>
+              <a:t>Nécessaire car beaucoup d’inconnues</a:t>
+            </a:r>
+          </a:p>
+          <a:p>
+            <a:pPr lvl="1"/>
+            <a:r>
+              <a:rPr lang="fr-FR" dirty="0" smtClean="0">
+                <a:solidFill>
+                  <a:schemeClr val="tx1"/>
+                </a:solidFill>
+              </a:rPr>
+              <a:t>Garantis un résultat fonctionnel</a:t>
+            </a:r>
+          </a:p>
+          <a:p>
+            <a:pPr lvl="1"/>
+            <a:r>
+              <a:rPr lang="fr-FR" dirty="0"/>
+              <a:t>Moins de documentation = Gain de </a:t>
+            </a:r>
+            <a:r>
+              <a:rPr lang="fr-FR" dirty="0" smtClean="0"/>
+              <a:t>temps</a:t>
+            </a:r>
+          </a:p>
+          <a:p>
+            <a:pPr lvl="1"/>
+            <a:r>
+              <a:rPr lang="fr-FR" dirty="0" smtClean="0"/>
+              <a:t>Très utilisé dans le monde professionnel</a:t>
+            </a:r>
+            <a:endParaRPr lang="fr-FR" dirty="0" smtClean="0">
+              <a:solidFill>
+                <a:schemeClr val="tx1"/>
+              </a:solidFill>
+            </a:endParaRPr>
+          </a:p>
+          <a:p>
+            <a:pPr marL="0" lvl="1" indent="0">
+              <a:buNone/>
+            </a:pPr>
+            <a:endParaRPr lang="fr-FR" dirty="0" smtClean="0">
+              <a:solidFill>
+                <a:schemeClr val="tx1"/>
+              </a:solidFill>
+            </a:endParaRPr>
+          </a:p>
+          <a:p>
+            <a:r>
+              <a:rPr lang="fr-FR" dirty="0" smtClean="0">
+                <a:solidFill>
+                  <a:schemeClr val="tx1"/>
+                </a:solidFill>
+              </a:rPr>
+              <a:t>Constitution de l’équipe</a:t>
+            </a:r>
+          </a:p>
+          <a:p>
+            <a:pPr lvl="1"/>
+            <a:r>
+              <a:rPr lang="fr-FR" u="sng" dirty="0" smtClean="0">
+                <a:solidFill>
+                  <a:schemeClr val="tx1"/>
+                </a:solidFill>
+              </a:rPr>
+              <a:t>Product Owner </a:t>
+            </a:r>
+            <a:r>
+              <a:rPr lang="fr-FR" dirty="0" smtClean="0">
+                <a:solidFill>
+                  <a:schemeClr val="tx1"/>
+                </a:solidFill>
+              </a:rPr>
+              <a:t>: Alban BONNET</a:t>
+            </a:r>
+          </a:p>
+          <a:p>
+            <a:pPr lvl="1"/>
+            <a:r>
+              <a:rPr lang="fr-FR" u="sng" dirty="0" smtClean="0">
+                <a:solidFill>
+                  <a:schemeClr val="tx1"/>
+                </a:solidFill>
+              </a:rPr>
+              <a:t>Scrum Master </a:t>
+            </a:r>
+            <a:r>
+              <a:rPr lang="fr-FR" dirty="0" smtClean="0">
+                <a:solidFill>
+                  <a:schemeClr val="tx1"/>
+                </a:solidFill>
+              </a:rPr>
+              <a:t>: Yoann LE MOUËL </a:t>
+            </a:r>
+          </a:p>
+          <a:p>
+            <a:pPr lvl="1"/>
+            <a:r>
+              <a:rPr lang="fr-FR" u="sng" dirty="0" smtClean="0">
+                <a:solidFill>
+                  <a:schemeClr val="tx1"/>
+                </a:solidFill>
+              </a:rPr>
+              <a:t>Développeurs</a:t>
+            </a:r>
+            <a:r>
+              <a:rPr lang="fr-FR" dirty="0" smtClean="0">
+                <a:solidFill>
+                  <a:schemeClr val="tx1"/>
+                </a:solidFill>
+              </a:rPr>
+              <a:t> : Raphaël BLIN, Charles </a:t>
+            </a:r>
+            <a:r>
+              <a:rPr lang="fr-FR" dirty="0" smtClean="0">
+                <a:solidFill>
+                  <a:schemeClr val="tx1"/>
+                </a:solidFill>
+              </a:rPr>
+              <a:t>COQUE</a:t>
+            </a:r>
+            <a:endParaRPr lang="fr-FR" dirty="0" smtClean="0">
+              <a:solidFill>
+                <a:schemeClr val="tx1"/>
+              </a:solidFill>
+            </a:endParaRPr>
+          </a:p>
+          <a:p>
+            <a:pPr lvl="1"/>
+            <a:endParaRPr lang="fr-FR" dirty="0">
+              <a:solidFill>
+                <a:schemeClr val="tx1"/>
+              </a:solidFill>
+            </a:endParaRPr>
+          </a:p>
+        </p:txBody>
+      </p:sp>
+      <p:sp>
+        <p:nvSpPr>
+          <p:cNvPr id="4" name="Espace réservé du texte 3"/>
+          <p:cNvSpPr>
+            <a:spLocks noGrp="1"/>
+          </p:cNvSpPr>
+          <p:nvPr>
+            <p:ph type="body" sz="quarter" idx="13"/>
+          </p:nvPr>
+        </p:nvSpPr>
+        <p:spPr>
+          <a:xfrm>
+            <a:off x="1100517" y="930584"/>
+            <a:ext cx="10034124" cy="380326"/>
+          </a:xfrm>
+        </p:spPr>
+        <p:txBody>
+          <a:bodyPr/>
+          <a:lstStyle/>
+          <a:p>
+            <a:r>
+              <a:rPr lang="fr-FR" dirty="0"/>
+              <a:t>Méthode agile</a:t>
+            </a:r>
+          </a:p>
+        </p:txBody>
+      </p:sp>
+      <p:sp>
+        <p:nvSpPr>
+          <p:cNvPr id="5" name="Footer Placeholder 4"/>
+          <p:cNvSpPr>
+            <a:spLocks noGrp="1"/>
+          </p:cNvSpPr>
+          <p:nvPr>
+            <p:ph type="ftr" sz="quarter" idx="11"/>
+          </p:nvPr>
+        </p:nvSpPr>
+        <p:spPr>
+          <a:xfrm>
+            <a:off x="1347106" y="6366765"/>
+            <a:ext cx="10082893" cy="274320"/>
+          </a:xfrm>
+        </p:spPr>
+        <p:txBody>
+          <a:bodyPr/>
+          <a:lstStyle/>
+          <a:p>
+            <a:r>
+              <a:rPr lang="fr-FR" cap="small" dirty="0" smtClean="0"/>
+              <a:t>Introduction </a:t>
+            </a:r>
+            <a:r>
+              <a:rPr lang="fr-FR" cap="small" dirty="0"/>
+              <a:t>au </a:t>
+            </a:r>
+            <a:r>
+              <a:rPr lang="fr-FR" cap="small" dirty="0" smtClean="0"/>
+              <a:t>projet - </a:t>
+            </a:r>
+            <a:r>
+              <a:rPr lang="fr-FR" cap="small" dirty="0"/>
+              <a:t>Objectifs principaux </a:t>
+            </a:r>
+            <a:r>
+              <a:rPr lang="fr-FR" cap="small" dirty="0" smtClean="0"/>
+              <a:t>- </a:t>
+            </a:r>
+            <a:r>
+              <a:rPr lang="fr-FR" cap="small" dirty="0"/>
+              <a:t>Architecture </a:t>
+            </a:r>
+            <a:r>
+              <a:rPr lang="fr-FR" cap="small" dirty="0" smtClean="0"/>
+              <a:t>- </a:t>
+            </a:r>
+            <a:r>
+              <a:rPr lang="fr-FR" u="sng" cap="small" dirty="0"/>
+              <a:t>Gestion du projet</a:t>
+            </a:r>
+            <a:r>
+              <a:rPr lang="fr-FR" cap="small" dirty="0"/>
+              <a:t> </a:t>
+            </a:r>
+            <a:r>
+              <a:rPr lang="fr-FR" cap="small" dirty="0" smtClean="0"/>
+              <a:t>- </a:t>
+            </a:r>
+            <a:r>
+              <a:rPr lang="fr-FR" cap="small" dirty="0"/>
+              <a:t>Choix </a:t>
+            </a:r>
+            <a:r>
+              <a:rPr lang="fr-FR" cap="small" dirty="0" smtClean="0"/>
+              <a:t>technologiques</a:t>
+            </a:r>
+            <a:r>
+              <a:rPr lang="en-US" cap="small" dirty="0"/>
+              <a:t> </a:t>
+            </a:r>
+            <a:r>
+              <a:rPr lang="en-US" cap="small" dirty="0" smtClean="0"/>
+              <a:t>- </a:t>
+            </a:r>
+            <a:r>
+              <a:rPr lang="fr-FR" cap="small" dirty="0"/>
+              <a:t>Travaux </a:t>
+            </a:r>
+            <a:r>
+              <a:rPr lang="fr-FR" cap="small" dirty="0" smtClean="0"/>
+              <a:t>préparatoires</a:t>
+            </a:r>
+            <a:endParaRPr lang="fr-FR" cap="small" dirty="0"/>
+          </a:p>
+        </p:txBody>
+      </p:sp>
+      <p:pic>
+        <p:nvPicPr>
+          <p:cNvPr id="1026" name="Picture 2" descr="http://espace-info.net/wp-content/uploads/2015/02/agile-glossary.png"/>
+          <p:cNvPicPr>
+            <a:picLocks noChangeAspect="1" noChangeArrowheads="1"/>
+          </p:cNvPicPr>
+          <p:nvPr/>
+        </p:nvPicPr>
+        <p:blipFill>
+          <a:blip r:embed="rId2">
+            <a:extLst>
+              <a:ext uri="{28A0092B-C50C-407E-A947-70E740481C1C}">
+                <a14:useLocalDpi xmlns:a14="http://schemas.microsoft.com/office/drawing/2010/main" val="0"/>
+              </a:ext>
+            </a:extLst>
+          </a:blip>
+          <a:srcRect/>
+          <a:stretch>
+            <a:fillRect/>
+          </a:stretch>
+        </p:blipFill>
+        <p:spPr bwMode="auto">
+          <a:xfrm>
+            <a:off x="5553379" y="1787978"/>
+            <a:ext cx="6507993" cy="3479116"/>
+          </a:xfrm>
+          <a:prstGeom prst="rect">
+            <a:avLst/>
+          </a:prstGeom>
+          <a:noFill/>
+          <a:extLst>
+            <a:ext uri="{909E8E84-426E-40DD-AFC4-6F175D3DCCD1}">
+              <a14:hiddenFill xmlns:a14="http://schemas.microsoft.com/office/drawing/2010/main">
+                <a:solidFill>
+                  <a:srgbClr val="FFFFFF"/>
+                </a:solidFill>
+              </a14:hiddenFill>
+            </a:ext>
+          </a:extLst>
+        </p:spPr>
+      </p:pic>
+    </p:spTree>
+    <p:extLst>
+      <p:ext uri="{BB962C8B-B14F-4D97-AF65-F5344CB8AC3E}">
+        <p14:creationId xmlns:p14="http://schemas.microsoft.com/office/powerpoint/2010/main" val="2824142541"/>
       </p:ext>
     </p:extLst>
   </p:cSld>

</xml_diff>

<commit_message>
Version finale de la Présentation du 17/04/2015
</commit_message>
<xml_diff>
--- a/Presentation/PrésentationNarvis_2.pptx
+++ b/Presentation/PrésentationNarvis_2.pptx
@@ -4,6 +4,9 @@
   <p:sldMasterIdLst>
     <p:sldMasterId id="2147483761" r:id="rId1"/>
   </p:sldMasterIdLst>
+  <p:notesMasterIdLst>
+    <p:notesMasterId r:id="rId18"/>
+  </p:notesMasterIdLst>
   <p:sldIdLst>
     <p:sldId id="256" r:id="rId2"/>
     <p:sldId id="257" r:id="rId3"/>
@@ -121,7 +124,7 @@
   </p:defaultTextStyle>
   <p:extLst>
     <p:ext uri="{EFAFB233-063F-42B5-8137-9DF3F51BA10A}">
-      <p15:sldGuideLst xmlns:p15="http://schemas.microsoft.com/office/powerpoint/2012/main">
+      <p15:sldGuideLst xmlns:p15="http://schemas.microsoft.com/office/powerpoint/2012/main" xmlns="">
         <p15:guide id="1" orient="horz" pos="2160">
           <p15:clr>
             <a:srgbClr val="A4A3A4"/>
@@ -136,6 +139,471 @@
     </p:ext>
   </p:extLst>
 </p:presentation>
+</file>
+
+<file path=ppt/notesMasters/notesMaster1.xml><?xml version="1.0" encoding="utf-8"?>
+<p:notesMaster xmlns:a="http://schemas.openxmlformats.org/drawingml/2006/main" xmlns:r="http://schemas.openxmlformats.org/officeDocument/2006/relationships" xmlns:p="http://schemas.openxmlformats.org/presentationml/2006/main">
+  <p:cSld>
+    <p:bg>
+      <p:bgRef idx="1001">
+        <a:schemeClr val="bg1"/>
+      </p:bgRef>
+    </p:bg>
+    <p:spTree>
+      <p:nvGrpSpPr>
+        <p:cNvPr id="1" name=""/>
+        <p:cNvGrpSpPr/>
+        <p:nvPr/>
+      </p:nvGrpSpPr>
+      <p:grpSpPr>
+        <a:xfrm>
+          <a:off x="0" y="0"/>
+          <a:ext cx="0" cy="0"/>
+          <a:chOff x="0" y="0"/>
+          <a:chExt cx="0" cy="0"/>
+        </a:xfrm>
+      </p:grpSpPr>
+      <p:sp>
+        <p:nvSpPr>
+          <p:cNvPr id="2" name="Espace réservé de l'en-tête 1"/>
+          <p:cNvSpPr>
+            <a:spLocks noGrp="1"/>
+          </p:cNvSpPr>
+          <p:nvPr>
+            <p:ph type="hdr" sz="quarter"/>
+          </p:nvPr>
+        </p:nvSpPr>
+        <p:spPr>
+          <a:xfrm>
+            <a:off x="0" y="0"/>
+            <a:ext cx="2971800" cy="457200"/>
+          </a:xfrm>
+          <a:prstGeom prst="rect">
+            <a:avLst/>
+          </a:prstGeom>
+        </p:spPr>
+        <p:txBody>
+          <a:bodyPr vert="horz" lIns="91440" tIns="45720" rIns="91440" bIns="45720" rtlCol="0"/>
+          <a:lstStyle>
+            <a:lvl1pPr algn="l">
+              <a:defRPr sz="1200"/>
+            </a:lvl1pPr>
+          </a:lstStyle>
+          <a:p>
+            <a:endParaRPr lang="fr-FR"/>
+          </a:p>
+        </p:txBody>
+      </p:sp>
+      <p:sp>
+        <p:nvSpPr>
+          <p:cNvPr id="3" name="Espace réservé de la date 2"/>
+          <p:cNvSpPr>
+            <a:spLocks noGrp="1"/>
+          </p:cNvSpPr>
+          <p:nvPr>
+            <p:ph type="dt" idx="1"/>
+          </p:nvPr>
+        </p:nvSpPr>
+        <p:spPr>
+          <a:xfrm>
+            <a:off x="3884613" y="0"/>
+            <a:ext cx="2971800" cy="457200"/>
+          </a:xfrm>
+          <a:prstGeom prst="rect">
+            <a:avLst/>
+          </a:prstGeom>
+        </p:spPr>
+        <p:txBody>
+          <a:bodyPr vert="horz" lIns="91440" tIns="45720" rIns="91440" bIns="45720" rtlCol="0"/>
+          <a:lstStyle>
+            <a:lvl1pPr algn="r">
+              <a:defRPr sz="1200"/>
+            </a:lvl1pPr>
+          </a:lstStyle>
+          <a:p>
+            <a:fld id="{2FD1EF25-567D-4635-9556-B60808108F83}" type="datetimeFigureOut">
+              <a:rPr lang="fr-FR" smtClean="0"/>
+              <a:t>16/04/2015</a:t>
+            </a:fld>
+            <a:endParaRPr lang="fr-FR"/>
+          </a:p>
+        </p:txBody>
+      </p:sp>
+      <p:sp>
+        <p:nvSpPr>
+          <p:cNvPr id="4" name="Espace réservé de l'image des diapositives 3"/>
+          <p:cNvSpPr>
+            <a:spLocks noGrp="1" noRot="1" noChangeAspect="1"/>
+          </p:cNvSpPr>
+          <p:nvPr>
+            <p:ph type="sldImg" idx="2"/>
+          </p:nvPr>
+        </p:nvSpPr>
+        <p:spPr>
+          <a:xfrm>
+            <a:off x="381000" y="685800"/>
+            <a:ext cx="6096000" cy="3429000"/>
+          </a:xfrm>
+          <a:prstGeom prst="rect">
+            <a:avLst/>
+          </a:prstGeom>
+          <a:noFill/>
+          <a:ln w="12700">
+            <a:solidFill>
+              <a:prstClr val="black"/>
+            </a:solidFill>
+          </a:ln>
+        </p:spPr>
+        <p:txBody>
+          <a:bodyPr vert="horz" lIns="91440" tIns="45720" rIns="91440" bIns="45720" rtlCol="0" anchor="ctr"/>
+          <a:lstStyle/>
+          <a:p>
+            <a:endParaRPr lang="fr-FR"/>
+          </a:p>
+        </p:txBody>
+      </p:sp>
+      <p:sp>
+        <p:nvSpPr>
+          <p:cNvPr id="5" name="Espace réservé des commentaires 4"/>
+          <p:cNvSpPr>
+            <a:spLocks noGrp="1"/>
+          </p:cNvSpPr>
+          <p:nvPr>
+            <p:ph type="body" sz="quarter" idx="3"/>
+          </p:nvPr>
+        </p:nvSpPr>
+        <p:spPr>
+          <a:xfrm>
+            <a:off x="685800" y="4343400"/>
+            <a:ext cx="5486400" cy="4114800"/>
+          </a:xfrm>
+          <a:prstGeom prst="rect">
+            <a:avLst/>
+          </a:prstGeom>
+        </p:spPr>
+        <p:txBody>
+          <a:bodyPr vert="horz" lIns="91440" tIns="45720" rIns="91440" bIns="45720" rtlCol="0"/>
+          <a:lstStyle/>
+          <a:p>
+            <a:pPr lvl="0"/>
+            <a:r>
+              <a:rPr lang="fr-FR" smtClean="0"/>
+              <a:t>Modifiez les styles du texte du masque</a:t>
+            </a:r>
+          </a:p>
+          <a:p>
+            <a:pPr lvl="1"/>
+            <a:r>
+              <a:rPr lang="fr-FR" smtClean="0"/>
+              <a:t>Deuxième niveau</a:t>
+            </a:r>
+          </a:p>
+          <a:p>
+            <a:pPr lvl="2"/>
+            <a:r>
+              <a:rPr lang="fr-FR" smtClean="0"/>
+              <a:t>Troisième niveau</a:t>
+            </a:r>
+          </a:p>
+          <a:p>
+            <a:pPr lvl="3"/>
+            <a:r>
+              <a:rPr lang="fr-FR" smtClean="0"/>
+              <a:t>Quatrième niveau</a:t>
+            </a:r>
+          </a:p>
+          <a:p>
+            <a:pPr lvl="4"/>
+            <a:r>
+              <a:rPr lang="fr-FR" smtClean="0"/>
+              <a:t>Cinquième niveau</a:t>
+            </a:r>
+            <a:endParaRPr lang="fr-FR"/>
+          </a:p>
+        </p:txBody>
+      </p:sp>
+      <p:sp>
+        <p:nvSpPr>
+          <p:cNvPr id="6" name="Espace réservé du pied de page 5"/>
+          <p:cNvSpPr>
+            <a:spLocks noGrp="1"/>
+          </p:cNvSpPr>
+          <p:nvPr>
+            <p:ph type="ftr" sz="quarter" idx="4"/>
+          </p:nvPr>
+        </p:nvSpPr>
+        <p:spPr>
+          <a:xfrm>
+            <a:off x="0" y="8685213"/>
+            <a:ext cx="2971800" cy="457200"/>
+          </a:xfrm>
+          <a:prstGeom prst="rect">
+            <a:avLst/>
+          </a:prstGeom>
+        </p:spPr>
+        <p:txBody>
+          <a:bodyPr vert="horz" lIns="91440" tIns="45720" rIns="91440" bIns="45720" rtlCol="0" anchor="b"/>
+          <a:lstStyle>
+            <a:lvl1pPr algn="l">
+              <a:defRPr sz="1200"/>
+            </a:lvl1pPr>
+          </a:lstStyle>
+          <a:p>
+            <a:endParaRPr lang="fr-FR"/>
+          </a:p>
+        </p:txBody>
+      </p:sp>
+      <p:sp>
+        <p:nvSpPr>
+          <p:cNvPr id="7" name="Espace réservé du numéro de diapositive 6"/>
+          <p:cNvSpPr>
+            <a:spLocks noGrp="1"/>
+          </p:cNvSpPr>
+          <p:nvPr>
+            <p:ph type="sldNum" sz="quarter" idx="5"/>
+          </p:nvPr>
+        </p:nvSpPr>
+        <p:spPr>
+          <a:xfrm>
+            <a:off x="3884613" y="8685213"/>
+            <a:ext cx="2971800" cy="457200"/>
+          </a:xfrm>
+          <a:prstGeom prst="rect">
+            <a:avLst/>
+          </a:prstGeom>
+        </p:spPr>
+        <p:txBody>
+          <a:bodyPr vert="horz" lIns="91440" tIns="45720" rIns="91440" bIns="45720" rtlCol="0" anchor="b"/>
+          <a:lstStyle>
+            <a:lvl1pPr algn="r">
+              <a:defRPr sz="1200"/>
+            </a:lvl1pPr>
+          </a:lstStyle>
+          <a:p>
+            <a:fld id="{BCB96932-33C7-426F-B567-515379E36BC4}" type="slidenum">
+              <a:rPr lang="fr-FR" smtClean="0"/>
+              <a:t>‹N°›</a:t>
+            </a:fld>
+            <a:endParaRPr lang="fr-FR"/>
+          </a:p>
+        </p:txBody>
+      </p:sp>
+    </p:spTree>
+    <p:extLst>
+      <p:ext uri="{BB962C8B-B14F-4D97-AF65-F5344CB8AC3E}">
+        <p14:creationId xmlns:p14="http://schemas.microsoft.com/office/powerpoint/2010/main" val="3335254816"/>
+      </p:ext>
+    </p:extLst>
+  </p:cSld>
+  <p:clrMap bg1="lt1" tx1="dk1" bg2="lt2" tx2="dk2" accent1="accent1" accent2="accent2" accent3="accent3" accent4="accent4" accent5="accent5" accent6="accent6" hlink="hlink" folHlink="folHlink"/>
+  <p:notesStyle>
+    <a:lvl1pPr marL="0" algn="l" defTabSz="914400" rtl="0" eaLnBrk="1" latinLnBrk="0" hangingPunct="1">
+      <a:defRPr sz="1200" kern="1200">
+        <a:solidFill>
+          <a:schemeClr val="tx1"/>
+        </a:solidFill>
+        <a:latin typeface="+mn-lt"/>
+        <a:ea typeface="+mn-ea"/>
+        <a:cs typeface="+mn-cs"/>
+      </a:defRPr>
+    </a:lvl1pPr>
+    <a:lvl2pPr marL="457200" algn="l" defTabSz="914400" rtl="0" eaLnBrk="1" latinLnBrk="0" hangingPunct="1">
+      <a:defRPr sz="1200" kern="1200">
+        <a:solidFill>
+          <a:schemeClr val="tx1"/>
+        </a:solidFill>
+        <a:latin typeface="+mn-lt"/>
+        <a:ea typeface="+mn-ea"/>
+        <a:cs typeface="+mn-cs"/>
+      </a:defRPr>
+    </a:lvl2pPr>
+    <a:lvl3pPr marL="914400" algn="l" defTabSz="914400" rtl="0" eaLnBrk="1" latinLnBrk="0" hangingPunct="1">
+      <a:defRPr sz="1200" kern="1200">
+        <a:solidFill>
+          <a:schemeClr val="tx1"/>
+        </a:solidFill>
+        <a:latin typeface="+mn-lt"/>
+        <a:ea typeface="+mn-ea"/>
+        <a:cs typeface="+mn-cs"/>
+      </a:defRPr>
+    </a:lvl3pPr>
+    <a:lvl4pPr marL="1371600" algn="l" defTabSz="914400" rtl="0" eaLnBrk="1" latinLnBrk="0" hangingPunct="1">
+      <a:defRPr sz="1200" kern="1200">
+        <a:solidFill>
+          <a:schemeClr val="tx1"/>
+        </a:solidFill>
+        <a:latin typeface="+mn-lt"/>
+        <a:ea typeface="+mn-ea"/>
+        <a:cs typeface="+mn-cs"/>
+      </a:defRPr>
+    </a:lvl4pPr>
+    <a:lvl5pPr marL="1828800" algn="l" defTabSz="914400" rtl="0" eaLnBrk="1" latinLnBrk="0" hangingPunct="1">
+      <a:defRPr sz="1200" kern="1200">
+        <a:solidFill>
+          <a:schemeClr val="tx1"/>
+        </a:solidFill>
+        <a:latin typeface="+mn-lt"/>
+        <a:ea typeface="+mn-ea"/>
+        <a:cs typeface="+mn-cs"/>
+      </a:defRPr>
+    </a:lvl5pPr>
+    <a:lvl6pPr marL="2286000" algn="l" defTabSz="914400" rtl="0" eaLnBrk="1" latinLnBrk="0" hangingPunct="1">
+      <a:defRPr sz="1200" kern="1200">
+        <a:solidFill>
+          <a:schemeClr val="tx1"/>
+        </a:solidFill>
+        <a:latin typeface="+mn-lt"/>
+        <a:ea typeface="+mn-ea"/>
+        <a:cs typeface="+mn-cs"/>
+      </a:defRPr>
+    </a:lvl6pPr>
+    <a:lvl7pPr marL="2743200" algn="l" defTabSz="914400" rtl="0" eaLnBrk="1" latinLnBrk="0" hangingPunct="1">
+      <a:defRPr sz="1200" kern="1200">
+        <a:solidFill>
+          <a:schemeClr val="tx1"/>
+        </a:solidFill>
+        <a:latin typeface="+mn-lt"/>
+        <a:ea typeface="+mn-ea"/>
+        <a:cs typeface="+mn-cs"/>
+      </a:defRPr>
+    </a:lvl7pPr>
+    <a:lvl8pPr marL="3200400" algn="l" defTabSz="914400" rtl="0" eaLnBrk="1" latinLnBrk="0" hangingPunct="1">
+      <a:defRPr sz="1200" kern="1200">
+        <a:solidFill>
+          <a:schemeClr val="tx1"/>
+        </a:solidFill>
+        <a:latin typeface="+mn-lt"/>
+        <a:ea typeface="+mn-ea"/>
+        <a:cs typeface="+mn-cs"/>
+      </a:defRPr>
+    </a:lvl8pPr>
+    <a:lvl9pPr marL="3657600" algn="l" defTabSz="914400" rtl="0" eaLnBrk="1" latinLnBrk="0" hangingPunct="1">
+      <a:defRPr sz="1200" kern="1200">
+        <a:solidFill>
+          <a:schemeClr val="tx1"/>
+        </a:solidFill>
+        <a:latin typeface="+mn-lt"/>
+        <a:ea typeface="+mn-ea"/>
+        <a:cs typeface="+mn-cs"/>
+      </a:defRPr>
+    </a:lvl9pPr>
+  </p:notesStyle>
+</p:notesMaster>
+</file>
+
+<file path=ppt/notesSlides/notesSlide1.xml><?xml version="1.0" encoding="utf-8"?>
+<p:notes xmlns:a="http://schemas.openxmlformats.org/drawingml/2006/main" xmlns:r="http://schemas.openxmlformats.org/officeDocument/2006/relationships" xmlns:p="http://schemas.openxmlformats.org/presentationml/2006/main">
+  <p:cSld>
+    <p:spTree>
+      <p:nvGrpSpPr>
+        <p:cNvPr id="1" name=""/>
+        <p:cNvGrpSpPr/>
+        <p:nvPr/>
+      </p:nvGrpSpPr>
+      <p:grpSpPr>
+        <a:xfrm>
+          <a:off x="0" y="0"/>
+          <a:ext cx="0" cy="0"/>
+          <a:chOff x="0" y="0"/>
+          <a:chExt cx="0" cy="0"/>
+        </a:xfrm>
+      </p:grpSpPr>
+      <p:sp>
+        <p:nvSpPr>
+          <p:cNvPr id="2" name="Espace réservé de l'image des diapositives 1"/>
+          <p:cNvSpPr>
+            <a:spLocks noGrp="1" noRot="1" noChangeAspect="1"/>
+          </p:cNvSpPr>
+          <p:nvPr>
+            <p:ph type="sldImg"/>
+          </p:nvPr>
+        </p:nvSpPr>
+        <p:spPr/>
+      </p:sp>
+      <p:sp>
+        <p:nvSpPr>
+          <p:cNvPr id="3" name="Espace réservé des commentaires 2"/>
+          <p:cNvSpPr>
+            <a:spLocks noGrp="1"/>
+          </p:cNvSpPr>
+          <p:nvPr>
+            <p:ph type="body" idx="1"/>
+          </p:nvPr>
+        </p:nvSpPr>
+        <p:spPr/>
+        <p:txBody>
+          <a:bodyPr/>
+          <a:lstStyle/>
+          <a:p>
+            <a:r>
+              <a:rPr lang="fr-FR" dirty="0" smtClean="0"/>
+              <a:t>Analyse sémantique =&gt; YOANN + ALBAN</a:t>
+            </a:r>
+          </a:p>
+          <a:p>
+            <a:endParaRPr lang="fr-FR" dirty="0"/>
+          </a:p>
+          <a:p>
+            <a:r>
+              <a:rPr lang="fr-FR" dirty="0" smtClean="0"/>
+              <a:t>Solutions existantes =&gt; RAPHAËL</a:t>
+            </a:r>
+          </a:p>
+          <a:p>
+            <a:endParaRPr lang="fr-FR" dirty="0"/>
+          </a:p>
+          <a:p>
+            <a:r>
+              <a:rPr lang="fr-FR" dirty="0" smtClean="0"/>
+              <a:t>Mise en place de Scrum =&gt; YOANN</a:t>
+            </a:r>
+          </a:p>
+          <a:p>
+            <a:endParaRPr lang="fr-FR" dirty="0"/>
+          </a:p>
+          <a:p>
+            <a:r>
+              <a:rPr lang="fr-FR" smtClean="0"/>
+              <a:t>Développement =&gt; CHARLES</a:t>
+            </a:r>
+            <a:endParaRPr lang="fr-FR" dirty="0"/>
+          </a:p>
+        </p:txBody>
+      </p:sp>
+      <p:sp>
+        <p:nvSpPr>
+          <p:cNvPr id="4" name="Espace réservé du numéro de diapositive 3"/>
+          <p:cNvSpPr>
+            <a:spLocks noGrp="1"/>
+          </p:cNvSpPr>
+          <p:nvPr>
+            <p:ph type="sldNum" sz="quarter" idx="10"/>
+          </p:nvPr>
+        </p:nvSpPr>
+        <p:spPr/>
+        <p:txBody>
+          <a:bodyPr/>
+          <a:lstStyle/>
+          <a:p>
+            <a:fld id="{BCB96932-33C7-426F-B567-515379E36BC4}" type="slidenum">
+              <a:rPr lang="fr-FR" smtClean="0"/>
+              <a:t>15</a:t>
+            </a:fld>
+            <a:endParaRPr lang="fr-FR"/>
+          </a:p>
+        </p:txBody>
+      </p:sp>
+    </p:spTree>
+    <p:extLst>
+      <p:ext uri="{BB962C8B-B14F-4D97-AF65-F5344CB8AC3E}">
+        <p14:creationId xmlns:p14="http://schemas.microsoft.com/office/powerpoint/2010/main" val="1504904897"/>
+      </p:ext>
+    </p:extLst>
+  </p:cSld>
+  <p:clrMapOvr>
+    <a:masterClrMapping/>
+  </p:clrMapOvr>
+</p:notes>
 </file>
 
 <file path=ppt/slideLayouts/slideLayout1.xml><?xml version="1.0" encoding="utf-8"?>
@@ -5438,8 +5906,21 @@
                   <a:schemeClr val="tx1"/>
                 </a:solidFill>
               </a:rPr>
-              <a:t>Langage Java 1.8</a:t>
-            </a:r>
+              <a:t>Langage Java </a:t>
+            </a:r>
+            <a:r>
+              <a:rPr lang="fr-FR" dirty="0" smtClean="0">
+                <a:solidFill>
+                  <a:schemeClr val="tx1"/>
+                </a:solidFill>
+              </a:rPr>
+              <a:t>1.8</a:t>
+            </a:r>
+            <a:endParaRPr lang="fr-FR" dirty="0" smtClean="0">
+              <a:solidFill>
+                <a:schemeClr val="tx1"/>
+              </a:solidFill>
+            </a:endParaRPr>
           </a:p>
           <a:p>
             <a:pPr lvl="2"/>
@@ -5456,17 +5937,50 @@
             <a:pPr lvl="2"/>
             <a:r>
               <a:rPr lang="fr-FR" dirty="0"/>
-              <a:t>TODO : Pourquoi </a:t>
+              <a:t>Langage </a:t>
             </a:r>
             <a:r>
               <a:rPr lang="fr-FR" dirty="0" smtClean="0"/>
-              <a:t>?</a:t>
-            </a:r>
-            <a:endParaRPr lang="fr-FR" dirty="0" smtClean="0">
-              <a:solidFill>
-                <a:schemeClr val="tx1"/>
-              </a:solidFill>
-            </a:endParaRPr>
+              <a:t>polyvalent</a:t>
+            </a:r>
+          </a:p>
+          <a:p>
+            <a:pPr lvl="2"/>
+            <a:r>
+              <a:rPr lang="fr-FR" dirty="0" smtClean="0"/>
+              <a:t>Maitrisé </a:t>
+            </a:r>
+            <a:r>
+              <a:rPr lang="fr-FR" dirty="0"/>
+              <a:t>par l'ensemble </a:t>
+            </a:r>
+            <a:r>
+              <a:rPr lang="fr-FR" dirty="0" smtClean="0"/>
+              <a:t>des </a:t>
+            </a:r>
+            <a:r>
+              <a:rPr lang="fr-FR" dirty="0"/>
+              <a:t>membres de </a:t>
+            </a:r>
+            <a:r>
+              <a:rPr lang="fr-FR" dirty="0" smtClean="0"/>
+              <a:t>l'équipe</a:t>
+            </a:r>
+          </a:p>
+          <a:p>
+            <a:pPr lvl="2"/>
+            <a:r>
+              <a:rPr lang="fr-FR" dirty="0" smtClean="0"/>
+              <a:t>Langage </a:t>
+            </a:r>
+            <a:r>
+              <a:rPr lang="fr-FR" dirty="0"/>
+              <a:t>orienté </a:t>
+            </a:r>
+            <a:r>
+              <a:rPr lang="fr-FR" dirty="0" smtClean="0"/>
+              <a:t>objet</a:t>
+            </a:r>
           </a:p>
           <a:p>
             <a:pPr lvl="1"/>
@@ -5476,23 +5990,34 @@
                   <a:schemeClr val="tx1"/>
                 </a:solidFill>
               </a:rPr>
-              <a:t>IDE Netbeans 8.1</a:t>
+              <a:t>IDE </a:t>
+            </a:r>
+            <a:r>
+              <a:rPr lang="fr-FR" dirty="0" smtClean="0">
+                <a:solidFill>
+                  <a:schemeClr val="tx1"/>
+                </a:solidFill>
+              </a:rPr>
+              <a:t>Netbeans 8.1</a:t>
             </a:r>
           </a:p>
           <a:p>
             <a:pPr lvl="2"/>
             <a:r>
+              <a:rPr lang="fr-FR" dirty="0"/>
+              <a:t>Simple </a:t>
+            </a:r>
+            <a:r>
               <a:rPr lang="fr-FR" dirty="0" smtClean="0"/>
-              <a:t>TODO : Pourquoi ?</a:t>
-            </a:r>
-            <a:endParaRPr lang="fr-FR" dirty="0" smtClean="0">
-              <a:solidFill>
-                <a:schemeClr val="tx1"/>
-              </a:solidFill>
-            </a:endParaRPr>
-          </a:p>
-          <a:p>
-            <a:pPr lvl="1"/>
+              <a:t>d'utilisation</a:t>
+            </a:r>
+          </a:p>
+          <a:p>
+            <a:pPr lvl="2"/>
+            <a:r>
+              <a:rPr lang="fr-FR" dirty="0" smtClean="0"/>
+              <a:t>Léger</a:t>
+            </a:r>
             <a:endParaRPr lang="fr-FR" dirty="0" smtClean="0">
               <a:solidFill>
                 <a:schemeClr val="tx1"/>
@@ -5549,13 +6074,8 @@
             </a:r>
             <a:r>
               <a:rPr lang="fr-FR" dirty="0" smtClean="0"/>
-              <a:t> : Editeur de </a:t>
-            </a:r>
-            <a:r>
-              <a:rPr lang="fr-FR" dirty="0" smtClean="0"/>
-              <a:t>graphes</a:t>
-            </a:r>
-            <a:endParaRPr lang="fr-FR" dirty="0" smtClean="0"/>
+              <a:t> : Editeur de graphes</a:t>
+            </a:r>
           </a:p>
           <a:p>
             <a:pPr lvl="2"/>
@@ -5743,7 +6263,7 @@
         </p:blipFill>
         <p:spPr bwMode="auto">
           <a:xfrm>
-            <a:off x="8342993" y="1480307"/>
+            <a:off x="7914368" y="2860071"/>
             <a:ext cx="2435678" cy="1060874"/>
           </a:xfrm>
           <a:prstGeom prst="rect">
@@ -5784,7 +6304,7 @@
         </p:blipFill>
         <p:spPr bwMode="auto">
           <a:xfrm>
-            <a:off x="5952217" y="4261757"/>
+            <a:off x="6028418" y="4596493"/>
             <a:ext cx="979714" cy="979714"/>
           </a:xfrm>
           <a:prstGeom prst="rect">
@@ -5939,11 +6459,15 @@
             <a:pPr lvl="2"/>
             <a:r>
               <a:rPr lang="fr-FR" dirty="0" smtClean="0"/>
-              <a:t>Libre (GPLv3</a:t>
-            </a:r>
+              <a:t>Reconnu et très complet</a:t>
+            </a:r>
+            <a:endParaRPr lang="fr-FR" dirty="0" smtClean="0"/>
+          </a:p>
+          <a:p>
+            <a:pPr lvl="2"/>
             <a:r>
               <a:rPr lang="fr-FR" dirty="0" smtClean="0"/>
-              <a:t>)</a:t>
+              <a:t>Libre (GPLv3)</a:t>
             </a:r>
           </a:p>
           <a:p>
@@ -7764,11 +8288,7 @@
             <a:pPr lvl="1"/>
             <a:r>
               <a:rPr lang="fr-FR" dirty="0" smtClean="0"/>
-              <a:t>Réussir un travail </a:t>
-            </a:r>
-            <a:r>
-              <a:rPr lang="fr-FR" dirty="0" smtClean="0"/>
-              <a:t>en équipe</a:t>
+              <a:t>Réussir un travail en équipe</a:t>
             </a:r>
           </a:p>
           <a:p>
@@ -8276,19 +8796,7 @@
             </a:r>
             <a:r>
               <a:rPr lang="fr-FR" dirty="0" smtClean="0"/>
-              <a:t>sorties TODO : Mettre la </a:t>
-            </a:r>
-            <a:r>
-              <a:rPr lang="fr-FR" dirty="0" err="1" smtClean="0"/>
-              <a:t>fleche</a:t>
-            </a:r>
-            <a:r>
-              <a:rPr lang="fr-FR" dirty="0" smtClean="0"/>
-              <a:t> NARVIS =W Twitter + bug label API </a:t>
-            </a:r>
-            <a:r>
-              <a:rPr lang="fr-FR" dirty="0" err="1" smtClean="0"/>
-              <a:t>Weather</a:t>
+              <a:t>sorties</a:t>
             </a:r>
             <a:endParaRPr lang="fr-FR" dirty="0"/>
           </a:p>
@@ -8404,8 +8912,8 @@
         </p:blipFill>
         <p:spPr>
           <a:xfrm>
-            <a:off x="0" y="1363548"/>
-            <a:ext cx="12122611" cy="4232549"/>
+            <a:off x="1" y="1363548"/>
+            <a:ext cx="12122608" cy="4232549"/>
           </a:xfrm>
           <a:prstGeom prst="rect">
             <a:avLst/>
@@ -8597,7 +9105,7 @@
           </p:cNvPicPr>
           <p:nvPr/>
         </p:nvPicPr>
-        <p:blipFill>
+        <p:blipFill rotWithShape="1">
           <a:blip r:embed="rId2">
             <a:extLst>
               <a:ext uri="{28A0092B-C50C-407E-A947-70E740481C1C}">
@@ -8605,14 +9113,13 @@
               </a:ext>
             </a:extLst>
           </a:blip>
-          <a:stretch>
-            <a:fillRect/>
-          </a:stretch>
+          <a:srcRect l="1094" t="3456" r="1316" b="4272"/>
+          <a:stretch/>
         </p:blipFill>
         <p:spPr>
           <a:xfrm>
-            <a:off x="0" y="1546241"/>
-            <a:ext cx="12192000" cy="3633439"/>
+            <a:off x="97971" y="1583871"/>
+            <a:ext cx="11968844" cy="3526972"/>
           </a:xfrm>
           <a:prstGeom prst="rect">
             <a:avLst/>
@@ -9322,4 +9829,289 @@
   <a:objectDefaults/>
   <a:extraClrSchemeLst/>
 </a:theme>
+</file>
+
+<file path=ppt/theme/theme2.xml><?xml version="1.0" encoding="utf-8"?>
+<a:theme xmlns:a="http://schemas.openxmlformats.org/drawingml/2006/main" name="Thème Office">
+  <a:themeElements>
+    <a:clrScheme name="Office">
+      <a:dk1>
+        <a:sysClr val="windowText" lastClr="000000"/>
+      </a:dk1>
+      <a:lt1>
+        <a:sysClr val="window" lastClr="FFFFFF"/>
+      </a:lt1>
+      <a:dk2>
+        <a:srgbClr val="1F497D"/>
+      </a:dk2>
+      <a:lt2>
+        <a:srgbClr val="EEECE1"/>
+      </a:lt2>
+      <a:accent1>
+        <a:srgbClr val="4F81BD"/>
+      </a:accent1>
+      <a:accent2>
+        <a:srgbClr val="C0504D"/>
+      </a:accent2>
+      <a:accent3>
+        <a:srgbClr val="9BBB59"/>
+      </a:accent3>
+      <a:accent4>
+        <a:srgbClr val="8064A2"/>
+      </a:accent4>
+      <a:accent5>
+        <a:srgbClr val="4BACC6"/>
+      </a:accent5>
+      <a:accent6>
+        <a:srgbClr val="F79646"/>
+      </a:accent6>
+      <a:hlink>
+        <a:srgbClr val="0000FF"/>
+      </a:hlink>
+      <a:folHlink>
+        <a:srgbClr val="800080"/>
+      </a:folHlink>
+    </a:clrScheme>
+    <a:fontScheme name="Office">
+      <a:majorFont>
+        <a:latin typeface="Calibri"/>
+        <a:ea typeface=""/>
+        <a:cs typeface=""/>
+        <a:font script="Jpan" typeface="ＭＳ Ｐゴシック"/>
+        <a:font script="Hang" typeface="맑은 고딕"/>
+        <a:font script="Hans" typeface="宋体"/>
+        <a:font script="Hant" typeface="新細明體"/>
+        <a:font script="Arab" typeface="Times New Roman"/>
+        <a:font script="Hebr" typeface="Times New Roman"/>
+        <a:font script="Thai" typeface="Angsana New"/>
+        <a:font script="Ethi" typeface="Nyala"/>
+        <a:font script="Beng" typeface="Vrinda"/>
+        <a:font script="Gujr" typeface="Shruti"/>
+        <a:font script="Khmr" typeface="MoolBoran"/>
+        <a:font script="Knda" typeface="Tunga"/>
+        <a:font script="Guru" typeface="Raavi"/>
+        <a:font script="Cans" typeface="Euphemia"/>
+        <a:font script="Cher" typeface="Plantagenet Cherokee"/>
+        <a:font script="Yiii" typeface="Microsoft Yi Baiti"/>
+        <a:font script="Tibt" typeface="Microsoft Himalaya"/>
+        <a:font script="Thaa" typeface="MV Boli"/>
+        <a:font script="Deva" typeface="Mangal"/>
+        <a:font script="Telu" typeface="Gautami"/>
+        <a:font script="Taml" typeface="Latha"/>
+        <a:font script="Syrc" typeface="Estrangelo Edessa"/>
+        <a:font script="Orya" typeface="Kalinga"/>
+        <a:font script="Mlym" typeface="Kartika"/>
+        <a:font script="Laoo" typeface="DokChampa"/>
+        <a:font script="Sinh" typeface="Iskoola Pota"/>
+        <a:font script="Mong" typeface="Mongolian Baiti"/>
+        <a:font script="Viet" typeface="Times New Roman"/>
+        <a:font script="Uigh" typeface="Microsoft Uighur"/>
+        <a:font script="Geor" typeface="Sylfaen"/>
+      </a:majorFont>
+      <a:minorFont>
+        <a:latin typeface="Calibri"/>
+        <a:ea typeface=""/>
+        <a:cs typeface=""/>
+        <a:font script="Jpan" typeface="ＭＳ Ｐゴシック"/>
+        <a:font script="Hang" typeface="맑은 고딕"/>
+        <a:font script="Hans" typeface="宋体"/>
+        <a:font script="Hant" typeface="新細明體"/>
+        <a:font script="Arab" typeface="Arial"/>
+        <a:font script="Hebr" typeface="Arial"/>
+        <a:font script="Thai" typeface="Cordia New"/>
+        <a:font script="Ethi" typeface="Nyala"/>
+        <a:font script="Beng" typeface="Vrinda"/>
+        <a:font script="Gujr" typeface="Shruti"/>
+        <a:font script="Khmr" typeface="DaunPenh"/>
+        <a:font script="Knda" typeface="Tunga"/>
+        <a:font script="Guru" typeface="Raavi"/>
+        <a:font script="Cans" typeface="Euphemia"/>
+        <a:font script="Cher" typeface="Plantagenet Cherokee"/>
+        <a:font script="Yiii" typeface="Microsoft Yi Baiti"/>
+        <a:font script="Tibt" typeface="Microsoft Himalaya"/>
+        <a:font script="Thaa" typeface="MV Boli"/>
+        <a:font script="Deva" typeface="Mangal"/>
+        <a:font script="Telu" typeface="Gautami"/>
+        <a:font script="Taml" typeface="Latha"/>
+        <a:font script="Syrc" typeface="Estrangelo Edessa"/>
+        <a:font script="Orya" typeface="Kalinga"/>
+        <a:font script="Mlym" typeface="Kartika"/>
+        <a:font script="Laoo" typeface="DokChampa"/>
+        <a:font script="Sinh" typeface="Iskoola Pota"/>
+        <a:font script="Mong" typeface="Mongolian Baiti"/>
+        <a:font script="Viet" typeface="Arial"/>
+        <a:font script="Uigh" typeface="Microsoft Uighur"/>
+        <a:font script="Geor" typeface="Sylfaen"/>
+      </a:minorFont>
+    </a:fontScheme>
+    <a:fmtScheme name="Office">
+      <a:fillStyleLst>
+        <a:solidFill>
+          <a:schemeClr val="phClr"/>
+        </a:solidFill>
+        <a:gradFill rotWithShape="1">
+          <a:gsLst>
+            <a:gs pos="0">
+              <a:schemeClr val="phClr">
+                <a:tint val="50000"/>
+                <a:satMod val="300000"/>
+              </a:schemeClr>
+            </a:gs>
+            <a:gs pos="35000">
+              <a:schemeClr val="phClr">
+                <a:tint val="37000"/>
+                <a:satMod val="300000"/>
+              </a:schemeClr>
+            </a:gs>
+            <a:gs pos="100000">
+              <a:schemeClr val="phClr">
+                <a:tint val="15000"/>
+                <a:satMod val="350000"/>
+              </a:schemeClr>
+            </a:gs>
+          </a:gsLst>
+          <a:lin ang="16200000" scaled="1"/>
+        </a:gradFill>
+        <a:gradFill rotWithShape="1">
+          <a:gsLst>
+            <a:gs pos="0">
+              <a:schemeClr val="phClr">
+                <a:shade val="51000"/>
+                <a:satMod val="130000"/>
+              </a:schemeClr>
+            </a:gs>
+            <a:gs pos="80000">
+              <a:schemeClr val="phClr">
+                <a:shade val="93000"/>
+                <a:satMod val="130000"/>
+              </a:schemeClr>
+            </a:gs>
+            <a:gs pos="100000">
+              <a:schemeClr val="phClr">
+                <a:shade val="94000"/>
+                <a:satMod val="135000"/>
+              </a:schemeClr>
+            </a:gs>
+          </a:gsLst>
+          <a:lin ang="16200000" scaled="0"/>
+        </a:gradFill>
+      </a:fillStyleLst>
+      <a:lnStyleLst>
+        <a:ln w="9525" cap="flat" cmpd="sng" algn="ctr">
+          <a:solidFill>
+            <a:schemeClr val="phClr">
+              <a:shade val="95000"/>
+              <a:satMod val="105000"/>
+            </a:schemeClr>
+          </a:solidFill>
+          <a:prstDash val="solid"/>
+        </a:ln>
+        <a:ln w="25400" cap="flat" cmpd="sng" algn="ctr">
+          <a:solidFill>
+            <a:schemeClr val="phClr"/>
+          </a:solidFill>
+          <a:prstDash val="solid"/>
+        </a:ln>
+        <a:ln w="38100" cap="flat" cmpd="sng" algn="ctr">
+          <a:solidFill>
+            <a:schemeClr val="phClr"/>
+          </a:solidFill>
+          <a:prstDash val="solid"/>
+        </a:ln>
+      </a:lnStyleLst>
+      <a:effectStyleLst>
+        <a:effectStyle>
+          <a:effectLst>
+            <a:outerShdw blurRad="40000" dist="20000" dir="5400000" rotWithShape="0">
+              <a:srgbClr val="000000">
+                <a:alpha val="38000"/>
+              </a:srgbClr>
+            </a:outerShdw>
+          </a:effectLst>
+        </a:effectStyle>
+        <a:effectStyle>
+          <a:effectLst>
+            <a:outerShdw blurRad="40000" dist="23000" dir="5400000" rotWithShape="0">
+              <a:srgbClr val="000000">
+                <a:alpha val="35000"/>
+              </a:srgbClr>
+            </a:outerShdw>
+          </a:effectLst>
+        </a:effectStyle>
+        <a:effectStyle>
+          <a:effectLst>
+            <a:outerShdw blurRad="40000" dist="23000" dir="5400000" rotWithShape="0">
+              <a:srgbClr val="000000">
+                <a:alpha val="35000"/>
+              </a:srgbClr>
+            </a:outerShdw>
+          </a:effectLst>
+          <a:scene3d>
+            <a:camera prst="orthographicFront">
+              <a:rot lat="0" lon="0" rev="0"/>
+            </a:camera>
+            <a:lightRig rig="threePt" dir="t">
+              <a:rot lat="0" lon="0" rev="1200000"/>
+            </a:lightRig>
+          </a:scene3d>
+          <a:sp3d>
+            <a:bevelT w="63500" h="25400"/>
+          </a:sp3d>
+        </a:effectStyle>
+      </a:effectStyleLst>
+      <a:bgFillStyleLst>
+        <a:solidFill>
+          <a:schemeClr val="phClr"/>
+        </a:solidFill>
+        <a:gradFill rotWithShape="1">
+          <a:gsLst>
+            <a:gs pos="0">
+              <a:schemeClr val="phClr">
+                <a:tint val="40000"/>
+                <a:satMod val="350000"/>
+              </a:schemeClr>
+            </a:gs>
+            <a:gs pos="40000">
+              <a:schemeClr val="phClr">
+                <a:tint val="45000"/>
+                <a:shade val="99000"/>
+                <a:satMod val="350000"/>
+              </a:schemeClr>
+            </a:gs>
+            <a:gs pos="100000">
+              <a:schemeClr val="phClr">
+                <a:shade val="20000"/>
+                <a:satMod val="255000"/>
+              </a:schemeClr>
+            </a:gs>
+          </a:gsLst>
+          <a:path path="circle">
+            <a:fillToRect l="50000" t="-80000" r="50000" b="180000"/>
+          </a:path>
+        </a:gradFill>
+        <a:gradFill rotWithShape="1">
+          <a:gsLst>
+            <a:gs pos="0">
+              <a:schemeClr val="phClr">
+                <a:tint val="80000"/>
+                <a:satMod val="300000"/>
+              </a:schemeClr>
+            </a:gs>
+            <a:gs pos="100000">
+              <a:schemeClr val="phClr">
+                <a:shade val="30000"/>
+                <a:satMod val="200000"/>
+              </a:schemeClr>
+            </a:gs>
+          </a:gsLst>
+          <a:path path="circle">
+            <a:fillToRect l="50000" t="50000" r="50000" b="50000"/>
+          </a:path>
+        </a:gradFill>
+      </a:bgFillStyleLst>
+    </a:fmtScheme>
+  </a:themeElements>
+  <a:objectDefaults/>
+  <a:extraClrSchemeLst/>
+</a:theme>
 </file>
</xml_diff>

<commit_message>
Correction de faute d'orthographe
</commit_message>
<xml_diff>
--- a/Presentation/PrésentationNarvis_2.pptx
+++ b/Presentation/PrésentationNarvis_2.pptx
@@ -124,7 +124,7 @@
   </p:defaultTextStyle>
   <p:extLst>
     <p:ext uri="{EFAFB233-063F-42B5-8137-9DF3F51BA10A}">
-      <p15:sldGuideLst xmlns:p15="http://schemas.microsoft.com/office/powerpoint/2012/main" xmlns="">
+      <p15:sldGuideLst xmlns:p15="http://schemas.microsoft.com/office/powerpoint/2012/main">
         <p15:guide id="1" orient="horz" pos="2160">
           <p15:clr>
             <a:srgbClr val="A4A3A4"/>
@@ -136,6 +136,20 @@
           </p15:clr>
         </p15:guide>
       </p15:sldGuideLst>
+    </p:ext>
+    <p:ext uri="{2D200454-40CA-4A62-9FC3-DE9A4176ACB9}">
+      <p15:notesGuideLst xmlns:p15="http://schemas.microsoft.com/office/powerpoint/2012/main">
+        <p15:guide id="1" orient="horz" pos="2880">
+          <p15:clr>
+            <a:srgbClr val="A4A3A4"/>
+          </p15:clr>
+        </p15:guide>
+        <p15:guide id="2" pos="2160">
+          <p15:clr>
+            <a:srgbClr val="A4A3A4"/>
+          </p15:clr>
+        </p15:guide>
+      </p15:notesGuideLst>
     </p:ext>
   </p:extLst>
 </p:presentation>
@@ -223,7 +237,7 @@
           <a:p>
             <a:fld id="{2FD1EF25-567D-4635-9556-B60808108F83}" type="datetimeFigureOut">
               <a:rPr lang="fr-FR" smtClean="0"/>
-              <a:t>16/04/2015</a:t>
+              <a:t>17/04/2015</a:t>
             </a:fld>
             <a:endParaRPr lang="fr-FR"/>
           </a:p>
@@ -535,6 +549,510 @@
           <a:bodyPr/>
           <a:lstStyle/>
           <a:p>
+            <a:endParaRPr lang="fr-FR"/>
+          </a:p>
+        </p:txBody>
+      </p:sp>
+      <p:sp>
+        <p:nvSpPr>
+          <p:cNvPr id="4" name="Espace réservé du numéro de diapositive 3"/>
+          <p:cNvSpPr>
+            <a:spLocks noGrp="1"/>
+          </p:cNvSpPr>
+          <p:nvPr>
+            <p:ph type="sldNum" sz="quarter" idx="10"/>
+          </p:nvPr>
+        </p:nvSpPr>
+        <p:spPr/>
+        <p:txBody>
+          <a:bodyPr/>
+          <a:lstStyle/>
+          <a:p>
+            <a:fld id="{BCB96932-33C7-426F-B567-515379E36BC4}" type="slidenum">
+              <a:rPr lang="fr-FR" smtClean="0"/>
+              <a:t>1</a:t>
+            </a:fld>
+            <a:endParaRPr lang="fr-FR"/>
+          </a:p>
+        </p:txBody>
+      </p:sp>
+    </p:spTree>
+    <p:extLst>
+      <p:ext uri="{BB962C8B-B14F-4D97-AF65-F5344CB8AC3E}">
+        <p14:creationId xmlns:p14="http://schemas.microsoft.com/office/powerpoint/2010/main" val="4279743815"/>
+      </p:ext>
+    </p:extLst>
+  </p:cSld>
+  <p:clrMapOvr>
+    <a:masterClrMapping/>
+  </p:clrMapOvr>
+</p:notes>
+</file>
+
+<file path=ppt/notesSlides/notesSlide10.xml><?xml version="1.0" encoding="utf-8"?>
+<p:notes xmlns:a="http://schemas.openxmlformats.org/drawingml/2006/main" xmlns:r="http://schemas.openxmlformats.org/officeDocument/2006/relationships" xmlns:p="http://schemas.openxmlformats.org/presentationml/2006/main">
+  <p:cSld>
+    <p:spTree>
+      <p:nvGrpSpPr>
+        <p:cNvPr id="1" name=""/>
+        <p:cNvGrpSpPr/>
+        <p:nvPr/>
+      </p:nvGrpSpPr>
+      <p:grpSpPr>
+        <a:xfrm>
+          <a:off x="0" y="0"/>
+          <a:ext cx="0" cy="0"/>
+          <a:chOff x="0" y="0"/>
+          <a:chExt cx="0" cy="0"/>
+        </a:xfrm>
+      </p:grpSpPr>
+      <p:sp>
+        <p:nvSpPr>
+          <p:cNvPr id="2" name="Espace réservé de l'image des diapositives 1"/>
+          <p:cNvSpPr>
+            <a:spLocks noGrp="1" noRot="1" noChangeAspect="1"/>
+          </p:cNvSpPr>
+          <p:nvPr>
+            <p:ph type="sldImg"/>
+          </p:nvPr>
+        </p:nvSpPr>
+        <p:spPr/>
+      </p:sp>
+      <p:sp>
+        <p:nvSpPr>
+          <p:cNvPr id="3" name="Espace réservé des commentaires 2"/>
+          <p:cNvSpPr>
+            <a:spLocks noGrp="1"/>
+          </p:cNvSpPr>
+          <p:nvPr>
+            <p:ph type="body" idx="1"/>
+          </p:nvPr>
+        </p:nvSpPr>
+        <p:spPr/>
+        <p:txBody>
+          <a:bodyPr/>
+          <a:lstStyle/>
+          <a:p>
+            <a:endParaRPr lang="fr-FR"/>
+          </a:p>
+        </p:txBody>
+      </p:sp>
+      <p:sp>
+        <p:nvSpPr>
+          <p:cNvPr id="4" name="Espace réservé du numéro de diapositive 3"/>
+          <p:cNvSpPr>
+            <a:spLocks noGrp="1"/>
+          </p:cNvSpPr>
+          <p:nvPr>
+            <p:ph type="sldNum" sz="quarter" idx="10"/>
+          </p:nvPr>
+        </p:nvSpPr>
+        <p:spPr/>
+        <p:txBody>
+          <a:bodyPr/>
+          <a:lstStyle/>
+          <a:p>
+            <a:fld id="{BCB96932-33C7-426F-B567-515379E36BC4}" type="slidenum">
+              <a:rPr lang="fr-FR" smtClean="0"/>
+              <a:t>10</a:t>
+            </a:fld>
+            <a:endParaRPr lang="fr-FR"/>
+          </a:p>
+        </p:txBody>
+      </p:sp>
+    </p:spTree>
+    <p:extLst>
+      <p:ext uri="{BB962C8B-B14F-4D97-AF65-F5344CB8AC3E}">
+        <p14:creationId xmlns:p14="http://schemas.microsoft.com/office/powerpoint/2010/main" val="3164295804"/>
+      </p:ext>
+    </p:extLst>
+  </p:cSld>
+  <p:clrMapOvr>
+    <a:masterClrMapping/>
+  </p:clrMapOvr>
+</p:notes>
+</file>
+
+<file path=ppt/notesSlides/notesSlide11.xml><?xml version="1.0" encoding="utf-8"?>
+<p:notes xmlns:a="http://schemas.openxmlformats.org/drawingml/2006/main" xmlns:r="http://schemas.openxmlformats.org/officeDocument/2006/relationships" xmlns:p="http://schemas.openxmlformats.org/presentationml/2006/main">
+  <p:cSld>
+    <p:spTree>
+      <p:nvGrpSpPr>
+        <p:cNvPr id="1" name=""/>
+        <p:cNvGrpSpPr/>
+        <p:nvPr/>
+      </p:nvGrpSpPr>
+      <p:grpSpPr>
+        <a:xfrm>
+          <a:off x="0" y="0"/>
+          <a:ext cx="0" cy="0"/>
+          <a:chOff x="0" y="0"/>
+          <a:chExt cx="0" cy="0"/>
+        </a:xfrm>
+      </p:grpSpPr>
+      <p:sp>
+        <p:nvSpPr>
+          <p:cNvPr id="2" name="Espace réservé de l'image des diapositives 1"/>
+          <p:cNvSpPr>
+            <a:spLocks noGrp="1" noRot="1" noChangeAspect="1"/>
+          </p:cNvSpPr>
+          <p:nvPr>
+            <p:ph type="sldImg"/>
+          </p:nvPr>
+        </p:nvSpPr>
+        <p:spPr/>
+      </p:sp>
+      <p:sp>
+        <p:nvSpPr>
+          <p:cNvPr id="3" name="Espace réservé des commentaires 2"/>
+          <p:cNvSpPr>
+            <a:spLocks noGrp="1"/>
+          </p:cNvSpPr>
+          <p:nvPr>
+            <p:ph type="body" idx="1"/>
+          </p:nvPr>
+        </p:nvSpPr>
+        <p:spPr/>
+        <p:txBody>
+          <a:bodyPr/>
+          <a:lstStyle/>
+          <a:p>
+            <a:endParaRPr lang="fr-FR"/>
+          </a:p>
+        </p:txBody>
+      </p:sp>
+      <p:sp>
+        <p:nvSpPr>
+          <p:cNvPr id="4" name="Espace réservé du numéro de diapositive 3"/>
+          <p:cNvSpPr>
+            <a:spLocks noGrp="1"/>
+          </p:cNvSpPr>
+          <p:nvPr>
+            <p:ph type="sldNum" sz="quarter" idx="10"/>
+          </p:nvPr>
+        </p:nvSpPr>
+        <p:spPr/>
+        <p:txBody>
+          <a:bodyPr/>
+          <a:lstStyle/>
+          <a:p>
+            <a:fld id="{BCB96932-33C7-426F-B567-515379E36BC4}" type="slidenum">
+              <a:rPr lang="fr-FR" smtClean="0"/>
+              <a:t>11</a:t>
+            </a:fld>
+            <a:endParaRPr lang="fr-FR"/>
+          </a:p>
+        </p:txBody>
+      </p:sp>
+    </p:spTree>
+    <p:extLst>
+      <p:ext uri="{BB962C8B-B14F-4D97-AF65-F5344CB8AC3E}">
+        <p14:creationId xmlns:p14="http://schemas.microsoft.com/office/powerpoint/2010/main" val="214541794"/>
+      </p:ext>
+    </p:extLst>
+  </p:cSld>
+  <p:clrMapOvr>
+    <a:masterClrMapping/>
+  </p:clrMapOvr>
+</p:notes>
+</file>
+
+<file path=ppt/notesSlides/notesSlide12.xml><?xml version="1.0" encoding="utf-8"?>
+<p:notes xmlns:a="http://schemas.openxmlformats.org/drawingml/2006/main" xmlns:r="http://schemas.openxmlformats.org/officeDocument/2006/relationships" xmlns:p="http://schemas.openxmlformats.org/presentationml/2006/main">
+  <p:cSld>
+    <p:spTree>
+      <p:nvGrpSpPr>
+        <p:cNvPr id="1" name=""/>
+        <p:cNvGrpSpPr/>
+        <p:nvPr/>
+      </p:nvGrpSpPr>
+      <p:grpSpPr>
+        <a:xfrm>
+          <a:off x="0" y="0"/>
+          <a:ext cx="0" cy="0"/>
+          <a:chOff x="0" y="0"/>
+          <a:chExt cx="0" cy="0"/>
+        </a:xfrm>
+      </p:grpSpPr>
+      <p:sp>
+        <p:nvSpPr>
+          <p:cNvPr id="2" name="Espace réservé de l'image des diapositives 1"/>
+          <p:cNvSpPr>
+            <a:spLocks noGrp="1" noRot="1" noChangeAspect="1"/>
+          </p:cNvSpPr>
+          <p:nvPr>
+            <p:ph type="sldImg"/>
+          </p:nvPr>
+        </p:nvSpPr>
+        <p:spPr/>
+      </p:sp>
+      <p:sp>
+        <p:nvSpPr>
+          <p:cNvPr id="3" name="Espace réservé des commentaires 2"/>
+          <p:cNvSpPr>
+            <a:spLocks noGrp="1"/>
+          </p:cNvSpPr>
+          <p:nvPr>
+            <p:ph type="body" idx="1"/>
+          </p:nvPr>
+        </p:nvSpPr>
+        <p:spPr/>
+        <p:txBody>
+          <a:bodyPr/>
+          <a:lstStyle/>
+          <a:p>
+            <a:endParaRPr lang="fr-FR"/>
+          </a:p>
+        </p:txBody>
+      </p:sp>
+      <p:sp>
+        <p:nvSpPr>
+          <p:cNvPr id="4" name="Espace réservé du numéro de diapositive 3"/>
+          <p:cNvSpPr>
+            <a:spLocks noGrp="1"/>
+          </p:cNvSpPr>
+          <p:nvPr>
+            <p:ph type="sldNum" sz="quarter" idx="10"/>
+          </p:nvPr>
+        </p:nvSpPr>
+        <p:spPr/>
+        <p:txBody>
+          <a:bodyPr/>
+          <a:lstStyle/>
+          <a:p>
+            <a:fld id="{BCB96932-33C7-426F-B567-515379E36BC4}" type="slidenum">
+              <a:rPr lang="fr-FR" smtClean="0"/>
+              <a:t>12</a:t>
+            </a:fld>
+            <a:endParaRPr lang="fr-FR"/>
+          </a:p>
+        </p:txBody>
+      </p:sp>
+    </p:spTree>
+    <p:extLst>
+      <p:ext uri="{BB962C8B-B14F-4D97-AF65-F5344CB8AC3E}">
+        <p14:creationId xmlns:p14="http://schemas.microsoft.com/office/powerpoint/2010/main" val="1361716343"/>
+      </p:ext>
+    </p:extLst>
+  </p:cSld>
+  <p:clrMapOvr>
+    <a:masterClrMapping/>
+  </p:clrMapOvr>
+</p:notes>
+</file>
+
+<file path=ppt/notesSlides/notesSlide13.xml><?xml version="1.0" encoding="utf-8"?>
+<p:notes xmlns:a="http://schemas.openxmlformats.org/drawingml/2006/main" xmlns:r="http://schemas.openxmlformats.org/officeDocument/2006/relationships" xmlns:p="http://schemas.openxmlformats.org/presentationml/2006/main">
+  <p:cSld>
+    <p:spTree>
+      <p:nvGrpSpPr>
+        <p:cNvPr id="1" name=""/>
+        <p:cNvGrpSpPr/>
+        <p:nvPr/>
+      </p:nvGrpSpPr>
+      <p:grpSpPr>
+        <a:xfrm>
+          <a:off x="0" y="0"/>
+          <a:ext cx="0" cy="0"/>
+          <a:chOff x="0" y="0"/>
+          <a:chExt cx="0" cy="0"/>
+        </a:xfrm>
+      </p:grpSpPr>
+      <p:sp>
+        <p:nvSpPr>
+          <p:cNvPr id="2" name="Espace réservé de l'image des diapositives 1"/>
+          <p:cNvSpPr>
+            <a:spLocks noGrp="1" noRot="1" noChangeAspect="1"/>
+          </p:cNvSpPr>
+          <p:nvPr>
+            <p:ph type="sldImg"/>
+          </p:nvPr>
+        </p:nvSpPr>
+        <p:spPr/>
+      </p:sp>
+      <p:sp>
+        <p:nvSpPr>
+          <p:cNvPr id="3" name="Espace réservé des commentaires 2"/>
+          <p:cNvSpPr>
+            <a:spLocks noGrp="1"/>
+          </p:cNvSpPr>
+          <p:nvPr>
+            <p:ph type="body" idx="1"/>
+          </p:nvPr>
+        </p:nvSpPr>
+        <p:spPr/>
+        <p:txBody>
+          <a:bodyPr/>
+          <a:lstStyle/>
+          <a:p>
+            <a:endParaRPr lang="fr-FR"/>
+          </a:p>
+        </p:txBody>
+      </p:sp>
+      <p:sp>
+        <p:nvSpPr>
+          <p:cNvPr id="4" name="Espace réservé du numéro de diapositive 3"/>
+          <p:cNvSpPr>
+            <a:spLocks noGrp="1"/>
+          </p:cNvSpPr>
+          <p:nvPr>
+            <p:ph type="sldNum" sz="quarter" idx="10"/>
+          </p:nvPr>
+        </p:nvSpPr>
+        <p:spPr/>
+        <p:txBody>
+          <a:bodyPr/>
+          <a:lstStyle/>
+          <a:p>
+            <a:fld id="{BCB96932-33C7-426F-B567-515379E36BC4}" type="slidenum">
+              <a:rPr lang="fr-FR" smtClean="0"/>
+              <a:t>13</a:t>
+            </a:fld>
+            <a:endParaRPr lang="fr-FR"/>
+          </a:p>
+        </p:txBody>
+      </p:sp>
+    </p:spTree>
+    <p:extLst>
+      <p:ext uri="{BB962C8B-B14F-4D97-AF65-F5344CB8AC3E}">
+        <p14:creationId xmlns:p14="http://schemas.microsoft.com/office/powerpoint/2010/main" val="888814134"/>
+      </p:ext>
+    </p:extLst>
+  </p:cSld>
+  <p:clrMapOvr>
+    <a:masterClrMapping/>
+  </p:clrMapOvr>
+</p:notes>
+</file>
+
+<file path=ppt/notesSlides/notesSlide14.xml><?xml version="1.0" encoding="utf-8"?>
+<p:notes xmlns:a="http://schemas.openxmlformats.org/drawingml/2006/main" xmlns:r="http://schemas.openxmlformats.org/officeDocument/2006/relationships" xmlns:p="http://schemas.openxmlformats.org/presentationml/2006/main">
+  <p:cSld>
+    <p:spTree>
+      <p:nvGrpSpPr>
+        <p:cNvPr id="1" name=""/>
+        <p:cNvGrpSpPr/>
+        <p:nvPr/>
+      </p:nvGrpSpPr>
+      <p:grpSpPr>
+        <a:xfrm>
+          <a:off x="0" y="0"/>
+          <a:ext cx="0" cy="0"/>
+          <a:chOff x="0" y="0"/>
+          <a:chExt cx="0" cy="0"/>
+        </a:xfrm>
+      </p:grpSpPr>
+      <p:sp>
+        <p:nvSpPr>
+          <p:cNvPr id="2" name="Espace réservé de l'image des diapositives 1"/>
+          <p:cNvSpPr>
+            <a:spLocks noGrp="1" noRot="1" noChangeAspect="1"/>
+          </p:cNvSpPr>
+          <p:nvPr>
+            <p:ph type="sldImg"/>
+          </p:nvPr>
+        </p:nvSpPr>
+        <p:spPr/>
+      </p:sp>
+      <p:sp>
+        <p:nvSpPr>
+          <p:cNvPr id="3" name="Espace réservé des commentaires 2"/>
+          <p:cNvSpPr>
+            <a:spLocks noGrp="1"/>
+          </p:cNvSpPr>
+          <p:nvPr>
+            <p:ph type="body" idx="1"/>
+          </p:nvPr>
+        </p:nvSpPr>
+        <p:spPr/>
+        <p:txBody>
+          <a:bodyPr/>
+          <a:lstStyle/>
+          <a:p>
+            <a:endParaRPr lang="fr-FR"/>
+          </a:p>
+        </p:txBody>
+      </p:sp>
+      <p:sp>
+        <p:nvSpPr>
+          <p:cNvPr id="4" name="Espace réservé du numéro de diapositive 3"/>
+          <p:cNvSpPr>
+            <a:spLocks noGrp="1"/>
+          </p:cNvSpPr>
+          <p:nvPr>
+            <p:ph type="sldNum" sz="quarter" idx="10"/>
+          </p:nvPr>
+        </p:nvSpPr>
+        <p:spPr/>
+        <p:txBody>
+          <a:bodyPr/>
+          <a:lstStyle/>
+          <a:p>
+            <a:fld id="{BCB96932-33C7-426F-B567-515379E36BC4}" type="slidenum">
+              <a:rPr lang="fr-FR" smtClean="0"/>
+              <a:t>14</a:t>
+            </a:fld>
+            <a:endParaRPr lang="fr-FR"/>
+          </a:p>
+        </p:txBody>
+      </p:sp>
+    </p:spTree>
+    <p:extLst>
+      <p:ext uri="{BB962C8B-B14F-4D97-AF65-F5344CB8AC3E}">
+        <p14:creationId xmlns:p14="http://schemas.microsoft.com/office/powerpoint/2010/main" val="2096465541"/>
+      </p:ext>
+    </p:extLst>
+  </p:cSld>
+  <p:clrMapOvr>
+    <a:masterClrMapping/>
+  </p:clrMapOvr>
+</p:notes>
+</file>
+
+<file path=ppt/notesSlides/notesSlide15.xml><?xml version="1.0" encoding="utf-8"?>
+<p:notes xmlns:a="http://schemas.openxmlformats.org/drawingml/2006/main" xmlns:r="http://schemas.openxmlformats.org/officeDocument/2006/relationships" xmlns:p="http://schemas.openxmlformats.org/presentationml/2006/main">
+  <p:cSld>
+    <p:spTree>
+      <p:nvGrpSpPr>
+        <p:cNvPr id="1" name=""/>
+        <p:cNvGrpSpPr/>
+        <p:nvPr/>
+      </p:nvGrpSpPr>
+      <p:grpSpPr>
+        <a:xfrm>
+          <a:off x="0" y="0"/>
+          <a:ext cx="0" cy="0"/>
+          <a:chOff x="0" y="0"/>
+          <a:chExt cx="0" cy="0"/>
+        </a:xfrm>
+      </p:grpSpPr>
+      <p:sp>
+        <p:nvSpPr>
+          <p:cNvPr id="2" name="Espace réservé de l'image des diapositives 1"/>
+          <p:cNvSpPr>
+            <a:spLocks noGrp="1" noRot="1" noChangeAspect="1"/>
+          </p:cNvSpPr>
+          <p:nvPr>
+            <p:ph type="sldImg"/>
+          </p:nvPr>
+        </p:nvSpPr>
+        <p:spPr/>
+      </p:sp>
+      <p:sp>
+        <p:nvSpPr>
+          <p:cNvPr id="3" name="Espace réservé des commentaires 2"/>
+          <p:cNvSpPr>
+            <a:spLocks noGrp="1"/>
+          </p:cNvSpPr>
+          <p:nvPr>
+            <p:ph type="body" idx="1"/>
+          </p:nvPr>
+        </p:nvSpPr>
+        <p:spPr/>
+        <p:txBody>
+          <a:bodyPr/>
+          <a:lstStyle/>
+          <a:p>
             <a:r>
               <a:rPr lang="fr-FR" dirty="0" smtClean="0"/>
               <a:t>Analyse sémantique =&gt; YOANN + ALBAN</a:t>
@@ -597,6 +1115,762 @@
     <p:extLst>
       <p:ext uri="{BB962C8B-B14F-4D97-AF65-F5344CB8AC3E}">
         <p14:creationId xmlns:p14="http://schemas.microsoft.com/office/powerpoint/2010/main" val="1504904897"/>
+      </p:ext>
+    </p:extLst>
+  </p:cSld>
+  <p:clrMapOvr>
+    <a:masterClrMapping/>
+  </p:clrMapOvr>
+</p:notes>
+</file>
+
+<file path=ppt/notesSlides/notesSlide16.xml><?xml version="1.0" encoding="utf-8"?>
+<p:notes xmlns:a="http://schemas.openxmlformats.org/drawingml/2006/main" xmlns:r="http://schemas.openxmlformats.org/officeDocument/2006/relationships" xmlns:p="http://schemas.openxmlformats.org/presentationml/2006/main">
+  <p:cSld>
+    <p:spTree>
+      <p:nvGrpSpPr>
+        <p:cNvPr id="1" name=""/>
+        <p:cNvGrpSpPr/>
+        <p:nvPr/>
+      </p:nvGrpSpPr>
+      <p:grpSpPr>
+        <a:xfrm>
+          <a:off x="0" y="0"/>
+          <a:ext cx="0" cy="0"/>
+          <a:chOff x="0" y="0"/>
+          <a:chExt cx="0" cy="0"/>
+        </a:xfrm>
+      </p:grpSpPr>
+      <p:sp>
+        <p:nvSpPr>
+          <p:cNvPr id="2" name="Espace réservé de l'image des diapositives 1"/>
+          <p:cNvSpPr>
+            <a:spLocks noGrp="1" noRot="1" noChangeAspect="1"/>
+          </p:cNvSpPr>
+          <p:nvPr>
+            <p:ph type="sldImg"/>
+          </p:nvPr>
+        </p:nvSpPr>
+        <p:spPr/>
+      </p:sp>
+      <p:sp>
+        <p:nvSpPr>
+          <p:cNvPr id="3" name="Espace réservé des commentaires 2"/>
+          <p:cNvSpPr>
+            <a:spLocks noGrp="1"/>
+          </p:cNvSpPr>
+          <p:nvPr>
+            <p:ph type="body" idx="1"/>
+          </p:nvPr>
+        </p:nvSpPr>
+        <p:spPr/>
+        <p:txBody>
+          <a:bodyPr/>
+          <a:lstStyle/>
+          <a:p>
+            <a:endParaRPr lang="fr-FR"/>
+          </a:p>
+        </p:txBody>
+      </p:sp>
+      <p:sp>
+        <p:nvSpPr>
+          <p:cNvPr id="4" name="Espace réservé du numéro de diapositive 3"/>
+          <p:cNvSpPr>
+            <a:spLocks noGrp="1"/>
+          </p:cNvSpPr>
+          <p:nvPr>
+            <p:ph type="sldNum" sz="quarter" idx="10"/>
+          </p:nvPr>
+        </p:nvSpPr>
+        <p:spPr/>
+        <p:txBody>
+          <a:bodyPr/>
+          <a:lstStyle/>
+          <a:p>
+            <a:fld id="{BCB96932-33C7-426F-B567-515379E36BC4}" type="slidenum">
+              <a:rPr lang="fr-FR" smtClean="0"/>
+              <a:t>16</a:t>
+            </a:fld>
+            <a:endParaRPr lang="fr-FR"/>
+          </a:p>
+        </p:txBody>
+      </p:sp>
+    </p:spTree>
+    <p:extLst>
+      <p:ext uri="{BB962C8B-B14F-4D97-AF65-F5344CB8AC3E}">
+        <p14:creationId xmlns:p14="http://schemas.microsoft.com/office/powerpoint/2010/main" val="3230282263"/>
+      </p:ext>
+    </p:extLst>
+  </p:cSld>
+  <p:clrMapOvr>
+    <a:masterClrMapping/>
+  </p:clrMapOvr>
+</p:notes>
+</file>
+
+<file path=ppt/notesSlides/notesSlide2.xml><?xml version="1.0" encoding="utf-8"?>
+<p:notes xmlns:a="http://schemas.openxmlformats.org/drawingml/2006/main" xmlns:r="http://schemas.openxmlformats.org/officeDocument/2006/relationships" xmlns:p="http://schemas.openxmlformats.org/presentationml/2006/main">
+  <p:cSld>
+    <p:spTree>
+      <p:nvGrpSpPr>
+        <p:cNvPr id="1" name=""/>
+        <p:cNvGrpSpPr/>
+        <p:nvPr/>
+      </p:nvGrpSpPr>
+      <p:grpSpPr>
+        <a:xfrm>
+          <a:off x="0" y="0"/>
+          <a:ext cx="0" cy="0"/>
+          <a:chOff x="0" y="0"/>
+          <a:chExt cx="0" cy="0"/>
+        </a:xfrm>
+      </p:grpSpPr>
+      <p:sp>
+        <p:nvSpPr>
+          <p:cNvPr id="2" name="Espace réservé de l'image des diapositives 1"/>
+          <p:cNvSpPr>
+            <a:spLocks noGrp="1" noRot="1" noChangeAspect="1"/>
+          </p:cNvSpPr>
+          <p:nvPr>
+            <p:ph type="sldImg"/>
+          </p:nvPr>
+        </p:nvSpPr>
+        <p:spPr/>
+      </p:sp>
+      <p:sp>
+        <p:nvSpPr>
+          <p:cNvPr id="3" name="Espace réservé des commentaires 2"/>
+          <p:cNvSpPr>
+            <a:spLocks noGrp="1"/>
+          </p:cNvSpPr>
+          <p:nvPr>
+            <p:ph type="body" idx="1"/>
+          </p:nvPr>
+        </p:nvSpPr>
+        <p:spPr/>
+        <p:txBody>
+          <a:bodyPr/>
+          <a:lstStyle/>
+          <a:p>
+            <a:endParaRPr lang="fr-FR"/>
+          </a:p>
+        </p:txBody>
+      </p:sp>
+      <p:sp>
+        <p:nvSpPr>
+          <p:cNvPr id="4" name="Espace réservé du numéro de diapositive 3"/>
+          <p:cNvSpPr>
+            <a:spLocks noGrp="1"/>
+          </p:cNvSpPr>
+          <p:nvPr>
+            <p:ph type="sldNum" sz="quarter" idx="10"/>
+          </p:nvPr>
+        </p:nvSpPr>
+        <p:spPr/>
+        <p:txBody>
+          <a:bodyPr/>
+          <a:lstStyle/>
+          <a:p>
+            <a:fld id="{BCB96932-33C7-426F-B567-515379E36BC4}" type="slidenum">
+              <a:rPr lang="fr-FR" smtClean="0"/>
+              <a:t>2</a:t>
+            </a:fld>
+            <a:endParaRPr lang="fr-FR"/>
+          </a:p>
+        </p:txBody>
+      </p:sp>
+    </p:spTree>
+    <p:extLst>
+      <p:ext uri="{BB962C8B-B14F-4D97-AF65-F5344CB8AC3E}">
+        <p14:creationId xmlns:p14="http://schemas.microsoft.com/office/powerpoint/2010/main" val="1201959633"/>
+      </p:ext>
+    </p:extLst>
+  </p:cSld>
+  <p:clrMapOvr>
+    <a:masterClrMapping/>
+  </p:clrMapOvr>
+</p:notes>
+</file>
+
+<file path=ppt/notesSlides/notesSlide3.xml><?xml version="1.0" encoding="utf-8"?>
+<p:notes xmlns:a="http://schemas.openxmlformats.org/drawingml/2006/main" xmlns:r="http://schemas.openxmlformats.org/officeDocument/2006/relationships" xmlns:p="http://schemas.openxmlformats.org/presentationml/2006/main">
+  <p:cSld>
+    <p:spTree>
+      <p:nvGrpSpPr>
+        <p:cNvPr id="1" name=""/>
+        <p:cNvGrpSpPr/>
+        <p:nvPr/>
+      </p:nvGrpSpPr>
+      <p:grpSpPr>
+        <a:xfrm>
+          <a:off x="0" y="0"/>
+          <a:ext cx="0" cy="0"/>
+          <a:chOff x="0" y="0"/>
+          <a:chExt cx="0" cy="0"/>
+        </a:xfrm>
+      </p:grpSpPr>
+      <p:sp>
+        <p:nvSpPr>
+          <p:cNvPr id="2" name="Espace réservé de l'image des diapositives 1"/>
+          <p:cNvSpPr>
+            <a:spLocks noGrp="1" noRot="1" noChangeAspect="1"/>
+          </p:cNvSpPr>
+          <p:nvPr>
+            <p:ph type="sldImg"/>
+          </p:nvPr>
+        </p:nvSpPr>
+        <p:spPr/>
+      </p:sp>
+      <p:sp>
+        <p:nvSpPr>
+          <p:cNvPr id="3" name="Espace réservé des commentaires 2"/>
+          <p:cNvSpPr>
+            <a:spLocks noGrp="1"/>
+          </p:cNvSpPr>
+          <p:nvPr>
+            <p:ph type="body" idx="1"/>
+          </p:nvPr>
+        </p:nvSpPr>
+        <p:spPr/>
+        <p:txBody>
+          <a:bodyPr/>
+          <a:lstStyle/>
+          <a:p>
+            <a:endParaRPr lang="fr-FR"/>
+          </a:p>
+        </p:txBody>
+      </p:sp>
+      <p:sp>
+        <p:nvSpPr>
+          <p:cNvPr id="4" name="Espace réservé du numéro de diapositive 3"/>
+          <p:cNvSpPr>
+            <a:spLocks noGrp="1"/>
+          </p:cNvSpPr>
+          <p:nvPr>
+            <p:ph type="sldNum" sz="quarter" idx="10"/>
+          </p:nvPr>
+        </p:nvSpPr>
+        <p:spPr/>
+        <p:txBody>
+          <a:bodyPr/>
+          <a:lstStyle/>
+          <a:p>
+            <a:fld id="{BCB96932-33C7-426F-B567-515379E36BC4}" type="slidenum">
+              <a:rPr lang="fr-FR" smtClean="0"/>
+              <a:t>3</a:t>
+            </a:fld>
+            <a:endParaRPr lang="fr-FR"/>
+          </a:p>
+        </p:txBody>
+      </p:sp>
+    </p:spTree>
+    <p:extLst>
+      <p:ext uri="{BB962C8B-B14F-4D97-AF65-F5344CB8AC3E}">
+        <p14:creationId xmlns:p14="http://schemas.microsoft.com/office/powerpoint/2010/main" val="2593042581"/>
+      </p:ext>
+    </p:extLst>
+  </p:cSld>
+  <p:clrMapOvr>
+    <a:masterClrMapping/>
+  </p:clrMapOvr>
+</p:notes>
+</file>
+
+<file path=ppt/notesSlides/notesSlide4.xml><?xml version="1.0" encoding="utf-8"?>
+<p:notes xmlns:a="http://schemas.openxmlformats.org/drawingml/2006/main" xmlns:r="http://schemas.openxmlformats.org/officeDocument/2006/relationships" xmlns:p="http://schemas.openxmlformats.org/presentationml/2006/main">
+  <p:cSld>
+    <p:spTree>
+      <p:nvGrpSpPr>
+        <p:cNvPr id="1" name=""/>
+        <p:cNvGrpSpPr/>
+        <p:nvPr/>
+      </p:nvGrpSpPr>
+      <p:grpSpPr>
+        <a:xfrm>
+          <a:off x="0" y="0"/>
+          <a:ext cx="0" cy="0"/>
+          <a:chOff x="0" y="0"/>
+          <a:chExt cx="0" cy="0"/>
+        </a:xfrm>
+      </p:grpSpPr>
+      <p:sp>
+        <p:nvSpPr>
+          <p:cNvPr id="2" name="Espace réservé de l'image des diapositives 1"/>
+          <p:cNvSpPr>
+            <a:spLocks noGrp="1" noRot="1" noChangeAspect="1"/>
+          </p:cNvSpPr>
+          <p:nvPr>
+            <p:ph type="sldImg"/>
+          </p:nvPr>
+        </p:nvSpPr>
+        <p:spPr/>
+      </p:sp>
+      <p:sp>
+        <p:nvSpPr>
+          <p:cNvPr id="3" name="Espace réservé des commentaires 2"/>
+          <p:cNvSpPr>
+            <a:spLocks noGrp="1"/>
+          </p:cNvSpPr>
+          <p:nvPr>
+            <p:ph type="body" idx="1"/>
+          </p:nvPr>
+        </p:nvSpPr>
+        <p:spPr/>
+        <p:txBody>
+          <a:bodyPr/>
+          <a:lstStyle/>
+          <a:p>
+            <a:endParaRPr lang="fr-FR"/>
+          </a:p>
+        </p:txBody>
+      </p:sp>
+      <p:sp>
+        <p:nvSpPr>
+          <p:cNvPr id="4" name="Espace réservé du numéro de diapositive 3"/>
+          <p:cNvSpPr>
+            <a:spLocks noGrp="1"/>
+          </p:cNvSpPr>
+          <p:nvPr>
+            <p:ph type="sldNum" sz="quarter" idx="10"/>
+          </p:nvPr>
+        </p:nvSpPr>
+        <p:spPr/>
+        <p:txBody>
+          <a:bodyPr/>
+          <a:lstStyle/>
+          <a:p>
+            <a:fld id="{BCB96932-33C7-426F-B567-515379E36BC4}" type="slidenum">
+              <a:rPr lang="fr-FR" smtClean="0"/>
+              <a:t>4</a:t>
+            </a:fld>
+            <a:endParaRPr lang="fr-FR"/>
+          </a:p>
+        </p:txBody>
+      </p:sp>
+    </p:spTree>
+    <p:extLst>
+      <p:ext uri="{BB962C8B-B14F-4D97-AF65-F5344CB8AC3E}">
+        <p14:creationId xmlns:p14="http://schemas.microsoft.com/office/powerpoint/2010/main" val="2206328551"/>
+      </p:ext>
+    </p:extLst>
+  </p:cSld>
+  <p:clrMapOvr>
+    <a:masterClrMapping/>
+  </p:clrMapOvr>
+</p:notes>
+</file>
+
+<file path=ppt/notesSlides/notesSlide5.xml><?xml version="1.0" encoding="utf-8"?>
+<p:notes xmlns:a="http://schemas.openxmlformats.org/drawingml/2006/main" xmlns:r="http://schemas.openxmlformats.org/officeDocument/2006/relationships" xmlns:p="http://schemas.openxmlformats.org/presentationml/2006/main">
+  <p:cSld>
+    <p:spTree>
+      <p:nvGrpSpPr>
+        <p:cNvPr id="1" name=""/>
+        <p:cNvGrpSpPr/>
+        <p:nvPr/>
+      </p:nvGrpSpPr>
+      <p:grpSpPr>
+        <a:xfrm>
+          <a:off x="0" y="0"/>
+          <a:ext cx="0" cy="0"/>
+          <a:chOff x="0" y="0"/>
+          <a:chExt cx="0" cy="0"/>
+        </a:xfrm>
+      </p:grpSpPr>
+      <p:sp>
+        <p:nvSpPr>
+          <p:cNvPr id="2" name="Espace réservé de l'image des diapositives 1"/>
+          <p:cNvSpPr>
+            <a:spLocks noGrp="1" noRot="1" noChangeAspect="1"/>
+          </p:cNvSpPr>
+          <p:nvPr>
+            <p:ph type="sldImg"/>
+          </p:nvPr>
+        </p:nvSpPr>
+        <p:spPr/>
+      </p:sp>
+      <p:sp>
+        <p:nvSpPr>
+          <p:cNvPr id="3" name="Espace réservé des commentaires 2"/>
+          <p:cNvSpPr>
+            <a:spLocks noGrp="1"/>
+          </p:cNvSpPr>
+          <p:nvPr>
+            <p:ph type="body" idx="1"/>
+          </p:nvPr>
+        </p:nvSpPr>
+        <p:spPr/>
+        <p:txBody>
+          <a:bodyPr/>
+          <a:lstStyle/>
+          <a:p>
+            <a:endParaRPr lang="fr-FR"/>
+          </a:p>
+        </p:txBody>
+      </p:sp>
+      <p:sp>
+        <p:nvSpPr>
+          <p:cNvPr id="4" name="Espace réservé du numéro de diapositive 3"/>
+          <p:cNvSpPr>
+            <a:spLocks noGrp="1"/>
+          </p:cNvSpPr>
+          <p:nvPr>
+            <p:ph type="sldNum" sz="quarter" idx="10"/>
+          </p:nvPr>
+        </p:nvSpPr>
+        <p:spPr/>
+        <p:txBody>
+          <a:bodyPr/>
+          <a:lstStyle/>
+          <a:p>
+            <a:fld id="{BCB96932-33C7-426F-B567-515379E36BC4}" type="slidenum">
+              <a:rPr lang="fr-FR" smtClean="0"/>
+              <a:t>5</a:t>
+            </a:fld>
+            <a:endParaRPr lang="fr-FR"/>
+          </a:p>
+        </p:txBody>
+      </p:sp>
+    </p:spTree>
+    <p:extLst>
+      <p:ext uri="{BB962C8B-B14F-4D97-AF65-F5344CB8AC3E}">
+        <p14:creationId xmlns:p14="http://schemas.microsoft.com/office/powerpoint/2010/main" val="4022742817"/>
+      </p:ext>
+    </p:extLst>
+  </p:cSld>
+  <p:clrMapOvr>
+    <a:masterClrMapping/>
+  </p:clrMapOvr>
+</p:notes>
+</file>
+
+<file path=ppt/notesSlides/notesSlide6.xml><?xml version="1.0" encoding="utf-8"?>
+<p:notes xmlns:a="http://schemas.openxmlformats.org/drawingml/2006/main" xmlns:r="http://schemas.openxmlformats.org/officeDocument/2006/relationships" xmlns:p="http://schemas.openxmlformats.org/presentationml/2006/main">
+  <p:cSld>
+    <p:spTree>
+      <p:nvGrpSpPr>
+        <p:cNvPr id="1" name=""/>
+        <p:cNvGrpSpPr/>
+        <p:nvPr/>
+      </p:nvGrpSpPr>
+      <p:grpSpPr>
+        <a:xfrm>
+          <a:off x="0" y="0"/>
+          <a:ext cx="0" cy="0"/>
+          <a:chOff x="0" y="0"/>
+          <a:chExt cx="0" cy="0"/>
+        </a:xfrm>
+      </p:grpSpPr>
+      <p:sp>
+        <p:nvSpPr>
+          <p:cNvPr id="2" name="Espace réservé de l'image des diapositives 1"/>
+          <p:cNvSpPr>
+            <a:spLocks noGrp="1" noRot="1" noChangeAspect="1"/>
+          </p:cNvSpPr>
+          <p:nvPr>
+            <p:ph type="sldImg"/>
+          </p:nvPr>
+        </p:nvSpPr>
+        <p:spPr/>
+      </p:sp>
+      <p:sp>
+        <p:nvSpPr>
+          <p:cNvPr id="3" name="Espace réservé des commentaires 2"/>
+          <p:cNvSpPr>
+            <a:spLocks noGrp="1"/>
+          </p:cNvSpPr>
+          <p:nvPr>
+            <p:ph type="body" idx="1"/>
+          </p:nvPr>
+        </p:nvSpPr>
+        <p:spPr/>
+        <p:txBody>
+          <a:bodyPr/>
+          <a:lstStyle/>
+          <a:p>
+            <a:endParaRPr lang="fr-FR"/>
+          </a:p>
+        </p:txBody>
+      </p:sp>
+      <p:sp>
+        <p:nvSpPr>
+          <p:cNvPr id="4" name="Espace réservé du numéro de diapositive 3"/>
+          <p:cNvSpPr>
+            <a:spLocks noGrp="1"/>
+          </p:cNvSpPr>
+          <p:nvPr>
+            <p:ph type="sldNum" sz="quarter" idx="10"/>
+          </p:nvPr>
+        </p:nvSpPr>
+        <p:spPr/>
+        <p:txBody>
+          <a:bodyPr/>
+          <a:lstStyle/>
+          <a:p>
+            <a:fld id="{BCB96932-33C7-426F-B567-515379E36BC4}" type="slidenum">
+              <a:rPr lang="fr-FR" smtClean="0"/>
+              <a:t>6</a:t>
+            </a:fld>
+            <a:endParaRPr lang="fr-FR"/>
+          </a:p>
+        </p:txBody>
+      </p:sp>
+    </p:spTree>
+    <p:extLst>
+      <p:ext uri="{BB962C8B-B14F-4D97-AF65-F5344CB8AC3E}">
+        <p14:creationId xmlns:p14="http://schemas.microsoft.com/office/powerpoint/2010/main" val="559935729"/>
+      </p:ext>
+    </p:extLst>
+  </p:cSld>
+  <p:clrMapOvr>
+    <a:masterClrMapping/>
+  </p:clrMapOvr>
+</p:notes>
+</file>
+
+<file path=ppt/notesSlides/notesSlide7.xml><?xml version="1.0" encoding="utf-8"?>
+<p:notes xmlns:a="http://schemas.openxmlformats.org/drawingml/2006/main" xmlns:r="http://schemas.openxmlformats.org/officeDocument/2006/relationships" xmlns:p="http://schemas.openxmlformats.org/presentationml/2006/main">
+  <p:cSld>
+    <p:spTree>
+      <p:nvGrpSpPr>
+        <p:cNvPr id="1" name=""/>
+        <p:cNvGrpSpPr/>
+        <p:nvPr/>
+      </p:nvGrpSpPr>
+      <p:grpSpPr>
+        <a:xfrm>
+          <a:off x="0" y="0"/>
+          <a:ext cx="0" cy="0"/>
+          <a:chOff x="0" y="0"/>
+          <a:chExt cx="0" cy="0"/>
+        </a:xfrm>
+      </p:grpSpPr>
+      <p:sp>
+        <p:nvSpPr>
+          <p:cNvPr id="2" name="Espace réservé de l'image des diapositives 1"/>
+          <p:cNvSpPr>
+            <a:spLocks noGrp="1" noRot="1" noChangeAspect="1"/>
+          </p:cNvSpPr>
+          <p:nvPr>
+            <p:ph type="sldImg"/>
+          </p:nvPr>
+        </p:nvSpPr>
+        <p:spPr/>
+      </p:sp>
+      <p:sp>
+        <p:nvSpPr>
+          <p:cNvPr id="3" name="Espace réservé des commentaires 2"/>
+          <p:cNvSpPr>
+            <a:spLocks noGrp="1"/>
+          </p:cNvSpPr>
+          <p:nvPr>
+            <p:ph type="body" idx="1"/>
+          </p:nvPr>
+        </p:nvSpPr>
+        <p:spPr/>
+        <p:txBody>
+          <a:bodyPr/>
+          <a:lstStyle/>
+          <a:p>
+            <a:endParaRPr lang="fr-FR"/>
+          </a:p>
+        </p:txBody>
+      </p:sp>
+      <p:sp>
+        <p:nvSpPr>
+          <p:cNvPr id="4" name="Espace réservé du numéro de diapositive 3"/>
+          <p:cNvSpPr>
+            <a:spLocks noGrp="1"/>
+          </p:cNvSpPr>
+          <p:nvPr>
+            <p:ph type="sldNum" sz="quarter" idx="10"/>
+          </p:nvPr>
+        </p:nvSpPr>
+        <p:spPr/>
+        <p:txBody>
+          <a:bodyPr/>
+          <a:lstStyle/>
+          <a:p>
+            <a:fld id="{BCB96932-33C7-426F-B567-515379E36BC4}" type="slidenum">
+              <a:rPr lang="fr-FR" smtClean="0"/>
+              <a:t>7</a:t>
+            </a:fld>
+            <a:endParaRPr lang="fr-FR"/>
+          </a:p>
+        </p:txBody>
+      </p:sp>
+    </p:spTree>
+    <p:extLst>
+      <p:ext uri="{BB962C8B-B14F-4D97-AF65-F5344CB8AC3E}">
+        <p14:creationId xmlns:p14="http://schemas.microsoft.com/office/powerpoint/2010/main" val="309336103"/>
+      </p:ext>
+    </p:extLst>
+  </p:cSld>
+  <p:clrMapOvr>
+    <a:masterClrMapping/>
+  </p:clrMapOvr>
+</p:notes>
+</file>
+
+<file path=ppt/notesSlides/notesSlide8.xml><?xml version="1.0" encoding="utf-8"?>
+<p:notes xmlns:a="http://schemas.openxmlformats.org/drawingml/2006/main" xmlns:r="http://schemas.openxmlformats.org/officeDocument/2006/relationships" xmlns:p="http://schemas.openxmlformats.org/presentationml/2006/main">
+  <p:cSld>
+    <p:spTree>
+      <p:nvGrpSpPr>
+        <p:cNvPr id="1" name=""/>
+        <p:cNvGrpSpPr/>
+        <p:nvPr/>
+      </p:nvGrpSpPr>
+      <p:grpSpPr>
+        <a:xfrm>
+          <a:off x="0" y="0"/>
+          <a:ext cx="0" cy="0"/>
+          <a:chOff x="0" y="0"/>
+          <a:chExt cx="0" cy="0"/>
+        </a:xfrm>
+      </p:grpSpPr>
+      <p:sp>
+        <p:nvSpPr>
+          <p:cNvPr id="2" name="Espace réservé de l'image des diapositives 1"/>
+          <p:cNvSpPr>
+            <a:spLocks noGrp="1" noRot="1" noChangeAspect="1"/>
+          </p:cNvSpPr>
+          <p:nvPr>
+            <p:ph type="sldImg"/>
+          </p:nvPr>
+        </p:nvSpPr>
+        <p:spPr/>
+      </p:sp>
+      <p:sp>
+        <p:nvSpPr>
+          <p:cNvPr id="3" name="Espace réservé des commentaires 2"/>
+          <p:cNvSpPr>
+            <a:spLocks noGrp="1"/>
+          </p:cNvSpPr>
+          <p:nvPr>
+            <p:ph type="body" idx="1"/>
+          </p:nvPr>
+        </p:nvSpPr>
+        <p:spPr/>
+        <p:txBody>
+          <a:bodyPr/>
+          <a:lstStyle/>
+          <a:p>
+            <a:endParaRPr lang="fr-FR"/>
+          </a:p>
+        </p:txBody>
+      </p:sp>
+      <p:sp>
+        <p:nvSpPr>
+          <p:cNvPr id="4" name="Espace réservé du numéro de diapositive 3"/>
+          <p:cNvSpPr>
+            <a:spLocks noGrp="1"/>
+          </p:cNvSpPr>
+          <p:nvPr>
+            <p:ph type="sldNum" sz="quarter" idx="10"/>
+          </p:nvPr>
+        </p:nvSpPr>
+        <p:spPr/>
+        <p:txBody>
+          <a:bodyPr/>
+          <a:lstStyle/>
+          <a:p>
+            <a:fld id="{BCB96932-33C7-426F-B567-515379E36BC4}" type="slidenum">
+              <a:rPr lang="fr-FR" smtClean="0"/>
+              <a:t>8</a:t>
+            </a:fld>
+            <a:endParaRPr lang="fr-FR"/>
+          </a:p>
+        </p:txBody>
+      </p:sp>
+    </p:spTree>
+    <p:extLst>
+      <p:ext uri="{BB962C8B-B14F-4D97-AF65-F5344CB8AC3E}">
+        <p14:creationId xmlns:p14="http://schemas.microsoft.com/office/powerpoint/2010/main" val="1108584631"/>
+      </p:ext>
+    </p:extLst>
+  </p:cSld>
+  <p:clrMapOvr>
+    <a:masterClrMapping/>
+  </p:clrMapOvr>
+</p:notes>
+</file>
+
+<file path=ppt/notesSlides/notesSlide9.xml><?xml version="1.0" encoding="utf-8"?>
+<p:notes xmlns:a="http://schemas.openxmlformats.org/drawingml/2006/main" xmlns:r="http://schemas.openxmlformats.org/officeDocument/2006/relationships" xmlns:p="http://schemas.openxmlformats.org/presentationml/2006/main">
+  <p:cSld>
+    <p:spTree>
+      <p:nvGrpSpPr>
+        <p:cNvPr id="1" name=""/>
+        <p:cNvGrpSpPr/>
+        <p:nvPr/>
+      </p:nvGrpSpPr>
+      <p:grpSpPr>
+        <a:xfrm>
+          <a:off x="0" y="0"/>
+          <a:ext cx="0" cy="0"/>
+          <a:chOff x="0" y="0"/>
+          <a:chExt cx="0" cy="0"/>
+        </a:xfrm>
+      </p:grpSpPr>
+      <p:sp>
+        <p:nvSpPr>
+          <p:cNvPr id="2" name="Espace réservé de l'image des diapositives 1"/>
+          <p:cNvSpPr>
+            <a:spLocks noGrp="1" noRot="1" noChangeAspect="1"/>
+          </p:cNvSpPr>
+          <p:nvPr>
+            <p:ph type="sldImg"/>
+          </p:nvPr>
+        </p:nvSpPr>
+        <p:spPr/>
+      </p:sp>
+      <p:sp>
+        <p:nvSpPr>
+          <p:cNvPr id="3" name="Espace réservé des commentaires 2"/>
+          <p:cNvSpPr>
+            <a:spLocks noGrp="1"/>
+          </p:cNvSpPr>
+          <p:nvPr>
+            <p:ph type="body" idx="1"/>
+          </p:nvPr>
+        </p:nvSpPr>
+        <p:spPr/>
+        <p:txBody>
+          <a:bodyPr/>
+          <a:lstStyle/>
+          <a:p>
+            <a:endParaRPr lang="fr-FR"/>
+          </a:p>
+        </p:txBody>
+      </p:sp>
+      <p:sp>
+        <p:nvSpPr>
+          <p:cNvPr id="4" name="Espace réservé du numéro de diapositive 3"/>
+          <p:cNvSpPr>
+            <a:spLocks noGrp="1"/>
+          </p:cNvSpPr>
+          <p:nvPr>
+            <p:ph type="sldNum" sz="quarter" idx="10"/>
+          </p:nvPr>
+        </p:nvSpPr>
+        <p:spPr/>
+        <p:txBody>
+          <a:bodyPr/>
+          <a:lstStyle/>
+          <a:p>
+            <a:fld id="{BCB96932-33C7-426F-B567-515379E36BC4}" type="slidenum">
+              <a:rPr lang="fr-FR" smtClean="0"/>
+              <a:t>9</a:t>
+            </a:fld>
+            <a:endParaRPr lang="fr-FR"/>
+          </a:p>
+        </p:txBody>
+      </p:sp>
+    </p:spTree>
+    <p:extLst>
+      <p:ext uri="{BB962C8B-B14F-4D97-AF65-F5344CB8AC3E}">
+        <p14:creationId xmlns:p14="http://schemas.microsoft.com/office/powerpoint/2010/main" val="69519846"/>
       </p:ext>
     </p:extLst>
   </p:cSld>
@@ -1115,7 +2389,7 @@
             <a:fld id="{B61BEF0D-F0BB-DE4B-95CE-6DB70DBA9567}" type="datetimeFigureOut">
               <a:rPr lang="en-US" smtClean="0"/>
               <a:pPr/>
-              <a:t>4/16/2015</a:t>
+              <a:t>4/17/2015</a:t>
             </a:fld>
             <a:endParaRPr lang="en-US" dirty="0"/>
           </a:p>
@@ -1933,7 +3207,7 @@
             <a:fld id="{B61BEF0D-F0BB-DE4B-95CE-6DB70DBA9567}" type="datetimeFigureOut">
               <a:rPr lang="en-US" smtClean="0"/>
               <a:pPr/>
-              <a:t>4/16/2015</a:t>
+              <a:t>4/17/2015</a:t>
             </a:fld>
             <a:endParaRPr lang="en-US" dirty="0"/>
           </a:p>
@@ -2210,7 +3484,7 @@
             <a:fld id="{B61BEF0D-F0BB-DE4B-95CE-6DB70DBA9567}" type="datetimeFigureOut">
               <a:rPr lang="en-US" smtClean="0"/>
               <a:pPr/>
-              <a:t>4/16/2015</a:t>
+              <a:t>4/17/2015</a:t>
             </a:fld>
             <a:endParaRPr lang="en-US" dirty="0"/>
           </a:p>
@@ -2708,7 +3982,7 @@
             <a:fld id="{B61BEF0D-F0BB-DE4B-95CE-6DB70DBA9567}" type="datetimeFigureOut">
               <a:rPr lang="en-US" smtClean="0"/>
               <a:pPr/>
-              <a:t>4/16/2015</a:t>
+              <a:t>4/17/2015</a:t>
             </a:fld>
             <a:endParaRPr lang="en-US" dirty="0"/>
           </a:p>
@@ -2831,7 +4105,7 @@
             <a:fld id="{B61BEF0D-F0BB-DE4B-95CE-6DB70DBA9567}" type="datetimeFigureOut">
               <a:rPr lang="en-US" smtClean="0"/>
               <a:pPr/>
-              <a:t>4/16/2015</a:t>
+              <a:t>4/17/2015</a:t>
             </a:fld>
             <a:endParaRPr lang="en-US" dirty="0"/>
           </a:p>
@@ -2931,7 +4205,7 @@
             <a:fld id="{B61BEF0D-F0BB-DE4B-95CE-6DB70DBA9567}" type="datetimeFigureOut">
               <a:rPr lang="en-US" smtClean="0"/>
               <a:pPr/>
-              <a:t>4/16/2015</a:t>
+              <a:t>4/17/2015</a:t>
             </a:fld>
             <a:endParaRPr lang="en-US" dirty="0"/>
           </a:p>
@@ -3371,7 +4645,7 @@
             <a:fld id="{B61BEF0D-F0BB-DE4B-95CE-6DB70DBA9567}" type="datetimeFigureOut">
               <a:rPr lang="en-US" smtClean="0"/>
               <a:pPr/>
-              <a:t>4/16/2015</a:t>
+              <a:t>4/17/2015</a:t>
             </a:fld>
             <a:endParaRPr lang="en-US" dirty="0"/>
           </a:p>
@@ -4754,7 +6028,7 @@
             <a:fld id="{B61BEF0D-F0BB-DE4B-95CE-6DB70DBA9567}" type="datetimeFigureOut">
               <a:rPr lang="en-US" smtClean="0"/>
               <a:pPr/>
-              <a:t>4/16/2015</a:t>
+              <a:t>4/17/2015</a:t>
             </a:fld>
             <a:endParaRPr lang="en-US" dirty="0"/>
           </a:p>
@@ -4864,7 +6138,7 @@
             </a:r>
           </a:p>
           <a:p>
-            <a:pPr lvl="2"/>
+            <a:pPr lvl="3"/>
             <a:r>
               <a:rPr lang="fr-FR" dirty="0" smtClean="0"/>
               <a:t>Ordonnées par ordre de priorité</a:t>
@@ -4889,7 +6163,7 @@
             </a:r>
           </a:p>
           <a:p>
-            <a:pPr lvl="2"/>
+            <a:pPr lvl="3"/>
             <a:r>
               <a:rPr lang="fr-FR" dirty="0"/>
               <a:t>O</a:t>
@@ -5529,7 +6803,15 @@
             <a:pPr lvl="1"/>
             <a:r>
               <a:rPr lang="fr-FR" b="1" dirty="0"/>
-              <a:t>En tant qu’utilisateur Twitter, je souhaite savoir si NARVIS peut réaliser une tâche particulière. Ainsi  il me répondra si il est capable ou non de la réaliser.</a:t>
+              <a:t>En tant qu’utilisateur Twitter, je souhaite savoir si NARVIS peut réaliser une tâche particulière. Ainsi </a:t>
+            </a:r>
+            <a:r>
+              <a:rPr lang="fr-FR" b="1" dirty="0" smtClean="0"/>
+              <a:t>il </a:t>
+            </a:r>
+            <a:r>
+              <a:rPr lang="fr-FR" b="1" dirty="0"/>
+              <a:t>me répondra si il est capable ou non de la réaliser.</a:t>
             </a:r>
           </a:p>
           <a:p>
@@ -5886,7 +7168,9 @@
         </p:nvSpPr>
         <p:spPr/>
         <p:txBody>
-          <a:bodyPr/>
+          <a:bodyPr>
+            <a:normAutofit lnSpcReduction="10000"/>
+          </a:bodyPr>
           <a:lstStyle/>
           <a:p>
             <a:r>
@@ -5906,21 +7190,8 @@
                   <a:schemeClr val="tx1"/>
                 </a:solidFill>
               </a:rPr>
-              <a:t>Langage Java </a:t>
-            </a:r>
-            <a:r>
-              <a:rPr lang="fr-FR" dirty="0" smtClean="0">
-                <a:solidFill>
-                  <a:schemeClr val="tx1"/>
-                </a:solidFill>
-              </a:rPr>
-              <a:t>1.8</a:t>
-            </a:r>
-            <a:endParaRPr lang="fr-FR" dirty="0" smtClean="0">
-              <a:solidFill>
-                <a:schemeClr val="tx1"/>
-              </a:solidFill>
-            </a:endParaRPr>
+              <a:t>Langage Java 1.8</a:t>
+            </a:r>
           </a:p>
           <a:p>
             <a:pPr lvl="2"/>
@@ -5990,15 +7261,7 @@
                   <a:schemeClr val="tx1"/>
                 </a:solidFill>
               </a:rPr>
-              <a:t>IDE </a:t>
-            </a:r>
-            <a:r>
-              <a:rPr lang="fr-FR" dirty="0" smtClean="0">
-                <a:solidFill>
-                  <a:schemeClr val="tx1"/>
-                </a:solidFill>
-              </a:rPr>
-              <a:t>Netbeans 8.1</a:t>
+              <a:t>IDE Netbeans 8.1</a:t>
             </a:r>
           </a:p>
           <a:p>
@@ -6011,6 +7274,14 @@
               <a:rPr lang="fr-FR" dirty="0" smtClean="0"/>
               <a:t>d'utilisation</a:t>
             </a:r>
+          </a:p>
+          <a:p>
+            <a:pPr lvl="2"/>
+            <a:r>
+              <a:rPr lang="fr-FR" dirty="0" smtClean="0"/>
+              <a:t>Intègre des serveurs</a:t>
+            </a:r>
+            <a:endParaRPr lang="fr-FR" dirty="0" smtClean="0"/>
           </a:p>
           <a:p>
             <a:pPr lvl="2"/>
@@ -6208,7 +7479,7 @@
           <p:nvPr/>
         </p:nvPicPr>
         <p:blipFill>
-          <a:blip r:embed="rId2">
+          <a:blip r:embed="rId3">
             <a:extLst>
               <a:ext uri="{28A0092B-C50C-407E-A947-70E740481C1C}">
                 <a14:useLocalDpi xmlns:a14="http://schemas.microsoft.com/office/drawing/2010/main" val="0"/>
@@ -6249,7 +7520,7 @@
           <p:nvPr/>
         </p:nvPicPr>
         <p:blipFill>
-          <a:blip r:embed="rId3">
+          <a:blip r:embed="rId4">
             <a:extLst>
               <a:ext uri="{28A0092B-C50C-407E-A947-70E740481C1C}">
                 <a14:useLocalDpi xmlns:a14="http://schemas.microsoft.com/office/drawing/2010/main" val="0"/>
@@ -6290,7 +7561,7 @@
           <p:nvPr/>
         </p:nvPicPr>
         <p:blipFill>
-          <a:blip r:embed="rId4">
+          <a:blip r:embed="rId5">
             <a:extLst>
               <a:ext uri="{28A0092B-C50C-407E-A947-70E740481C1C}">
                 <a14:useLocalDpi xmlns:a14="http://schemas.microsoft.com/office/drawing/2010/main" val="0"/>
@@ -6461,7 +7732,6 @@
               <a:rPr lang="fr-FR" dirty="0" smtClean="0"/>
               <a:t>Reconnu et très complet</a:t>
             </a:r>
-            <a:endParaRPr lang="fr-FR" dirty="0" smtClean="0"/>
           </a:p>
           <a:p>
             <a:pPr lvl="2"/>
@@ -6636,7 +7906,7 @@
           <p:nvPr/>
         </p:nvPicPr>
         <p:blipFill>
-          <a:blip r:embed="rId2">
+          <a:blip r:embed="rId3">
             <a:extLst>
               <a:ext uri="{28A0092B-C50C-407E-A947-70E740481C1C}">
                 <a14:useLocalDpi xmlns:a14="http://schemas.microsoft.com/office/drawing/2010/main" val="0"/>
@@ -6677,7 +7947,7 @@
           <p:nvPr/>
         </p:nvPicPr>
         <p:blipFill>
-          <a:blip r:embed="rId3">
+          <a:blip r:embed="rId4">
             <a:extLst>
               <a:ext uri="{28A0092B-C50C-407E-A947-70E740481C1C}">
                 <a14:useLocalDpi xmlns:a14="http://schemas.microsoft.com/office/drawing/2010/main" val="0"/>
@@ -6718,7 +7988,7 @@
           <p:nvPr/>
         </p:nvPicPr>
         <p:blipFill>
-          <a:blip r:embed="rId4">
+          <a:blip r:embed="rId5">
             <a:extLst>
               <a:ext uri="{28A0092B-C50C-407E-A947-70E740481C1C}">
                 <a14:useLocalDpi xmlns:a14="http://schemas.microsoft.com/office/drawing/2010/main" val="0"/>
@@ -6843,8 +8113,21 @@
                   <a:schemeClr val="tx1"/>
                 </a:solidFill>
               </a:rPr>
-              <a:t>analyse sémantiques</a:t>
-            </a:r>
+              <a:t>analyse </a:t>
+            </a:r>
+            <a:r>
+              <a:rPr lang="fr-FR" u="sng" dirty="0" smtClean="0">
+                <a:solidFill>
+                  <a:schemeClr val="tx1"/>
+                </a:solidFill>
+              </a:rPr>
+              <a:t>sémantique</a:t>
+            </a:r>
+            <a:endParaRPr lang="fr-FR" u="sng" dirty="0" smtClean="0">
+              <a:solidFill>
+                <a:schemeClr val="tx1"/>
+              </a:solidFill>
+            </a:endParaRPr>
           </a:p>
           <a:p>
             <a:r>
@@ -7600,7 +8883,7 @@
             </a:r>
             <a:r>
               <a:rPr lang="fr-FR" dirty="0">
-                <a:hlinkClick r:id="rId2"/>
+                <a:hlinkClick r:id="rId3"/>
               </a:rPr>
               <a:t>https://twitter.com/le_marsu</a:t>
             </a:r>
@@ -7614,28 +8897,28 @@
             <a:r>
               <a:rPr lang="fr-FR" dirty="0"/>
               <a:t>EnjoyTheFilm (</a:t>
-            </a:r>
-            <a:r>
-              <a:rPr lang="fr-FR" dirty="0">
-                <a:hlinkClick r:id="rId3"/>
-              </a:rPr>
-              <a:t>https://twitter.com/enjoythefilm</a:t>
-            </a:r>
-            <a:r>
-              <a:rPr lang="fr-FR" dirty="0"/>
-              <a:t>) </a:t>
-            </a:r>
-          </a:p>
-          <a:p>
-            <a:pPr lvl="2"/>
-            <a:r>
-              <a:rPr lang="fr-FR" dirty="0"/>
-              <a:t>UrbanDictionnary (</a:t>
             </a:r>
             <a:r>
               <a:rPr lang="fr-FR" dirty="0">
                 <a:hlinkClick r:id="rId4"/>
               </a:rPr>
+              <a:t>https://twitter.com/enjoythefilm</a:t>
+            </a:r>
+            <a:r>
+              <a:rPr lang="fr-FR" dirty="0"/>
+              <a:t>) </a:t>
+            </a:r>
+          </a:p>
+          <a:p>
+            <a:pPr lvl="2"/>
+            <a:r>
+              <a:rPr lang="fr-FR" dirty="0"/>
+              <a:t>UrbanDictionnary (</a:t>
+            </a:r>
+            <a:r>
+              <a:rPr lang="fr-FR" dirty="0">
+                <a:hlinkClick r:id="rId5"/>
+              </a:rPr>
               <a:t>https://twitter.com/urbandictionary</a:t>
             </a:r>
             <a:r>
@@ -7650,7 +8933,11 @@
           <a:p>
             <a:r>
               <a:rPr lang="fr-FR" dirty="0" smtClean="0"/>
-              <a:t>Particularité de NARVIS</a:t>
+              <a:t>Particularités </a:t>
+            </a:r>
+            <a:r>
+              <a:rPr lang="fr-FR" dirty="0" smtClean="0"/>
+              <a:t>de NARVIS</a:t>
             </a:r>
             <a:endParaRPr lang="fr-FR" dirty="0"/>
           </a:p>
@@ -7735,7 +9022,7 @@
           <p:nvPr/>
         </p:nvPicPr>
         <p:blipFill>
-          <a:blip r:embed="rId5">
+          <a:blip r:embed="rId6">
             <a:extLst>
               <a:ext uri="{28A0092B-C50C-407E-A947-70E740481C1C}">
                 <a14:useLocalDpi xmlns:a14="http://schemas.microsoft.com/office/drawing/2010/main" val="0"/>
@@ -8217,7 +9504,7 @@
             <a:pPr lvl="1"/>
             <a:r>
               <a:rPr lang="fr-FR" dirty="0" smtClean="0"/>
-              <a:t>Interfacer </a:t>
+              <a:t>S’interfacer </a:t>
             </a:r>
             <a:r>
               <a:rPr lang="fr-FR" dirty="0"/>
@@ -8244,15 +9531,20 @@
           <a:p>
             <a:pPr lvl="1"/>
             <a:r>
-              <a:rPr lang="fr-FR" dirty="0"/>
-              <a:t>Réalisation d’actions correspondantes</a:t>
-            </a:r>
+              <a:rPr lang="fr-FR" dirty="0" smtClean="0"/>
+              <a:t>Réaliser des actions correspondantes</a:t>
+            </a:r>
+            <a:endParaRPr lang="fr-FR" dirty="0"/>
           </a:p>
           <a:p>
             <a:pPr lvl="2"/>
             <a:r>
               <a:rPr lang="fr-FR" dirty="0" smtClean="0"/>
-              <a:t>Basées sur différents modules</a:t>
+              <a:t>Basées </a:t>
+            </a:r>
+            <a:r>
+              <a:rPr lang="fr-FR" dirty="0" smtClean="0"/>
+              <a:t>sur différents modules</a:t>
             </a:r>
             <a:endParaRPr lang="fr-FR" dirty="0"/>
           </a:p>
@@ -8466,7 +9758,15 @@
           <a:p>
             <a:r>
               <a:rPr lang="fr-FR" dirty="0" smtClean="0"/>
-              <a:t>Séparation du projets en 3 parties</a:t>
+              <a:t>Séparation du </a:t>
+            </a:r>
+            <a:r>
+              <a:rPr lang="fr-FR" dirty="0" smtClean="0"/>
+              <a:t>projet </a:t>
+            </a:r>
+            <a:r>
+              <a:rPr lang="fr-FR" dirty="0" smtClean="0"/>
+              <a:t>en 3 parties</a:t>
             </a:r>
           </a:p>
           <a:p>
@@ -8536,8 +9836,13 @@
             <a:pPr lvl="1"/>
             <a:r>
               <a:rPr lang="fr-FR" dirty="0" smtClean="0"/>
-              <a:t>Différentes sources d’information</a:t>
-            </a:r>
+              <a:t>Différentes sources </a:t>
+            </a:r>
+            <a:r>
+              <a:rPr lang="fr-FR" dirty="0" smtClean="0"/>
+              <a:t>d’informations</a:t>
+            </a:r>
+            <a:endParaRPr lang="fr-FR" dirty="0" smtClean="0"/>
           </a:p>
           <a:p>
             <a:pPr lvl="2"/>
@@ -8672,7 +9977,7 @@
           <p:nvPr/>
         </p:nvPicPr>
         <p:blipFill>
-          <a:blip r:embed="rId2">
+          <a:blip r:embed="rId3">
             <a:extLst>
               <a:ext uri="{28A0092B-C50C-407E-A947-70E740481C1C}">
                 <a14:useLocalDpi xmlns:a14="http://schemas.microsoft.com/office/drawing/2010/main" val="0"/>
@@ -8792,11 +10097,11 @@
             </a:r>
             <a:r>
               <a:rPr lang="fr-FR" dirty="0" smtClean="0"/>
-              <a:t>entrée / </a:t>
+              <a:t>entrées </a:t>
             </a:r>
             <a:r>
               <a:rPr lang="fr-FR" dirty="0" smtClean="0"/>
-              <a:t>sorties</a:t>
+              <a:t>/ sorties</a:t>
             </a:r>
             <a:endParaRPr lang="fr-FR" dirty="0"/>
           </a:p>
@@ -8899,7 +10204,7 @@
           <p:nvPr/>
         </p:nvPicPr>
         <p:blipFill>
-          <a:blip r:embed="rId2">
+          <a:blip r:embed="rId3">
             <a:extLst>
               <a:ext uri="{28A0092B-C50C-407E-A947-70E740481C1C}">
                 <a14:useLocalDpi xmlns:a14="http://schemas.microsoft.com/office/drawing/2010/main" val="0"/>
@@ -9106,7 +10411,7 @@
           <p:nvPr/>
         </p:nvPicPr>
         <p:blipFill rotWithShape="1">
-          <a:blip r:embed="rId2">
+          <a:blip r:embed="rId3">
             <a:extLst>
               <a:ext uri="{28A0092B-C50C-407E-A947-70E740481C1C}">
                 <a14:useLocalDpi xmlns:a14="http://schemas.microsoft.com/office/drawing/2010/main" val="0"/>
@@ -9266,14 +10571,30 @@
                   <a:schemeClr val="tx1"/>
                 </a:solidFill>
               </a:rPr>
-              <a:t>Garantis un résultat fonctionnel</a:t>
+              <a:t>Garantit </a:t>
+            </a:r>
+            <a:r>
+              <a:rPr lang="fr-FR" dirty="0" smtClean="0">
+                <a:solidFill>
+                  <a:schemeClr val="tx1"/>
+                </a:solidFill>
+              </a:rPr>
+              <a:t>un résultat fonctionnel</a:t>
             </a:r>
           </a:p>
           <a:p>
             <a:pPr lvl="1"/>
             <a:r>
               <a:rPr lang="fr-FR" dirty="0"/>
-              <a:t>Moins de documentation = Gain de </a:t>
+              <a:t>Moins de </a:t>
+            </a:r>
+            <a:r>
+              <a:rPr lang="fr-FR" dirty="0" smtClean="0"/>
+              <a:t>documents </a:t>
+            </a:r>
+            <a:r>
+              <a:rPr lang="fr-FR" dirty="0"/>
+              <a:t>= Gain de </a:t>
             </a:r>
             <a:r>
               <a:rPr lang="fr-FR" dirty="0" smtClean="0"/>
@@ -9503,7 +10824,7 @@
           <p:nvPr/>
         </p:nvPicPr>
         <p:blipFill>
-          <a:blip r:embed="rId2">
+          <a:blip r:embed="rId3">
             <a:extLst>
               <a:ext uri="{28A0092B-C50C-407E-A947-70E740481C1C}">
                 <a14:useLocalDpi xmlns:a14="http://schemas.microsoft.com/office/drawing/2010/main" val="0"/>

</xml_diff>